<commit_message>
Ajout de l'analyse de performance
</commit_message>
<xml_diff>
--- a/Projet OLAP/ressources/Base de données multi-dimensionnelles et OLAP - Projet Numéro 2 - Présentation.pptx
+++ b/Projet OLAP/ressources/Base de données multi-dimensionnelles et OLAP - Projet Numéro 2 - Présentation.pptx
@@ -1,9 +1,12 @@
 
 <file path=ppt/presentation.xml><?xml version="1.0" encoding="utf-8"?>
-<p:presentation xmlns:a="http://schemas.openxmlformats.org/drawingml/2006/main" xmlns:r="http://schemas.openxmlformats.org/officeDocument/2006/relationships" xmlns:p="http://schemas.openxmlformats.org/presentationml/2006/main" saveSubsetFonts="1">
+<p:presentation xmlns:a="http://schemas.openxmlformats.org/drawingml/2006/main" xmlns:r="http://schemas.openxmlformats.org/officeDocument/2006/relationships" xmlns:p="http://schemas.openxmlformats.org/presentationml/2006/main" showSpecialPlsOnTitleSld="0" saveSubsetFonts="1">
   <p:sldMasterIdLst>
     <p:sldMasterId id="2147483660" r:id="rId1"/>
   </p:sldMasterIdLst>
+  <p:notesMasterIdLst>
+    <p:notesMasterId r:id="rId11"/>
+  </p:notesMasterIdLst>
   <p:sldIdLst>
     <p:sldId id="256" r:id="rId2"/>
     <p:sldId id="257" r:id="rId3"/>
@@ -3234,6 +3237,13 @@
     <dgm:pt modelId="{BCFDDB18-9E6D-4348-B728-AA0CE626DC8D}" type="pres">
       <dgm:prSet presAssocID="{88C65A7F-425C-49F4-80E3-F80D53DDDA71}" presName="circ1" presStyleLbl="vennNode1" presStyleIdx="0" presStyleCnt="3"/>
       <dgm:spPr/>
+      <dgm:t>
+        <a:bodyPr/>
+        <a:lstStyle/>
+        <a:p>
+          <a:endParaRPr lang="fr-FR"/>
+        </a:p>
+      </dgm:t>
     </dgm:pt>
     <dgm:pt modelId="{67A10AD3-9D17-4A00-BFBA-59158F47C312}" type="pres">
       <dgm:prSet presAssocID="{88C65A7F-425C-49F4-80E3-F80D53DDDA71}" presName="circ1Tx" presStyleLbl="revTx" presStyleIdx="0" presStyleCnt="0">
@@ -3244,6 +3254,13 @@
         </dgm:presLayoutVars>
       </dgm:prSet>
       <dgm:spPr/>
+      <dgm:t>
+        <a:bodyPr/>
+        <a:lstStyle/>
+        <a:p>
+          <a:endParaRPr lang="fr-FR"/>
+        </a:p>
+      </dgm:t>
     </dgm:pt>
     <dgm:pt modelId="{49ACE923-D80E-427F-9778-16F36B7A0BE9}" type="pres">
       <dgm:prSet presAssocID="{878AE4FC-A79E-4444-AACE-FBF334C99134}" presName="circ2" presStyleLbl="vennNode1" presStyleIdx="1" presStyleCnt="3"/>
@@ -3873,6 +3890,13 @@
         </dgm:presLayoutVars>
       </dgm:prSet>
       <dgm:spPr/>
+      <dgm:t>
+        <a:bodyPr/>
+        <a:lstStyle/>
+        <a:p>
+          <a:endParaRPr lang="fr-FR"/>
+        </a:p>
+      </dgm:t>
     </dgm:pt>
     <dgm:pt modelId="{23F41C22-9001-411A-A57A-F4C8ECD99794}" type="pres">
       <dgm:prSet presAssocID="{DA8F99EC-F6CE-4AA3-ACC1-5100CF4E0BE1}" presName="tSp" presStyleCnt="0"/>
@@ -3901,6 +3925,13 @@
         </dgm:presLayoutVars>
       </dgm:prSet>
       <dgm:spPr/>
+      <dgm:t>
+        <a:bodyPr/>
+        <a:lstStyle/>
+        <a:p>
+          <a:endParaRPr lang="fr-FR"/>
+        </a:p>
+      </dgm:t>
     </dgm:pt>
     <dgm:pt modelId="{40D193CD-3879-4F40-936A-0F524852940E}" type="pres">
       <dgm:prSet presAssocID="{EBDEB85D-5F99-43AC-8367-ED3175FE74EA}" presName="childNode1tx" presStyleLbl="bgAcc1" presStyleIdx="0" presStyleCnt="2">
@@ -3909,6 +3940,13 @@
         </dgm:presLayoutVars>
       </dgm:prSet>
       <dgm:spPr/>
+      <dgm:t>
+        <a:bodyPr/>
+        <a:lstStyle/>
+        <a:p>
+          <a:endParaRPr lang="fr-FR"/>
+        </a:p>
+      </dgm:t>
     </dgm:pt>
     <dgm:pt modelId="{1E979AE3-3F79-4FA9-9E2B-6196392B2505}" type="pres">
       <dgm:prSet presAssocID="{EBDEB85D-5F99-43AC-8367-ED3175FE74EA}" presName="parentNode1" presStyleLbl="node1" presStyleIdx="0" presStyleCnt="2">
@@ -3933,6 +3971,13 @@
     <dgm:pt modelId="{17F2A84E-6544-4E2C-9D60-D66EFA674C5D}" type="pres">
       <dgm:prSet presAssocID="{B8844AED-2521-4458-9051-0460A63FE5A1}" presName="Name9" presStyleLbl="sibTrans2D1" presStyleIdx="0" presStyleCnt="1"/>
       <dgm:spPr/>
+      <dgm:t>
+        <a:bodyPr/>
+        <a:lstStyle/>
+        <a:p>
+          <a:endParaRPr lang="fr-FR"/>
+        </a:p>
+      </dgm:t>
     </dgm:pt>
     <dgm:pt modelId="{C606B2A4-635D-48D0-A434-80DF4A1F06DA}" type="pres">
       <dgm:prSet presAssocID="{1A82C205-05EC-4AEC-AE10-1916E61AD5EA}" presName="composite2" presStyleCnt="0"/>
@@ -3994,24 +4039,24 @@
     </dgm:pt>
   </dgm:ptLst>
   <dgm:cxnLst>
+    <dgm:cxn modelId="{326CC5A5-0F16-49C3-A98E-F2238D63043F}" srcId="{DA8F99EC-F6CE-4AA3-ACC1-5100CF4E0BE1}" destId="{EBDEB85D-5F99-43AC-8367-ED3175FE74EA}" srcOrd="0" destOrd="0" parTransId="{86EED1CC-2245-4E80-87FB-E1A4B6B88694}" sibTransId="{B8844AED-2521-4458-9051-0460A63FE5A1}"/>
+    <dgm:cxn modelId="{08C01FA6-3DD8-4D76-AACE-440ACB569670}" type="presOf" srcId="{E9952AF0-F9E2-41FA-B23C-BBF084FFCAF2}" destId="{40D193CD-3879-4F40-936A-0F524852940E}" srcOrd="1" destOrd="0" presId="urn:microsoft.com/office/officeart/2005/8/layout/hProcess4"/>
+    <dgm:cxn modelId="{4B3DD8DC-E4EB-4D7A-81BD-BCA6A80FD005}" srcId="{DA8F99EC-F6CE-4AA3-ACC1-5100CF4E0BE1}" destId="{1A82C205-05EC-4AEC-AE10-1916E61AD5EA}" srcOrd="1" destOrd="0" parTransId="{3D40656F-D36A-458A-B2BF-B1CD3A5DF22A}" sibTransId="{FDCD0D0A-36E9-459A-8B53-D0798FB59AAF}"/>
+    <dgm:cxn modelId="{9ECC52F2-245B-4C2A-A00B-4C9C73DA128C}" type="presOf" srcId="{E9952AF0-F9E2-41FA-B23C-BBF084FFCAF2}" destId="{E5ECFD81-36CA-4FA8-9777-8FC6CBCD5385}" srcOrd="0" destOrd="0" presId="urn:microsoft.com/office/officeart/2005/8/layout/hProcess4"/>
+    <dgm:cxn modelId="{C2DADBDA-9784-4A35-8579-08DE5EBEA1BA}" type="presOf" srcId="{EBDEB85D-5F99-43AC-8367-ED3175FE74EA}" destId="{1E979AE3-3F79-4FA9-9E2B-6196392B2505}" srcOrd="0" destOrd="0" presId="urn:microsoft.com/office/officeart/2005/8/layout/hProcess4"/>
+    <dgm:cxn modelId="{9F32DCBC-2BF8-45F9-A868-859653FC8C97}" type="presOf" srcId="{C2DCD4D1-5665-4069-B181-EA910FD921E4}" destId="{2123626B-5786-4A50-AD4A-3928B448327A}" srcOrd="0" destOrd="1" presId="urn:microsoft.com/office/officeart/2005/8/layout/hProcess4"/>
+    <dgm:cxn modelId="{84090E3E-53A5-425B-99CF-E0E7803DFA23}" srcId="{1A82C205-05EC-4AEC-AE10-1916E61AD5EA}" destId="{C2DCD4D1-5665-4069-B181-EA910FD921E4}" srcOrd="1" destOrd="0" parTransId="{A7DD0DC7-4CA2-4C57-A831-DB39356374EB}" sibTransId="{38B78CA6-BAD6-475F-89DA-1E401B3B1195}"/>
+    <dgm:cxn modelId="{55543DB8-1D29-4245-8EC7-999FB954F30B}" type="presOf" srcId="{1A82C205-05EC-4AEC-AE10-1916E61AD5EA}" destId="{BDED37B9-80A2-439B-B3C2-3171DEE59B3E}" srcOrd="0" destOrd="0" presId="urn:microsoft.com/office/officeart/2005/8/layout/hProcess4"/>
+    <dgm:cxn modelId="{18D27041-8AD1-46ED-8355-5DB547C9841C}" type="presOf" srcId="{517156CD-BF6E-4674-A5CB-1835FCCDE317}" destId="{2123626B-5786-4A50-AD4A-3928B448327A}" srcOrd="0" destOrd="0" presId="urn:microsoft.com/office/officeart/2005/8/layout/hProcess4"/>
+    <dgm:cxn modelId="{B1C67F6B-7A69-41CF-BDD1-9F58A4435D72}" type="presOf" srcId="{B8844AED-2521-4458-9051-0460A63FE5A1}" destId="{17F2A84E-6544-4E2C-9D60-D66EFA674C5D}" srcOrd="0" destOrd="0" presId="urn:microsoft.com/office/officeart/2005/8/layout/hProcess4"/>
+    <dgm:cxn modelId="{EBD5FEE5-2A40-413F-A6E3-E7617E15F8E6}" srcId="{EBDEB85D-5F99-43AC-8367-ED3175FE74EA}" destId="{01DEAEB1-4172-4B67-9565-64D8897FAA86}" srcOrd="1" destOrd="0" parTransId="{85745488-B99D-423A-92B0-F613F1CBA7BF}" sibTransId="{B7F7898F-C939-40CC-B674-A1BA203AF13C}"/>
+    <dgm:cxn modelId="{3A5EE717-87E0-413C-80BC-1C527C395D19}" type="presOf" srcId="{DA8F99EC-F6CE-4AA3-ACC1-5100CF4E0BE1}" destId="{869D76FF-7BEB-4478-BD6E-075CDD0FB620}" srcOrd="0" destOrd="0" presId="urn:microsoft.com/office/officeart/2005/8/layout/hProcess4"/>
+    <dgm:cxn modelId="{2A3AF012-4519-4BEE-8938-0F205F131B5F}" type="presOf" srcId="{01DEAEB1-4172-4B67-9565-64D8897FAA86}" destId="{40D193CD-3879-4F40-936A-0F524852940E}" srcOrd="1" destOrd="1" presId="urn:microsoft.com/office/officeart/2005/8/layout/hProcess4"/>
+    <dgm:cxn modelId="{F3CDCBB9-4D95-493D-A1B7-7A6769F706C1}" srcId="{1A82C205-05EC-4AEC-AE10-1916E61AD5EA}" destId="{517156CD-BF6E-4674-A5CB-1835FCCDE317}" srcOrd="0" destOrd="0" parTransId="{7918CADB-A25D-4B0F-8864-A978347DE689}" sibTransId="{98696F84-86B8-4DA5-96EB-972804FEF18C}"/>
+    <dgm:cxn modelId="{CB1AE2FA-3F19-4B14-B0DF-F87440800486}" srcId="{EBDEB85D-5F99-43AC-8367-ED3175FE74EA}" destId="{E9952AF0-F9E2-41FA-B23C-BBF084FFCAF2}" srcOrd="0" destOrd="0" parTransId="{42FD218C-2026-4329-9B46-A6EC52440C2C}" sibTransId="{8F009C52-1028-4866-9352-CE6BCE3E9F6A}"/>
+    <dgm:cxn modelId="{25DC5D5A-B049-4247-A65C-D8D54B07C23F}" type="presOf" srcId="{517156CD-BF6E-4674-A5CB-1835FCCDE317}" destId="{B6A6F5FC-0964-41C5-A1C6-F5415B8C129F}" srcOrd="1" destOrd="0" presId="urn:microsoft.com/office/officeart/2005/8/layout/hProcess4"/>
     <dgm:cxn modelId="{4377B9DE-4DE7-45F9-85FD-421C0E894F95}" type="presOf" srcId="{C2DCD4D1-5665-4069-B181-EA910FD921E4}" destId="{B6A6F5FC-0964-41C5-A1C6-F5415B8C129F}" srcOrd="1" destOrd="1" presId="urn:microsoft.com/office/officeart/2005/8/layout/hProcess4"/>
-    <dgm:cxn modelId="{F3CDCBB9-4D95-493D-A1B7-7A6769F706C1}" srcId="{1A82C205-05EC-4AEC-AE10-1916E61AD5EA}" destId="{517156CD-BF6E-4674-A5CB-1835FCCDE317}" srcOrd="0" destOrd="0" parTransId="{7918CADB-A25D-4B0F-8864-A978347DE689}" sibTransId="{98696F84-86B8-4DA5-96EB-972804FEF18C}"/>
-    <dgm:cxn modelId="{9ECC52F2-245B-4C2A-A00B-4C9C73DA128C}" type="presOf" srcId="{E9952AF0-F9E2-41FA-B23C-BBF084FFCAF2}" destId="{E5ECFD81-36CA-4FA8-9777-8FC6CBCD5385}" srcOrd="0" destOrd="0" presId="urn:microsoft.com/office/officeart/2005/8/layout/hProcess4"/>
     <dgm:cxn modelId="{A2D5243A-EE8F-4E2B-A74B-5F2CD312E82E}" type="presOf" srcId="{01DEAEB1-4172-4B67-9565-64D8897FAA86}" destId="{E5ECFD81-36CA-4FA8-9777-8FC6CBCD5385}" srcOrd="0" destOrd="1" presId="urn:microsoft.com/office/officeart/2005/8/layout/hProcess4"/>
-    <dgm:cxn modelId="{18D27041-8AD1-46ED-8355-5DB547C9841C}" type="presOf" srcId="{517156CD-BF6E-4674-A5CB-1835FCCDE317}" destId="{2123626B-5786-4A50-AD4A-3928B448327A}" srcOrd="0" destOrd="0" presId="urn:microsoft.com/office/officeart/2005/8/layout/hProcess4"/>
-    <dgm:cxn modelId="{326CC5A5-0F16-49C3-A98E-F2238D63043F}" srcId="{DA8F99EC-F6CE-4AA3-ACC1-5100CF4E0BE1}" destId="{EBDEB85D-5F99-43AC-8367-ED3175FE74EA}" srcOrd="0" destOrd="0" parTransId="{86EED1CC-2245-4E80-87FB-E1A4B6B88694}" sibTransId="{B8844AED-2521-4458-9051-0460A63FE5A1}"/>
-    <dgm:cxn modelId="{9F32DCBC-2BF8-45F9-A868-859653FC8C97}" type="presOf" srcId="{C2DCD4D1-5665-4069-B181-EA910FD921E4}" destId="{2123626B-5786-4A50-AD4A-3928B448327A}" srcOrd="0" destOrd="1" presId="urn:microsoft.com/office/officeart/2005/8/layout/hProcess4"/>
-    <dgm:cxn modelId="{25DC5D5A-B049-4247-A65C-D8D54B07C23F}" type="presOf" srcId="{517156CD-BF6E-4674-A5CB-1835FCCDE317}" destId="{B6A6F5FC-0964-41C5-A1C6-F5415B8C129F}" srcOrd="1" destOrd="0" presId="urn:microsoft.com/office/officeart/2005/8/layout/hProcess4"/>
-    <dgm:cxn modelId="{84090E3E-53A5-425B-99CF-E0E7803DFA23}" srcId="{1A82C205-05EC-4AEC-AE10-1916E61AD5EA}" destId="{C2DCD4D1-5665-4069-B181-EA910FD921E4}" srcOrd="1" destOrd="0" parTransId="{A7DD0DC7-4CA2-4C57-A831-DB39356374EB}" sibTransId="{38B78CA6-BAD6-475F-89DA-1E401B3B1195}"/>
-    <dgm:cxn modelId="{3A5EE717-87E0-413C-80BC-1C527C395D19}" type="presOf" srcId="{DA8F99EC-F6CE-4AA3-ACC1-5100CF4E0BE1}" destId="{869D76FF-7BEB-4478-BD6E-075CDD0FB620}" srcOrd="0" destOrd="0" presId="urn:microsoft.com/office/officeart/2005/8/layout/hProcess4"/>
-    <dgm:cxn modelId="{55543DB8-1D29-4245-8EC7-999FB954F30B}" type="presOf" srcId="{1A82C205-05EC-4AEC-AE10-1916E61AD5EA}" destId="{BDED37B9-80A2-439B-B3C2-3171DEE59B3E}" srcOrd="0" destOrd="0" presId="urn:microsoft.com/office/officeart/2005/8/layout/hProcess4"/>
-    <dgm:cxn modelId="{2A3AF012-4519-4BEE-8938-0F205F131B5F}" type="presOf" srcId="{01DEAEB1-4172-4B67-9565-64D8897FAA86}" destId="{40D193CD-3879-4F40-936A-0F524852940E}" srcOrd="1" destOrd="1" presId="urn:microsoft.com/office/officeart/2005/8/layout/hProcess4"/>
-    <dgm:cxn modelId="{4B3DD8DC-E4EB-4D7A-81BD-BCA6A80FD005}" srcId="{DA8F99EC-F6CE-4AA3-ACC1-5100CF4E0BE1}" destId="{1A82C205-05EC-4AEC-AE10-1916E61AD5EA}" srcOrd="1" destOrd="0" parTransId="{3D40656F-D36A-458A-B2BF-B1CD3A5DF22A}" sibTransId="{FDCD0D0A-36E9-459A-8B53-D0798FB59AAF}"/>
-    <dgm:cxn modelId="{B1C67F6B-7A69-41CF-BDD1-9F58A4435D72}" type="presOf" srcId="{B8844AED-2521-4458-9051-0460A63FE5A1}" destId="{17F2A84E-6544-4E2C-9D60-D66EFA674C5D}" srcOrd="0" destOrd="0" presId="urn:microsoft.com/office/officeart/2005/8/layout/hProcess4"/>
-    <dgm:cxn modelId="{C2DADBDA-9784-4A35-8579-08DE5EBEA1BA}" type="presOf" srcId="{EBDEB85D-5F99-43AC-8367-ED3175FE74EA}" destId="{1E979AE3-3F79-4FA9-9E2B-6196392B2505}" srcOrd="0" destOrd="0" presId="urn:microsoft.com/office/officeart/2005/8/layout/hProcess4"/>
-    <dgm:cxn modelId="{CB1AE2FA-3F19-4B14-B0DF-F87440800486}" srcId="{EBDEB85D-5F99-43AC-8367-ED3175FE74EA}" destId="{E9952AF0-F9E2-41FA-B23C-BBF084FFCAF2}" srcOrd="0" destOrd="0" parTransId="{42FD218C-2026-4329-9B46-A6EC52440C2C}" sibTransId="{8F009C52-1028-4866-9352-CE6BCE3E9F6A}"/>
-    <dgm:cxn modelId="{08C01FA6-3DD8-4D76-AACE-440ACB569670}" type="presOf" srcId="{E9952AF0-F9E2-41FA-B23C-BBF084FFCAF2}" destId="{40D193CD-3879-4F40-936A-0F524852940E}" srcOrd="1" destOrd="0" presId="urn:microsoft.com/office/officeart/2005/8/layout/hProcess4"/>
-    <dgm:cxn modelId="{EBD5FEE5-2A40-413F-A6E3-E7617E15F8E6}" srcId="{EBDEB85D-5F99-43AC-8367-ED3175FE74EA}" destId="{01DEAEB1-4172-4B67-9565-64D8897FAA86}" srcOrd="1" destOrd="0" parTransId="{85745488-B99D-423A-92B0-F613F1CBA7BF}" sibTransId="{B7F7898F-C939-40CC-B674-A1BA203AF13C}"/>
     <dgm:cxn modelId="{02FCD780-2AF7-4CBA-AF8B-621D4ABD44EC}" type="presParOf" srcId="{869D76FF-7BEB-4478-BD6E-075CDD0FB620}" destId="{23F41C22-9001-411A-A57A-F4C8ECD99794}" srcOrd="0" destOrd="0" presId="urn:microsoft.com/office/officeart/2005/8/layout/hProcess4"/>
     <dgm:cxn modelId="{797FC3EE-DA33-4E68-8DAC-CBCB9B8245B3}" type="presParOf" srcId="{869D76FF-7BEB-4478-BD6E-075CDD0FB620}" destId="{E00FD4A8-0B02-4EF6-AC16-A59DD3553C51}" srcOrd="1" destOrd="0" presId="urn:microsoft.com/office/officeart/2005/8/layout/hProcess4"/>
     <dgm:cxn modelId="{324DB9CD-BDD4-4E15-9867-CA2BEFC800FD}" type="presParOf" srcId="{869D76FF-7BEB-4478-BD6E-075CDD0FB620}" destId="{6C50EF4B-C6D5-4824-BC86-78508439B371}" srcOrd="2" destOrd="0" presId="urn:microsoft.com/office/officeart/2005/8/layout/hProcess4"/>
@@ -4144,10 +4189,24 @@
     <dgm:pt modelId="{191544D5-54A9-4E3F-BA4F-CFD0BB6E52FB}" type="pres">
       <dgm:prSet presAssocID="{3F39BC89-A26F-4F7E-B4B6-251AAEA5B521}" presName="gear1srcNode" presStyleLbl="node1" presStyleIdx="0" presStyleCnt="3"/>
       <dgm:spPr/>
+      <dgm:t>
+        <a:bodyPr/>
+        <a:lstStyle/>
+        <a:p>
+          <a:endParaRPr lang="fr-FR"/>
+        </a:p>
+      </dgm:t>
     </dgm:pt>
     <dgm:pt modelId="{733A5322-BAF6-4F6D-9728-01EF418C46C0}" type="pres">
       <dgm:prSet presAssocID="{3F39BC89-A26F-4F7E-B4B6-251AAEA5B521}" presName="gear1dstNode" presStyleLbl="node1" presStyleIdx="0" presStyleCnt="3"/>
       <dgm:spPr/>
+      <dgm:t>
+        <a:bodyPr/>
+        <a:lstStyle/>
+        <a:p>
+          <a:endParaRPr lang="fr-FR"/>
+        </a:p>
+      </dgm:t>
     </dgm:pt>
     <dgm:pt modelId="{74CB446F-D7DC-4287-B4C6-4174CF3A6DBE}" type="pres">
       <dgm:prSet presAssocID="{966BBE11-236D-4D14-AB5D-FBA22B3763E9}" presName="gear2" presStyleLbl="node1" presStyleIdx="1" presStyleCnt="3">
@@ -4168,10 +4227,24 @@
     <dgm:pt modelId="{389661B8-D6CA-4D72-97AB-F77BE5BAB91F}" type="pres">
       <dgm:prSet presAssocID="{966BBE11-236D-4D14-AB5D-FBA22B3763E9}" presName="gear2srcNode" presStyleLbl="node1" presStyleIdx="1" presStyleCnt="3"/>
       <dgm:spPr/>
+      <dgm:t>
+        <a:bodyPr/>
+        <a:lstStyle/>
+        <a:p>
+          <a:endParaRPr lang="fr-FR"/>
+        </a:p>
+      </dgm:t>
     </dgm:pt>
     <dgm:pt modelId="{62AB3B64-B6FC-43DA-AF6B-06F718B46D72}" type="pres">
       <dgm:prSet presAssocID="{966BBE11-236D-4D14-AB5D-FBA22B3763E9}" presName="gear2dstNode" presStyleLbl="node1" presStyleIdx="1" presStyleCnt="3"/>
       <dgm:spPr/>
+      <dgm:t>
+        <a:bodyPr/>
+        <a:lstStyle/>
+        <a:p>
+          <a:endParaRPr lang="fr-FR"/>
+        </a:p>
+      </dgm:t>
     </dgm:pt>
     <dgm:pt modelId="{91E37337-A8B6-4428-A53E-5B4FA1244534}" type="pres">
       <dgm:prSet presAssocID="{B14A87E8-F64D-4EB2-9040-DAB75779F3FB}" presName="gear3" presStyleLbl="node1" presStyleIdx="2" presStyleCnt="3"/>
@@ -4203,10 +4276,24 @@
     <dgm:pt modelId="{F6258E1E-98AD-410F-999F-B8866C944B85}" type="pres">
       <dgm:prSet presAssocID="{B14A87E8-F64D-4EB2-9040-DAB75779F3FB}" presName="gear3srcNode" presStyleLbl="node1" presStyleIdx="2" presStyleCnt="3"/>
       <dgm:spPr/>
+      <dgm:t>
+        <a:bodyPr/>
+        <a:lstStyle/>
+        <a:p>
+          <a:endParaRPr lang="fr-FR"/>
+        </a:p>
+      </dgm:t>
     </dgm:pt>
     <dgm:pt modelId="{B79346BD-D4D3-4FB5-B7ED-A9AC81A8288C}" type="pres">
       <dgm:prSet presAssocID="{B14A87E8-F64D-4EB2-9040-DAB75779F3FB}" presName="gear3dstNode" presStyleLbl="node1" presStyleIdx="2" presStyleCnt="3"/>
       <dgm:spPr/>
+      <dgm:t>
+        <a:bodyPr/>
+        <a:lstStyle/>
+        <a:p>
+          <a:endParaRPr lang="fr-FR"/>
+        </a:p>
+      </dgm:t>
     </dgm:pt>
     <dgm:pt modelId="{0B72DE6E-A6FE-42CD-9354-808F30616A95}" type="pres">
       <dgm:prSet presAssocID="{9B2363AF-557F-4E90-B257-80CBAD99EE94}" presName="connector1" presStyleLbl="sibTrans2D1" presStyleIdx="0" presStyleCnt="3"/>
@@ -4234,8 +4321,8 @@
     <dgm:cxn modelId="{3007D38B-238A-42FF-ADE3-16D2E0780F90}" type="presOf" srcId="{3F39BC89-A26F-4F7E-B4B6-251AAEA5B521}" destId="{E51BD24F-BC5A-43CD-AFF2-19E8DD046A5B}" srcOrd="0" destOrd="0" presId="urn:microsoft.com/office/officeart/2005/8/layout/gear1"/>
     <dgm:cxn modelId="{44FD928F-5E35-4F4E-9062-F58F576DF6E4}" srcId="{583D6E70-4C4D-44A1-84D5-61AD17D708F6}" destId="{B14A87E8-F64D-4EB2-9040-DAB75779F3FB}" srcOrd="2" destOrd="0" parTransId="{3249B02B-3DA6-4077-97B5-C90B5BDE0DBC}" sibTransId="{1033C50D-EC3E-4B4B-879A-FE1E57CF9429}"/>
     <dgm:cxn modelId="{D9E703F2-7145-4790-AFB7-F8FBE72C5384}" type="presOf" srcId="{B14A87E8-F64D-4EB2-9040-DAB75779F3FB}" destId="{91E37337-A8B6-4428-A53E-5B4FA1244534}" srcOrd="0" destOrd="0" presId="urn:microsoft.com/office/officeart/2005/8/layout/gear1"/>
+    <dgm:cxn modelId="{97237244-6638-4D88-94EB-AE83693CA1F8}" type="presOf" srcId="{583D6E70-4C4D-44A1-84D5-61AD17D708F6}" destId="{FEF86591-AD60-4CDB-B040-35DD9F96CD22}" srcOrd="0" destOrd="0" presId="urn:microsoft.com/office/officeart/2005/8/layout/gear1"/>
     <dgm:cxn modelId="{106E65E5-3C77-4F3A-AD68-08EC17E7D522}" type="presOf" srcId="{1033C50D-EC3E-4B4B-879A-FE1E57CF9429}" destId="{8CBEE71C-FFD3-42EE-8BD8-02C853016C5F}" srcOrd="0" destOrd="0" presId="urn:microsoft.com/office/officeart/2005/8/layout/gear1"/>
-    <dgm:cxn modelId="{97237244-6638-4D88-94EB-AE83693CA1F8}" type="presOf" srcId="{583D6E70-4C4D-44A1-84D5-61AD17D708F6}" destId="{FEF86591-AD60-4CDB-B040-35DD9F96CD22}" srcOrd="0" destOrd="0" presId="urn:microsoft.com/office/officeart/2005/8/layout/gear1"/>
     <dgm:cxn modelId="{B6EE215D-6DDB-467D-BB27-BE5077E7DDD1}" type="presOf" srcId="{3F39BC89-A26F-4F7E-B4B6-251AAEA5B521}" destId="{191544D5-54A9-4E3F-BA4F-CFD0BB6E52FB}" srcOrd="1" destOrd="0" presId="urn:microsoft.com/office/officeart/2005/8/layout/gear1"/>
     <dgm:cxn modelId="{F6B00F52-3FE6-4ED9-9FA9-6A5FA86F20B0}" type="presOf" srcId="{966BBE11-236D-4D14-AB5D-FBA22B3763E9}" destId="{389661B8-D6CA-4D72-97AB-F77BE5BAB91F}" srcOrd="1" destOrd="0" presId="urn:microsoft.com/office/officeart/2005/8/layout/gear1"/>
     <dgm:cxn modelId="{54191FBF-4814-439D-A7A3-DFC8E0FD9F32}" srcId="{583D6E70-4C4D-44A1-84D5-61AD17D708F6}" destId="{3F39BC89-A26F-4F7E-B4B6-251AAEA5B521}" srcOrd="0" destOrd="0" parTransId="{2E8A2B79-C40C-4DF0-A834-5AAD471D785C}" sibTransId="{9B2363AF-557F-4E90-B257-80CBAD99EE94}"/>
@@ -12529,6 +12616,353 @@
 </dgm:styleDef>
 </file>
 
+<file path=ppt/notesMasters/notesMaster1.xml><?xml version="1.0" encoding="utf-8"?>
+<p:notesMaster xmlns:a="http://schemas.openxmlformats.org/drawingml/2006/main" xmlns:r="http://schemas.openxmlformats.org/officeDocument/2006/relationships" xmlns:p="http://schemas.openxmlformats.org/presentationml/2006/main">
+  <p:cSld>
+    <p:bg>
+      <p:bgRef idx="1001">
+        <a:schemeClr val="bg1"/>
+      </p:bgRef>
+    </p:bg>
+    <p:spTree>
+      <p:nvGrpSpPr>
+        <p:cNvPr id="1" name=""/>
+        <p:cNvGrpSpPr/>
+        <p:nvPr/>
+      </p:nvGrpSpPr>
+      <p:grpSpPr>
+        <a:xfrm>
+          <a:off x="0" y="0"/>
+          <a:ext cx="0" cy="0"/>
+          <a:chOff x="0" y="0"/>
+          <a:chExt cx="0" cy="0"/>
+        </a:xfrm>
+      </p:grpSpPr>
+      <p:sp>
+        <p:nvSpPr>
+          <p:cNvPr id="2" name="Espace réservé de l'en-tête 1"/>
+          <p:cNvSpPr>
+            <a:spLocks noGrp="1"/>
+          </p:cNvSpPr>
+          <p:nvPr>
+            <p:ph type="hdr" sz="quarter"/>
+          </p:nvPr>
+        </p:nvSpPr>
+        <p:spPr>
+          <a:xfrm>
+            <a:off x="0" y="0"/>
+            <a:ext cx="2971800" cy="457200"/>
+          </a:xfrm>
+          <a:prstGeom prst="rect">
+            <a:avLst/>
+          </a:prstGeom>
+        </p:spPr>
+        <p:txBody>
+          <a:bodyPr vert="horz" lIns="91440" tIns="45720" rIns="91440" bIns="45720" rtlCol="0"/>
+          <a:lstStyle>
+            <a:lvl1pPr algn="l">
+              <a:defRPr sz="1200"/>
+            </a:lvl1pPr>
+          </a:lstStyle>
+          <a:p>
+            <a:endParaRPr lang="fr-FR"/>
+          </a:p>
+        </p:txBody>
+      </p:sp>
+      <p:sp>
+        <p:nvSpPr>
+          <p:cNvPr id="3" name="Espace réservé de la date 2"/>
+          <p:cNvSpPr>
+            <a:spLocks noGrp="1"/>
+          </p:cNvSpPr>
+          <p:nvPr>
+            <p:ph type="dt" idx="1"/>
+          </p:nvPr>
+        </p:nvSpPr>
+        <p:spPr>
+          <a:xfrm>
+            <a:off x="3884613" y="0"/>
+            <a:ext cx="2971800" cy="457200"/>
+          </a:xfrm>
+          <a:prstGeom prst="rect">
+            <a:avLst/>
+          </a:prstGeom>
+        </p:spPr>
+        <p:txBody>
+          <a:bodyPr vert="horz" lIns="91440" tIns="45720" rIns="91440" bIns="45720" rtlCol="0"/>
+          <a:lstStyle>
+            <a:lvl1pPr algn="r">
+              <a:defRPr sz="1200"/>
+            </a:lvl1pPr>
+          </a:lstStyle>
+          <a:p>
+            <a:fld id="{7C650FD7-C62C-411D-9F87-E6F104DCD088}" type="datetimeFigureOut">
+              <a:rPr lang="fr-FR" smtClean="0"/>
+              <a:t>20/01/2011</a:t>
+            </a:fld>
+            <a:endParaRPr lang="fr-FR"/>
+          </a:p>
+        </p:txBody>
+      </p:sp>
+      <p:sp>
+        <p:nvSpPr>
+          <p:cNvPr id="4" name="Espace réservé de l'image des diapositives 3"/>
+          <p:cNvSpPr>
+            <a:spLocks noGrp="1" noRot="1" noChangeAspect="1"/>
+          </p:cNvSpPr>
+          <p:nvPr>
+            <p:ph type="sldImg" idx="2"/>
+          </p:nvPr>
+        </p:nvSpPr>
+        <p:spPr>
+          <a:xfrm>
+            <a:off x="1143000" y="685800"/>
+            <a:ext cx="4572000" cy="3429000"/>
+          </a:xfrm>
+          <a:prstGeom prst="rect">
+            <a:avLst/>
+          </a:prstGeom>
+          <a:noFill/>
+          <a:ln w="12700">
+            <a:solidFill>
+              <a:prstClr val="black"/>
+            </a:solidFill>
+          </a:ln>
+        </p:spPr>
+        <p:txBody>
+          <a:bodyPr vert="horz" lIns="91440" tIns="45720" rIns="91440" bIns="45720" rtlCol="0" anchor="ctr"/>
+          <a:lstStyle/>
+          <a:p>
+            <a:endParaRPr lang="fr-FR"/>
+          </a:p>
+        </p:txBody>
+      </p:sp>
+      <p:sp>
+        <p:nvSpPr>
+          <p:cNvPr id="5" name="Espace réservé des commentaires 4"/>
+          <p:cNvSpPr>
+            <a:spLocks noGrp="1"/>
+          </p:cNvSpPr>
+          <p:nvPr>
+            <p:ph type="body" sz="quarter" idx="3"/>
+          </p:nvPr>
+        </p:nvSpPr>
+        <p:spPr>
+          <a:xfrm>
+            <a:off x="685800" y="4343400"/>
+            <a:ext cx="5486400" cy="4114800"/>
+          </a:xfrm>
+          <a:prstGeom prst="rect">
+            <a:avLst/>
+          </a:prstGeom>
+        </p:spPr>
+        <p:txBody>
+          <a:bodyPr vert="horz" lIns="91440" tIns="45720" rIns="91440" bIns="45720" rtlCol="0">
+            <a:normAutofit/>
+          </a:bodyPr>
+          <a:lstStyle/>
+          <a:p>
+            <a:pPr lvl="0"/>
+            <a:r>
+              <a:rPr lang="fr-FR" smtClean="0"/>
+              <a:t>Cliquez pour modifier les styles du texte du masque</a:t>
+            </a:r>
+          </a:p>
+          <a:p>
+            <a:pPr lvl="1"/>
+            <a:r>
+              <a:rPr lang="fr-FR" smtClean="0"/>
+              <a:t>Deuxième niveau</a:t>
+            </a:r>
+          </a:p>
+          <a:p>
+            <a:pPr lvl="2"/>
+            <a:r>
+              <a:rPr lang="fr-FR" smtClean="0"/>
+              <a:t>Troisième niveau</a:t>
+            </a:r>
+          </a:p>
+          <a:p>
+            <a:pPr lvl="3"/>
+            <a:r>
+              <a:rPr lang="fr-FR" smtClean="0"/>
+              <a:t>Quatrième niveau</a:t>
+            </a:r>
+          </a:p>
+          <a:p>
+            <a:pPr lvl="4"/>
+            <a:r>
+              <a:rPr lang="fr-FR" smtClean="0"/>
+              <a:t>Cinquième niveau</a:t>
+            </a:r>
+            <a:endParaRPr lang="fr-FR"/>
+          </a:p>
+        </p:txBody>
+      </p:sp>
+      <p:sp>
+        <p:nvSpPr>
+          <p:cNvPr id="6" name="Espace réservé du pied de page 5"/>
+          <p:cNvSpPr>
+            <a:spLocks noGrp="1"/>
+          </p:cNvSpPr>
+          <p:nvPr>
+            <p:ph type="ftr" sz="quarter" idx="4"/>
+          </p:nvPr>
+        </p:nvSpPr>
+        <p:spPr>
+          <a:xfrm>
+            <a:off x="0" y="8685213"/>
+            <a:ext cx="2971800" cy="457200"/>
+          </a:xfrm>
+          <a:prstGeom prst="rect">
+            <a:avLst/>
+          </a:prstGeom>
+        </p:spPr>
+        <p:txBody>
+          <a:bodyPr vert="horz" lIns="91440" tIns="45720" rIns="91440" bIns="45720" rtlCol="0" anchor="b"/>
+          <a:lstStyle>
+            <a:lvl1pPr algn="l">
+              <a:defRPr sz="1200"/>
+            </a:lvl1pPr>
+          </a:lstStyle>
+          <a:p>
+            <a:endParaRPr lang="fr-FR"/>
+          </a:p>
+        </p:txBody>
+      </p:sp>
+      <p:sp>
+        <p:nvSpPr>
+          <p:cNvPr id="7" name="Espace réservé du numéro de diapositive 6"/>
+          <p:cNvSpPr>
+            <a:spLocks noGrp="1"/>
+          </p:cNvSpPr>
+          <p:nvPr>
+            <p:ph type="sldNum" sz="quarter" idx="5"/>
+          </p:nvPr>
+        </p:nvSpPr>
+        <p:spPr>
+          <a:xfrm>
+            <a:off x="3884613" y="8685213"/>
+            <a:ext cx="2971800" cy="457200"/>
+          </a:xfrm>
+          <a:prstGeom prst="rect">
+            <a:avLst/>
+          </a:prstGeom>
+        </p:spPr>
+        <p:txBody>
+          <a:bodyPr vert="horz" lIns="91440" tIns="45720" rIns="91440" bIns="45720" rtlCol="0" anchor="b"/>
+          <a:lstStyle>
+            <a:lvl1pPr algn="r">
+              <a:defRPr sz="1200"/>
+            </a:lvl1pPr>
+          </a:lstStyle>
+          <a:p>
+            <a:fld id="{4D5A483E-01FF-48BD-B82D-54F31BB06427}" type="slidenum">
+              <a:rPr lang="fr-FR" smtClean="0"/>
+              <a:t>‹N°›</a:t>
+            </a:fld>
+            <a:endParaRPr lang="fr-FR"/>
+          </a:p>
+        </p:txBody>
+      </p:sp>
+    </p:spTree>
+  </p:cSld>
+  <p:clrMap bg1="lt1" tx1="dk1" bg2="lt2" tx2="dk2" accent1="accent1" accent2="accent2" accent3="accent3" accent4="accent4" accent5="accent5" accent6="accent6" hlink="hlink" folHlink="folHlink"/>
+  <p:notesStyle>
+    <a:lvl1pPr marL="0" algn="l" defTabSz="914400" rtl="0" eaLnBrk="1" latinLnBrk="0" hangingPunct="1">
+      <a:defRPr sz="1200" kern="1200">
+        <a:solidFill>
+          <a:schemeClr val="tx1"/>
+        </a:solidFill>
+        <a:latin typeface="+mn-lt"/>
+        <a:ea typeface="+mn-ea"/>
+        <a:cs typeface="+mn-cs"/>
+      </a:defRPr>
+    </a:lvl1pPr>
+    <a:lvl2pPr marL="457200" algn="l" defTabSz="914400" rtl="0" eaLnBrk="1" latinLnBrk="0" hangingPunct="1">
+      <a:defRPr sz="1200" kern="1200">
+        <a:solidFill>
+          <a:schemeClr val="tx1"/>
+        </a:solidFill>
+        <a:latin typeface="+mn-lt"/>
+        <a:ea typeface="+mn-ea"/>
+        <a:cs typeface="+mn-cs"/>
+      </a:defRPr>
+    </a:lvl2pPr>
+    <a:lvl3pPr marL="914400" algn="l" defTabSz="914400" rtl="0" eaLnBrk="1" latinLnBrk="0" hangingPunct="1">
+      <a:defRPr sz="1200" kern="1200">
+        <a:solidFill>
+          <a:schemeClr val="tx1"/>
+        </a:solidFill>
+        <a:latin typeface="+mn-lt"/>
+        <a:ea typeface="+mn-ea"/>
+        <a:cs typeface="+mn-cs"/>
+      </a:defRPr>
+    </a:lvl3pPr>
+    <a:lvl4pPr marL="1371600" algn="l" defTabSz="914400" rtl="0" eaLnBrk="1" latinLnBrk="0" hangingPunct="1">
+      <a:defRPr sz="1200" kern="1200">
+        <a:solidFill>
+          <a:schemeClr val="tx1"/>
+        </a:solidFill>
+        <a:latin typeface="+mn-lt"/>
+        <a:ea typeface="+mn-ea"/>
+        <a:cs typeface="+mn-cs"/>
+      </a:defRPr>
+    </a:lvl4pPr>
+    <a:lvl5pPr marL="1828800" algn="l" defTabSz="914400" rtl="0" eaLnBrk="1" latinLnBrk="0" hangingPunct="1">
+      <a:defRPr sz="1200" kern="1200">
+        <a:solidFill>
+          <a:schemeClr val="tx1"/>
+        </a:solidFill>
+        <a:latin typeface="+mn-lt"/>
+        <a:ea typeface="+mn-ea"/>
+        <a:cs typeface="+mn-cs"/>
+      </a:defRPr>
+    </a:lvl5pPr>
+    <a:lvl6pPr marL="2286000" algn="l" defTabSz="914400" rtl="0" eaLnBrk="1" latinLnBrk="0" hangingPunct="1">
+      <a:defRPr sz="1200" kern="1200">
+        <a:solidFill>
+          <a:schemeClr val="tx1"/>
+        </a:solidFill>
+        <a:latin typeface="+mn-lt"/>
+        <a:ea typeface="+mn-ea"/>
+        <a:cs typeface="+mn-cs"/>
+      </a:defRPr>
+    </a:lvl6pPr>
+    <a:lvl7pPr marL="2743200" algn="l" defTabSz="914400" rtl="0" eaLnBrk="1" latinLnBrk="0" hangingPunct="1">
+      <a:defRPr sz="1200" kern="1200">
+        <a:solidFill>
+          <a:schemeClr val="tx1"/>
+        </a:solidFill>
+        <a:latin typeface="+mn-lt"/>
+        <a:ea typeface="+mn-ea"/>
+        <a:cs typeface="+mn-cs"/>
+      </a:defRPr>
+    </a:lvl7pPr>
+    <a:lvl8pPr marL="3200400" algn="l" defTabSz="914400" rtl="0" eaLnBrk="1" latinLnBrk="0" hangingPunct="1">
+      <a:defRPr sz="1200" kern="1200">
+        <a:solidFill>
+          <a:schemeClr val="tx1"/>
+        </a:solidFill>
+        <a:latin typeface="+mn-lt"/>
+        <a:ea typeface="+mn-ea"/>
+        <a:cs typeface="+mn-cs"/>
+      </a:defRPr>
+    </a:lvl8pPr>
+    <a:lvl9pPr marL="3657600" algn="l" defTabSz="914400" rtl="0" eaLnBrk="1" latinLnBrk="0" hangingPunct="1">
+      <a:defRPr sz="1200" kern="1200">
+        <a:solidFill>
+          <a:schemeClr val="tx1"/>
+        </a:solidFill>
+        <a:latin typeface="+mn-lt"/>
+        <a:ea typeface="+mn-ea"/>
+        <a:cs typeface="+mn-cs"/>
+      </a:defRPr>
+    </a:lvl9pPr>
+  </p:notesStyle>
+</p:notesMaster>
+</file>
+
 <file path=ppt/slideLayouts/slideLayout1.xml><?xml version="1.0" encoding="utf-8"?>
 <p:sldLayout xmlns:a="http://schemas.openxmlformats.org/drawingml/2006/main" xmlns:r="http://schemas.openxmlformats.org/officeDocument/2006/relationships" xmlns:p="http://schemas.openxmlformats.org/presentationml/2006/main" showMasterSp="0" type="title" preserve="1">
   <p:cSld name="Diapositive de titre">
@@ -13152,9 +13586,9 @@
             <a:extLst/>
           </a:lstStyle>
           <a:p>
-            <a:fld id="{4CAAFCBB-DB38-41F5-BC69-A4F0C26DC73A}" type="datetimeFigureOut">
+            <a:fld id="{731A43A3-5526-4FBF-86B7-2E23266CE216}" type="datetime1">
               <a:rPr lang="fr-FR" smtClean="0"/>
-              <a:t>19/01/2011</a:t>
+              <a:t>20/01/2011</a:t>
             </a:fld>
             <a:endParaRPr lang="fr-FR"/>
           </a:p>
@@ -13186,6 +13620,10 @@
             <a:extLst/>
           </a:lstStyle>
           <a:p>
+            <a:r>
+              <a:rPr lang="fr-FR" smtClean="0"/>
+              <a:t>Projet numéro 2 : Règles d'associations</a:t>
+            </a:r>
             <a:endParaRPr lang="fr-FR"/>
           </a:p>
         </p:txBody>
@@ -13216,6 +13654,7 @@
           <a:p>
             <a:fld id="{39A6FB64-6B0D-416D-97C5-CB77EEC53406}" type="slidenum">
               <a:rPr lang="fr-FR" smtClean="0"/>
+              <a:pPr/>
               <a:t>‹N°›</a:t>
             </a:fld>
             <a:endParaRPr lang="fr-FR"/>
@@ -13348,9 +13787,9 @@
             <a:extLst/>
           </a:lstStyle>
           <a:p>
-            <a:fld id="{4CAAFCBB-DB38-41F5-BC69-A4F0C26DC73A}" type="datetimeFigureOut">
+            <a:fld id="{F71D09EA-36A2-4DF2-9D70-4AC1F609E1C3}" type="datetime1">
               <a:rPr lang="fr-FR" smtClean="0"/>
-              <a:t>19/01/2011</a:t>
+              <a:t>20/01/2011</a:t>
             </a:fld>
             <a:endParaRPr lang="fr-FR"/>
           </a:p>
@@ -13373,6 +13812,10 @@
             <a:extLst/>
           </a:lstStyle>
           <a:p>
+            <a:r>
+              <a:rPr lang="fr-FR" smtClean="0"/>
+              <a:t>Projet numéro 2 : Règles d'associations</a:t>
+            </a:r>
             <a:endParaRPr lang="fr-FR"/>
           </a:p>
         </p:txBody>
@@ -13396,6 +13839,7 @@
           <a:p>
             <a:fld id="{39A6FB64-6B0D-416D-97C5-CB77EEC53406}" type="slidenum">
               <a:rPr lang="fr-FR" smtClean="0"/>
+              <a:pPr/>
               <a:t>‹N°›</a:t>
             </a:fld>
             <a:endParaRPr lang="fr-FR"/>
@@ -13533,9 +13977,9 @@
             <a:extLst/>
           </a:lstStyle>
           <a:p>
-            <a:fld id="{4CAAFCBB-DB38-41F5-BC69-A4F0C26DC73A}" type="datetimeFigureOut">
+            <a:fld id="{D3A56D2E-A092-40A8-A9B0-DBAEC287B4EE}" type="datetime1">
               <a:rPr lang="fr-FR" smtClean="0"/>
-              <a:t>19/01/2011</a:t>
+              <a:t>20/01/2011</a:t>
             </a:fld>
             <a:endParaRPr lang="fr-FR"/>
           </a:p>
@@ -13558,6 +14002,10 @@
             <a:extLst/>
           </a:lstStyle>
           <a:p>
+            <a:r>
+              <a:rPr lang="fr-FR" smtClean="0"/>
+              <a:t>Projet numéro 2 : Règles d'associations</a:t>
+            </a:r>
             <a:endParaRPr lang="fr-FR"/>
           </a:p>
         </p:txBody>
@@ -13581,6 +14029,7 @@
           <a:p>
             <a:fld id="{39A6FB64-6B0D-416D-97C5-CB77EEC53406}" type="slidenum">
               <a:rPr lang="fr-FR" smtClean="0"/>
+              <a:pPr/>
               <a:t>‹N°›</a:t>
             </a:fld>
             <a:endParaRPr lang="fr-FR"/>
@@ -13683,9 +14132,9 @@
             <a:extLst/>
           </a:lstStyle>
           <a:p>
-            <a:fld id="{4CAAFCBB-DB38-41F5-BC69-A4F0C26DC73A}" type="datetimeFigureOut">
+            <a:fld id="{194C90BA-3C6B-409C-8406-A718BD467CF8}" type="datetime1">
               <a:rPr lang="fr-FR" smtClean="0"/>
-              <a:t>19/01/2011</a:t>
+              <a:t>20/01/2011</a:t>
             </a:fld>
             <a:endParaRPr lang="fr-FR"/>
           </a:p>
@@ -13708,6 +14157,10 @@
             <a:extLst/>
           </a:lstStyle>
           <a:p>
+            <a:r>
+              <a:rPr lang="fr-FR" smtClean="0"/>
+              <a:t>Projet numéro 2 : Règles d'associations</a:t>
+            </a:r>
             <a:endParaRPr lang="fr-FR"/>
           </a:p>
         </p:txBody>
@@ -13731,6 +14184,7 @@
           <a:p>
             <a:fld id="{39A6FB64-6B0D-416D-97C5-CB77EEC53406}" type="slidenum">
               <a:rPr lang="fr-FR" smtClean="0"/>
+              <a:pPr/>
               <a:t>‹N°›</a:t>
             </a:fld>
             <a:endParaRPr lang="fr-FR"/>
@@ -13938,9 +14392,9 @@
             <a:extLst/>
           </a:lstStyle>
           <a:p>
-            <a:fld id="{4CAAFCBB-DB38-41F5-BC69-A4F0C26DC73A}" type="datetimeFigureOut">
+            <a:fld id="{6EFEE733-D64B-4F43-926E-BE5F757A3094}" type="datetime1">
               <a:rPr lang="fr-FR" smtClean="0"/>
-              <a:t>19/01/2011</a:t>
+              <a:t>20/01/2011</a:t>
             </a:fld>
             <a:endParaRPr lang="fr-FR"/>
           </a:p>
@@ -13963,6 +14417,10 @@
             <a:extLst/>
           </a:lstStyle>
           <a:p>
+            <a:r>
+              <a:rPr lang="fr-FR" smtClean="0"/>
+              <a:t>Projet numéro 2 : Règles d'associations</a:t>
+            </a:r>
             <a:endParaRPr lang="fr-FR"/>
           </a:p>
         </p:txBody>
@@ -13986,6 +14444,7 @@
           <a:p>
             <a:fld id="{39A6FB64-6B0D-416D-97C5-CB77EEC53406}" type="slidenum">
               <a:rPr lang="fr-FR" smtClean="0"/>
+              <a:pPr/>
               <a:t>‹N°›</a:t>
             </a:fld>
             <a:endParaRPr lang="fr-FR"/>
@@ -14347,9 +14806,9 @@
             <a:extLst/>
           </a:lstStyle>
           <a:p>
-            <a:fld id="{4CAAFCBB-DB38-41F5-BC69-A4F0C26DC73A}" type="datetimeFigureOut">
+            <a:fld id="{2D5122C7-EB76-45CC-81B3-B6E01DBD6DAB}" type="datetime1">
               <a:rPr lang="fr-FR" smtClean="0"/>
-              <a:t>19/01/2011</a:t>
+              <a:t>20/01/2011</a:t>
             </a:fld>
             <a:endParaRPr lang="fr-FR"/>
           </a:p>
@@ -14372,6 +14831,10 @@
             <a:extLst/>
           </a:lstStyle>
           <a:p>
+            <a:r>
+              <a:rPr lang="fr-FR" smtClean="0"/>
+              <a:t>Projet numéro 2 : Règles d'associations</a:t>
+            </a:r>
             <a:endParaRPr lang="fr-FR"/>
           </a:p>
         </p:txBody>
@@ -14395,6 +14858,7 @@
           <a:p>
             <a:fld id="{39A6FB64-6B0D-416D-97C5-CB77EEC53406}" type="slidenum">
               <a:rPr lang="fr-FR" smtClean="0"/>
+              <a:pPr/>
               <a:t>‹N°›</a:t>
             </a:fld>
             <a:endParaRPr lang="fr-FR"/>
@@ -14793,9 +15257,9 @@
             <a:extLst/>
           </a:lstStyle>
           <a:p>
-            <a:fld id="{4CAAFCBB-DB38-41F5-BC69-A4F0C26DC73A}" type="datetimeFigureOut">
+            <a:fld id="{F4447A85-5E60-4720-84AA-E236EAEF0D9D}" type="datetime1">
               <a:rPr lang="fr-FR" smtClean="0"/>
-              <a:t>19/01/2011</a:t>
+              <a:t>20/01/2011</a:t>
             </a:fld>
             <a:endParaRPr lang="fr-FR"/>
           </a:p>
@@ -14818,6 +15282,10 @@
             <a:extLst/>
           </a:lstStyle>
           <a:p>
+            <a:r>
+              <a:rPr lang="fr-FR" smtClean="0"/>
+              <a:t>Projet numéro 2 : Règles d'associations</a:t>
+            </a:r>
             <a:endParaRPr lang="fr-FR"/>
           </a:p>
         </p:txBody>
@@ -14841,6 +15309,7 @@
           <a:p>
             <a:fld id="{39A6FB64-6B0D-416D-97C5-CB77EEC53406}" type="slidenum">
               <a:rPr lang="fr-FR" smtClean="0"/>
+              <a:pPr/>
               <a:t>‹N°›</a:t>
             </a:fld>
             <a:endParaRPr lang="fr-FR"/>
@@ -14894,9 +15363,9 @@
             <a:extLst/>
           </a:lstStyle>
           <a:p>
-            <a:fld id="{4CAAFCBB-DB38-41F5-BC69-A4F0C26DC73A}" type="datetimeFigureOut">
+            <a:fld id="{F345C2DA-79FD-4988-A80F-458A1FC12187}" type="datetime1">
               <a:rPr lang="fr-FR" smtClean="0"/>
-              <a:t>19/01/2011</a:t>
+              <a:t>20/01/2011</a:t>
             </a:fld>
             <a:endParaRPr lang="fr-FR"/>
           </a:p>
@@ -14919,6 +15388,10 @@
             <a:extLst/>
           </a:lstStyle>
           <a:p>
+            <a:r>
+              <a:rPr lang="fr-FR" smtClean="0"/>
+              <a:t>Projet numéro 2 : Règles d'associations</a:t>
+            </a:r>
             <a:endParaRPr lang="fr-FR"/>
           </a:p>
         </p:txBody>
@@ -14942,6 +15415,7 @@
           <a:p>
             <a:fld id="{39A6FB64-6B0D-416D-97C5-CB77EEC53406}" type="slidenum">
               <a:rPr lang="fr-FR" smtClean="0"/>
+              <a:pPr/>
               <a:t>‹N°›</a:t>
             </a:fld>
             <a:endParaRPr lang="fr-FR"/>
@@ -15015,9 +15489,9 @@
             <a:extLst/>
           </a:lstStyle>
           <a:p>
-            <a:fld id="{4CAAFCBB-DB38-41F5-BC69-A4F0C26DC73A}" type="datetimeFigureOut">
+            <a:fld id="{7EB91FE6-74B1-4BAB-BB07-ED622043AF82}" type="datetime1">
               <a:rPr lang="fr-FR" smtClean="0"/>
-              <a:t>19/01/2011</a:t>
+              <a:t>20/01/2011</a:t>
             </a:fld>
             <a:endParaRPr lang="fr-FR"/>
           </a:p>
@@ -15040,6 +15514,10 @@
             <a:extLst/>
           </a:lstStyle>
           <a:p>
+            <a:r>
+              <a:rPr lang="fr-FR" smtClean="0"/>
+              <a:t>Projet numéro 2 : Règles d'associations</a:t>
+            </a:r>
             <a:endParaRPr lang="fr-FR"/>
           </a:p>
         </p:txBody>
@@ -15063,6 +15541,7 @@
           <a:p>
             <a:fld id="{39A6FB64-6B0D-416D-97C5-CB77EEC53406}" type="slidenum">
               <a:rPr lang="fr-FR" smtClean="0"/>
+              <a:pPr/>
               <a:t>‹N°›</a:t>
             </a:fld>
             <a:endParaRPr lang="fr-FR"/>
@@ -15289,9 +15768,9 @@
             <a:extLst/>
           </a:lstStyle>
           <a:p>
-            <a:fld id="{4CAAFCBB-DB38-41F5-BC69-A4F0C26DC73A}" type="datetimeFigureOut">
+            <a:fld id="{5F659136-452F-4404-930B-BD161E6DC65D}" type="datetime1">
               <a:rPr lang="fr-FR" smtClean="0"/>
-              <a:t>19/01/2011</a:t>
+              <a:t>20/01/2011</a:t>
             </a:fld>
             <a:endParaRPr lang="fr-FR"/>
           </a:p>
@@ -15314,6 +15793,10 @@
             <a:extLst/>
           </a:lstStyle>
           <a:p>
+            <a:r>
+              <a:rPr lang="fr-FR" smtClean="0"/>
+              <a:t>Projet numéro 2 : Règles d'associations</a:t>
+            </a:r>
             <a:endParaRPr lang="fr-FR"/>
           </a:p>
         </p:txBody>
@@ -15337,6 +15820,7 @@
           <a:p>
             <a:fld id="{39A6FB64-6B0D-416D-97C5-CB77EEC53406}" type="slidenum">
               <a:rPr lang="fr-FR" smtClean="0"/>
+              <a:pPr/>
               <a:t>‹N°›</a:t>
             </a:fld>
             <a:endParaRPr lang="fr-FR"/>
@@ -15494,9 +15978,9 @@
             <a:extLst/>
           </a:lstStyle>
           <a:p>
-            <a:fld id="{4CAAFCBB-DB38-41F5-BC69-A4F0C26DC73A}" type="datetimeFigureOut">
+            <a:fld id="{CB4A9976-4B57-4298-8EA2-E173958BE008}" type="datetime1">
               <a:rPr lang="fr-FR" smtClean="0"/>
-              <a:t>19/01/2011</a:t>
+              <a:t>20/01/2011</a:t>
             </a:fld>
             <a:endParaRPr lang="fr-FR"/>
           </a:p>
@@ -15531,6 +16015,10 @@
             <a:extLst/>
           </a:lstStyle>
           <a:p>
+            <a:r>
+              <a:rPr lang="fr-FR" smtClean="0"/>
+              <a:t>Projet numéro 2 : Règles d'associations</a:t>
+            </a:r>
             <a:endParaRPr lang="fr-FR"/>
           </a:p>
         </p:txBody>
@@ -15561,6 +16049,7 @@
           <a:p>
             <a:fld id="{39A6FB64-6B0D-416D-97C5-CB77EEC53406}" type="slidenum">
               <a:rPr lang="fr-FR" smtClean="0"/>
+              <a:pPr/>
               <a:t>‹N°›</a:t>
             </a:fld>
             <a:endParaRPr lang="fr-FR"/>
@@ -16603,9 +17092,9 @@
             <a:extLst/>
           </a:lstStyle>
           <a:p>
-            <a:fld id="{4CAAFCBB-DB38-41F5-BC69-A4F0C26DC73A}" type="datetimeFigureOut">
+            <a:fld id="{05D662C7-C1E9-4030-9305-46E025ED5DC0}" type="datetime1">
               <a:rPr lang="fr-FR" smtClean="0"/>
-              <a:t>19/01/2011</a:t>
+              <a:t>20/01/2011</a:t>
             </a:fld>
             <a:endParaRPr lang="fr-FR"/>
           </a:p>
@@ -16643,6 +17132,10 @@
             <a:extLst/>
           </a:lstStyle>
           <a:p>
+            <a:r>
+              <a:rPr lang="fr-FR" smtClean="0"/>
+              <a:t>Projet numéro 2 : Règles d'associations</a:t>
+            </a:r>
             <a:endParaRPr lang="fr-FR"/>
           </a:p>
         </p:txBody>
@@ -16681,6 +17174,7 @@
           <a:p>
             <a:fld id="{39A6FB64-6B0D-416D-97C5-CB77EEC53406}" type="slidenum">
               <a:rPr lang="fr-FR" smtClean="0"/>
+              <a:pPr/>
               <a:t>‹N°›</a:t>
             </a:fld>
             <a:endParaRPr lang="fr-FR"/>
@@ -16703,6 +17197,7 @@
     <p:sldLayoutId id="2147483670" r:id="rId10"/>
     <p:sldLayoutId id="2147483671" r:id="rId11"/>
   </p:sldLayoutIdLst>
+  <p:hf hdr="0" dt="0"/>
   <p:txStyles>
     <p:titleStyle>
       <a:lvl1pPr algn="l" rtl="0" eaLnBrk="1" latinLnBrk="0" hangingPunct="1">
@@ -17057,12 +17552,24 @@
         </p:nvSpPr>
         <p:spPr/>
         <p:txBody>
-          <a:bodyPr/>
+          <a:bodyPr>
+            <a:normAutofit fontScale="92500" lnSpcReduction="10000"/>
+          </a:bodyPr>
           <a:lstStyle/>
           <a:p>
             <a:r>
               <a:rPr lang="fr-FR" dirty="0" smtClean="0"/>
-              <a:t>Projet numéro 2 : règles d’associations</a:t>
+              <a:t>Projet numéro 2 : règles </a:t>
+            </a:r>
+            <a:r>
+              <a:rPr lang="fr-FR" dirty="0" smtClean="0"/>
+              <a:t>d’associations</a:t>
+            </a:r>
+          </a:p>
+          <a:p>
+            <a:r>
+              <a:rPr lang="fr-FR" dirty="0" smtClean="0"/>
+              <a:t/>
             </a:r>
             <a:br>
               <a:rPr lang="fr-FR" dirty="0" smtClean="0"/>
@@ -17070,6 +17577,36 @@
             <a:r>
               <a:rPr lang="fr-FR" dirty="0" smtClean="0"/>
               <a:t>Arnaud BRETON et Florian GOUIN</a:t>
+            </a:r>
+            <a:endParaRPr lang="fr-FR" dirty="0"/>
+          </a:p>
+        </p:txBody>
+      </p:sp>
+      <p:sp>
+        <p:nvSpPr>
+          <p:cNvPr id="4" name="ZoneTexte 3"/>
+          <p:cNvSpPr txBox="1"/>
+          <p:nvPr/>
+        </p:nvSpPr>
+        <p:spPr>
+          <a:xfrm>
+            <a:off x="7380312" y="6444044"/>
+            <a:ext cx="1656184" cy="369332"/>
+          </a:xfrm>
+          <a:prstGeom prst="rect">
+            <a:avLst/>
+          </a:prstGeom>
+          <a:noFill/>
+        </p:spPr>
+        <p:txBody>
+          <a:bodyPr wrap="square" rtlCol="0">
+            <a:spAutoFit/>
+          </a:bodyPr>
+          <a:lstStyle/>
+          <a:p>
+            <a:r>
+              <a:rPr lang="fr-FR" dirty="0" smtClean="0"/>
+              <a:t>25/01/2011</a:t>
             </a:r>
             <a:endParaRPr lang="fr-FR" dirty="0"/>
           </a:p>
@@ -17177,6 +17714,53 @@
               <a:t>Plan</a:t>
             </a:r>
             <a:endParaRPr lang="fr-FR" dirty="0"/>
+          </a:p>
+        </p:txBody>
+      </p:sp>
+      <p:sp>
+        <p:nvSpPr>
+          <p:cNvPr id="4" name="Espace réservé du numéro de diapositive 3"/>
+          <p:cNvSpPr>
+            <a:spLocks noGrp="1"/>
+          </p:cNvSpPr>
+          <p:nvPr>
+            <p:ph type="sldNum" sz="quarter" idx="12"/>
+          </p:nvPr>
+        </p:nvSpPr>
+        <p:spPr/>
+        <p:txBody>
+          <a:bodyPr/>
+          <a:lstStyle/>
+          <a:p>
+            <a:fld id="{39A6FB64-6B0D-416D-97C5-CB77EEC53406}" type="slidenum">
+              <a:rPr lang="fr-FR" smtClean="0"/>
+              <a:pPr/>
+              <a:t>2</a:t>
+            </a:fld>
+            <a:endParaRPr lang="fr-FR"/>
+          </a:p>
+        </p:txBody>
+      </p:sp>
+      <p:sp>
+        <p:nvSpPr>
+          <p:cNvPr id="5" name="Espace réservé du pied de page 4"/>
+          <p:cNvSpPr>
+            <a:spLocks noGrp="1"/>
+          </p:cNvSpPr>
+          <p:nvPr>
+            <p:ph type="ftr" sz="quarter" idx="11"/>
+          </p:nvPr>
+        </p:nvSpPr>
+        <p:spPr/>
+        <p:txBody>
+          <a:bodyPr/>
+          <a:lstStyle/>
+          <a:p>
+            <a:r>
+              <a:rPr lang="fr-FR" smtClean="0"/>
+              <a:t>Projet numéro 2 : Règles d'associations</a:t>
+            </a:r>
+            <a:endParaRPr lang="fr-FR"/>
           </a:p>
         </p:txBody>
       </p:sp>
@@ -17317,6 +17901,53 @@
           </a:p>
         </p:txBody>
       </p:sp>
+      <p:sp>
+        <p:nvSpPr>
+          <p:cNvPr id="4" name="Espace réservé du numéro de diapositive 3"/>
+          <p:cNvSpPr>
+            <a:spLocks noGrp="1"/>
+          </p:cNvSpPr>
+          <p:nvPr>
+            <p:ph type="sldNum" sz="quarter" idx="12"/>
+          </p:nvPr>
+        </p:nvSpPr>
+        <p:spPr/>
+        <p:txBody>
+          <a:bodyPr/>
+          <a:lstStyle/>
+          <a:p>
+            <a:fld id="{39A6FB64-6B0D-416D-97C5-CB77EEC53406}" type="slidenum">
+              <a:rPr lang="fr-FR" smtClean="0"/>
+              <a:pPr/>
+              <a:t>3</a:t>
+            </a:fld>
+            <a:endParaRPr lang="fr-FR"/>
+          </a:p>
+        </p:txBody>
+      </p:sp>
+      <p:sp>
+        <p:nvSpPr>
+          <p:cNvPr id="5" name="Espace réservé du pied de page 4"/>
+          <p:cNvSpPr>
+            <a:spLocks noGrp="1"/>
+          </p:cNvSpPr>
+          <p:nvPr>
+            <p:ph type="ftr" sz="quarter" idx="11"/>
+          </p:nvPr>
+        </p:nvSpPr>
+        <p:spPr/>
+        <p:txBody>
+          <a:bodyPr/>
+          <a:lstStyle/>
+          <a:p>
+            <a:r>
+              <a:rPr lang="fr-FR" smtClean="0"/>
+              <a:t>Projet numéro 2 : Règles d'associations</a:t>
+            </a:r>
+            <a:endParaRPr lang="fr-FR"/>
+          </a:p>
+        </p:txBody>
+      </p:sp>
     </p:spTree>
   </p:cSld>
   <p:clrMapOvr>
@@ -17409,6 +18040,53 @@
           </a:graphicData>
         </a:graphic>
       </p:graphicFrame>
+      <p:sp>
+        <p:nvSpPr>
+          <p:cNvPr id="5" name="Espace réservé du numéro de diapositive 4"/>
+          <p:cNvSpPr>
+            <a:spLocks noGrp="1"/>
+          </p:cNvSpPr>
+          <p:nvPr>
+            <p:ph type="sldNum" sz="quarter" idx="12"/>
+          </p:nvPr>
+        </p:nvSpPr>
+        <p:spPr/>
+        <p:txBody>
+          <a:bodyPr/>
+          <a:lstStyle/>
+          <a:p>
+            <a:fld id="{39A6FB64-6B0D-416D-97C5-CB77EEC53406}" type="slidenum">
+              <a:rPr lang="fr-FR" smtClean="0"/>
+              <a:pPr/>
+              <a:t>4</a:t>
+            </a:fld>
+            <a:endParaRPr lang="fr-FR"/>
+          </a:p>
+        </p:txBody>
+      </p:sp>
+      <p:sp>
+        <p:nvSpPr>
+          <p:cNvPr id="6" name="Espace réservé du pied de page 5"/>
+          <p:cNvSpPr>
+            <a:spLocks noGrp="1"/>
+          </p:cNvSpPr>
+          <p:nvPr>
+            <p:ph type="ftr" sz="quarter" idx="11"/>
+          </p:nvPr>
+        </p:nvSpPr>
+        <p:spPr/>
+        <p:txBody>
+          <a:bodyPr/>
+          <a:lstStyle/>
+          <a:p>
+            <a:r>
+              <a:rPr lang="fr-FR" smtClean="0"/>
+              <a:t>Projet numéro 2 : Règles d'associations</a:t>
+            </a:r>
+            <a:endParaRPr lang="fr-FR"/>
+          </a:p>
+        </p:txBody>
+      </p:sp>
     </p:spTree>
   </p:cSld>
   <p:clrMapOvr>
@@ -17501,6 +18179,53 @@
           </a:graphicData>
         </a:graphic>
       </p:graphicFrame>
+      <p:sp>
+        <p:nvSpPr>
+          <p:cNvPr id="5" name="Espace réservé du numéro de diapositive 4"/>
+          <p:cNvSpPr>
+            <a:spLocks noGrp="1"/>
+          </p:cNvSpPr>
+          <p:nvPr>
+            <p:ph type="sldNum" sz="quarter" idx="12"/>
+          </p:nvPr>
+        </p:nvSpPr>
+        <p:spPr/>
+        <p:txBody>
+          <a:bodyPr/>
+          <a:lstStyle/>
+          <a:p>
+            <a:fld id="{39A6FB64-6B0D-416D-97C5-CB77EEC53406}" type="slidenum">
+              <a:rPr lang="fr-FR" smtClean="0"/>
+              <a:pPr/>
+              <a:t>5</a:t>
+            </a:fld>
+            <a:endParaRPr lang="fr-FR"/>
+          </a:p>
+        </p:txBody>
+      </p:sp>
+      <p:sp>
+        <p:nvSpPr>
+          <p:cNvPr id="6" name="Espace réservé du pied de page 5"/>
+          <p:cNvSpPr>
+            <a:spLocks noGrp="1"/>
+          </p:cNvSpPr>
+          <p:nvPr>
+            <p:ph type="ftr" sz="quarter" idx="11"/>
+          </p:nvPr>
+        </p:nvSpPr>
+        <p:spPr/>
+        <p:txBody>
+          <a:bodyPr/>
+          <a:lstStyle/>
+          <a:p>
+            <a:r>
+              <a:rPr lang="fr-FR" smtClean="0"/>
+              <a:t>Projet numéro 2 : Règles d'associations</a:t>
+            </a:r>
+            <a:endParaRPr lang="fr-FR"/>
+          </a:p>
+        </p:txBody>
+      </p:sp>
     </p:spTree>
   </p:cSld>
   <p:clrMapOvr>
@@ -17578,6 +18303,53 @@
           </a:p>
         </p:txBody>
       </p:sp>
+      <p:sp>
+        <p:nvSpPr>
+          <p:cNvPr id="5" name="Espace réservé du numéro de diapositive 4"/>
+          <p:cNvSpPr>
+            <a:spLocks noGrp="1"/>
+          </p:cNvSpPr>
+          <p:nvPr>
+            <p:ph type="sldNum" sz="quarter" idx="12"/>
+          </p:nvPr>
+        </p:nvSpPr>
+        <p:spPr/>
+        <p:txBody>
+          <a:bodyPr/>
+          <a:lstStyle/>
+          <a:p>
+            <a:fld id="{39A6FB64-6B0D-416D-97C5-CB77EEC53406}" type="slidenum">
+              <a:rPr lang="fr-FR" smtClean="0"/>
+              <a:pPr/>
+              <a:t>6</a:t>
+            </a:fld>
+            <a:endParaRPr lang="fr-FR"/>
+          </a:p>
+        </p:txBody>
+      </p:sp>
+      <p:sp>
+        <p:nvSpPr>
+          <p:cNvPr id="6" name="Espace réservé du pied de page 5"/>
+          <p:cNvSpPr>
+            <a:spLocks noGrp="1"/>
+          </p:cNvSpPr>
+          <p:nvPr>
+            <p:ph type="ftr" sz="quarter" idx="11"/>
+          </p:nvPr>
+        </p:nvSpPr>
+        <p:spPr/>
+        <p:txBody>
+          <a:bodyPr/>
+          <a:lstStyle/>
+          <a:p>
+            <a:r>
+              <a:rPr lang="fr-FR" smtClean="0"/>
+              <a:t>Projet numéro 2 : Règles d'associations</a:t>
+            </a:r>
+            <a:endParaRPr lang="fr-FR"/>
+          </a:p>
+        </p:txBody>
+      </p:sp>
     </p:spTree>
   </p:cSld>
   <p:clrMapOvr>
@@ -17648,6 +18420,53 @@
           </a:p>
         </p:txBody>
       </p:sp>
+      <p:sp>
+        <p:nvSpPr>
+          <p:cNvPr id="5" name="Espace réservé du numéro de diapositive 4"/>
+          <p:cNvSpPr>
+            <a:spLocks noGrp="1"/>
+          </p:cNvSpPr>
+          <p:nvPr>
+            <p:ph type="sldNum" sz="quarter" idx="12"/>
+          </p:nvPr>
+        </p:nvSpPr>
+        <p:spPr/>
+        <p:txBody>
+          <a:bodyPr/>
+          <a:lstStyle/>
+          <a:p>
+            <a:fld id="{39A6FB64-6B0D-416D-97C5-CB77EEC53406}" type="slidenum">
+              <a:rPr lang="fr-FR" smtClean="0"/>
+              <a:pPr/>
+              <a:t>7</a:t>
+            </a:fld>
+            <a:endParaRPr lang="fr-FR"/>
+          </a:p>
+        </p:txBody>
+      </p:sp>
+      <p:sp>
+        <p:nvSpPr>
+          <p:cNvPr id="6" name="Espace réservé du pied de page 5"/>
+          <p:cNvSpPr>
+            <a:spLocks noGrp="1"/>
+          </p:cNvSpPr>
+          <p:nvPr>
+            <p:ph type="ftr" sz="quarter" idx="11"/>
+          </p:nvPr>
+        </p:nvSpPr>
+        <p:spPr/>
+        <p:txBody>
+          <a:bodyPr/>
+          <a:lstStyle/>
+          <a:p>
+            <a:r>
+              <a:rPr lang="fr-FR" smtClean="0"/>
+              <a:t>Projet numéro 2 : Règles d'associations</a:t>
+            </a:r>
+            <a:endParaRPr lang="fr-FR"/>
+          </a:p>
+        </p:txBody>
+      </p:sp>
     </p:spTree>
   </p:cSld>
   <p:clrMapOvr>
@@ -17684,8 +18503,8 @@
           </p:nvPr>
         </p:nvGraphicFramePr>
         <p:xfrm>
-          <a:off x="457200" y="1481138"/>
-          <a:ext cx="8229600" cy="4160520"/>
+          <a:off x="899592" y="1412776"/>
+          <a:ext cx="7406640" cy="4561840"/>
         </p:xfrm>
         <a:graphic>
           <a:graphicData uri="http://schemas.openxmlformats.org/drawingml/2006/table">
@@ -17703,7 +18522,6 @@
                 <a:gridCol w="822960"/>
                 <a:gridCol w="822960"/>
                 <a:gridCol w="822960"/>
-                <a:gridCol w="822960"/>
               </a:tblGrid>
               <a:tr h="370840">
                 <a:tc>
@@ -17712,14 +18530,26 @@
                     <a:lstStyle/>
                     <a:p>
                       <a:r>
-                        <a:rPr lang="fr-FR" sz="1600" dirty="0" smtClean="0"/>
+                        <a:rPr lang="fr-FR" sz="1000" dirty="0" smtClean="0"/>
                         <a:t>Taille</a:t>
                       </a:r>
                       <a:r>
-                        <a:rPr lang="fr-FR" sz="1600" baseline="0" dirty="0" smtClean="0"/>
-                        <a:t> / Seuils</a:t>
+                        <a:rPr lang="fr-FR" sz="1000" baseline="0" dirty="0" smtClean="0"/>
+                        <a:t> </a:t>
                       </a:r>
-                      <a:endParaRPr lang="fr-FR" sz="1600" dirty="0"/>
+                      <a:r>
+                        <a:rPr lang="fr-FR" sz="1000" baseline="0" dirty="0" smtClean="0"/>
+                        <a:t>(</a:t>
+                      </a:r>
+                      <a:r>
+                        <a:rPr lang="fr-FR" sz="1000" baseline="0" dirty="0" err="1" smtClean="0"/>
+                        <a:t>LxC</a:t>
+                      </a:r>
+                      <a:r>
+                        <a:rPr lang="fr-FR" sz="1000" baseline="0" dirty="0" smtClean="0"/>
+                        <a:t>)/ Seuils (support / confiance)</a:t>
+                      </a:r>
+                      <a:endParaRPr lang="fr-FR" sz="1000" dirty="0"/>
                     </a:p>
                   </a:txBody>
                   <a:tcPr/>
@@ -17729,7 +18559,11 @@
                     <a:bodyPr/>
                     <a:lstStyle/>
                     <a:p>
-                      <a:endParaRPr lang="fr-FR" dirty="0"/>
+                      <a:r>
+                        <a:rPr lang="fr-FR" sz="1000" dirty="0" smtClean="0"/>
+                        <a:t>0.3/0.5</a:t>
+                      </a:r>
+                      <a:endParaRPr lang="fr-FR" sz="1000" dirty="0"/>
                     </a:p>
                   </a:txBody>
                   <a:tcPr/>
@@ -17739,7 +18573,15 @@
                     <a:bodyPr/>
                     <a:lstStyle/>
                     <a:p>
-                      <a:endParaRPr lang="fr-FR"/>
+                      <a:r>
+                        <a:rPr lang="fr-FR" sz="1000" dirty="0" smtClean="0"/>
+                        <a:t>0.4</a:t>
+                      </a:r>
+                      <a:r>
+                        <a:rPr lang="fr-FR" sz="1000" baseline="0" dirty="0" smtClean="0"/>
+                        <a:t> / 0.6</a:t>
+                      </a:r>
+                      <a:endParaRPr lang="fr-FR" sz="1000" dirty="0"/>
                     </a:p>
                   </a:txBody>
                   <a:tcPr/>
@@ -17749,7 +18591,11 @@
                     <a:bodyPr/>
                     <a:lstStyle/>
                     <a:p>
-                      <a:endParaRPr lang="fr-FR"/>
+                      <a:r>
+                        <a:rPr lang="fr-FR" sz="1000" dirty="0" smtClean="0"/>
+                        <a:t>0.5/0.7</a:t>
+                      </a:r>
+                      <a:endParaRPr lang="fr-FR" sz="1000" dirty="0"/>
                     </a:p>
                   </a:txBody>
                   <a:tcPr/>
@@ -17759,7 +18605,11 @@
                     <a:bodyPr/>
                     <a:lstStyle/>
                     <a:p>
-                      <a:endParaRPr lang="fr-FR"/>
+                      <a:r>
+                        <a:rPr lang="fr-FR" sz="1000" dirty="0" smtClean="0"/>
+                        <a:t>0.6 / 0.8 </a:t>
+                      </a:r>
+                      <a:endParaRPr lang="fr-FR" sz="1000" dirty="0"/>
                     </a:p>
                   </a:txBody>
                   <a:tcPr/>
@@ -17769,7 +18619,15 @@
                     <a:bodyPr/>
                     <a:lstStyle/>
                     <a:p>
-                      <a:endParaRPr lang="fr-FR"/>
+                      <a:r>
+                        <a:rPr lang="fr-FR" sz="1000" dirty="0" smtClean="0"/>
+                        <a:t>0.7</a:t>
+                      </a:r>
+                      <a:r>
+                        <a:rPr lang="fr-FR" sz="1000" baseline="0" dirty="0" smtClean="0"/>
+                        <a:t> / 0.9</a:t>
+                      </a:r>
+                      <a:endParaRPr lang="fr-FR" sz="1000" dirty="0"/>
                     </a:p>
                   </a:txBody>
                   <a:tcPr/>
@@ -17779,7 +18637,11 @@
                     <a:bodyPr/>
                     <a:lstStyle/>
                     <a:p>
-                      <a:endParaRPr lang="fr-FR"/>
+                      <a:r>
+                        <a:rPr lang="fr-FR" sz="1000" dirty="0" smtClean="0"/>
+                        <a:t>0.8/1.0</a:t>
+                      </a:r>
+                      <a:endParaRPr lang="fr-FR" sz="1000" dirty="0"/>
                     </a:p>
                   </a:txBody>
                   <a:tcPr/>
@@ -17789,7 +18651,11 @@
                     <a:bodyPr/>
                     <a:lstStyle/>
                     <a:p>
-                      <a:endParaRPr lang="fr-FR"/>
+                      <a:r>
+                        <a:rPr lang="fr-FR" sz="1000" dirty="0" smtClean="0"/>
+                        <a:t>0.9/1.0</a:t>
+                      </a:r>
+                      <a:endParaRPr lang="fr-FR" sz="1000" dirty="0"/>
                     </a:p>
                   </a:txBody>
                   <a:tcPr/>
@@ -17799,17 +18665,11 @@
                     <a:bodyPr/>
                     <a:lstStyle/>
                     <a:p>
-                      <a:endParaRPr lang="fr-FR"/>
-                    </a:p>
-                  </a:txBody>
-                  <a:tcPr/>
-                </a:tc>
-                <a:tc>
-                  <a:txBody>
-                    <a:bodyPr/>
-                    <a:lstStyle/>
-                    <a:p>
-                      <a:endParaRPr lang="fr-FR"/>
+                      <a:r>
+                        <a:rPr lang="fr-FR" sz="1000" dirty="0" smtClean="0"/>
+                        <a:t>1.0/1.0</a:t>
+                      </a:r>
+                      <a:endParaRPr lang="fr-FR" sz="1000" dirty="0"/>
                     </a:p>
                   </a:txBody>
                   <a:tcPr/>
@@ -17821,7 +18681,11 @@
                     <a:bodyPr/>
                     <a:lstStyle/>
                     <a:p>
-                      <a:endParaRPr lang="fr-FR"/>
+                      <a:r>
+                        <a:rPr lang="fr-FR" sz="1000" dirty="0" smtClean="0"/>
+                        <a:t>5*10</a:t>
+                      </a:r>
+                      <a:endParaRPr lang="fr-FR" sz="1000" dirty="0"/>
                     </a:p>
                   </a:txBody>
                   <a:tcPr/>
@@ -17831,7 +18695,165 @@
                     <a:bodyPr/>
                     <a:lstStyle/>
                     <a:p>
-                      <a:endParaRPr lang="fr-FR"/>
+                      <a:pPr algn="r" fontAlgn="b"/>
+                      <a:r>
+                        <a:rPr lang="fr-FR" sz="1100" b="0" i="0" u="none" strike="noStrike">
+                          <a:solidFill>
+                            <a:srgbClr val="000000"/>
+                          </a:solidFill>
+                          <a:latin typeface="Calibri"/>
+                        </a:rPr>
+                        <a:t>90</a:t>
+                      </a:r>
+                    </a:p>
+                  </a:txBody>
+                  <a:tcPr marL="9525" marR="9525" marT="9525" marB="0" anchor="b"/>
+                </a:tc>
+                <a:tc>
+                  <a:txBody>
+                    <a:bodyPr/>
+                    <a:lstStyle/>
+                    <a:p>
+                      <a:pPr algn="r" fontAlgn="b"/>
+                      <a:r>
+                        <a:rPr lang="fr-FR" sz="1100" b="0" i="0" u="none" strike="noStrike">
+                          <a:solidFill>
+                            <a:srgbClr val="000000"/>
+                          </a:solidFill>
+                          <a:latin typeface="Calibri"/>
+                        </a:rPr>
+                        <a:t>75</a:t>
+                      </a:r>
+                    </a:p>
+                  </a:txBody>
+                  <a:tcPr marL="9525" marR="9525" marT="9525" marB="0" anchor="b"/>
+                </a:tc>
+                <a:tc>
+                  <a:txBody>
+                    <a:bodyPr/>
+                    <a:lstStyle/>
+                    <a:p>
+                      <a:pPr algn="r" fontAlgn="b"/>
+                      <a:r>
+                        <a:rPr lang="fr-FR" sz="1100" b="0" i="0" u="none" strike="noStrike">
+                          <a:solidFill>
+                            <a:srgbClr val="000000"/>
+                          </a:solidFill>
+                          <a:latin typeface="Calibri"/>
+                        </a:rPr>
+                        <a:t>20</a:t>
+                      </a:r>
+                    </a:p>
+                  </a:txBody>
+                  <a:tcPr marL="9525" marR="9525" marT="9525" marB="0" anchor="b"/>
+                </a:tc>
+                <a:tc>
+                  <a:txBody>
+                    <a:bodyPr/>
+                    <a:lstStyle/>
+                    <a:p>
+                      <a:pPr algn="r" fontAlgn="b"/>
+                      <a:r>
+                        <a:rPr lang="fr-FR" sz="1100" b="0" i="0" u="none" strike="noStrike">
+                          <a:solidFill>
+                            <a:srgbClr val="000000"/>
+                          </a:solidFill>
+                          <a:latin typeface="Calibri"/>
+                        </a:rPr>
+                        <a:t>36</a:t>
+                      </a:r>
+                    </a:p>
+                  </a:txBody>
+                  <a:tcPr marL="9525" marR="9525" marT="9525" marB="0" anchor="b"/>
+                </a:tc>
+                <a:tc>
+                  <a:txBody>
+                    <a:bodyPr/>
+                    <a:lstStyle/>
+                    <a:p>
+                      <a:pPr algn="r" fontAlgn="b"/>
+                      <a:r>
+                        <a:rPr lang="fr-FR" sz="1100" b="0" i="0" u="none" strike="noStrike">
+                          <a:solidFill>
+                            <a:srgbClr val="000000"/>
+                          </a:solidFill>
+                          <a:latin typeface="Calibri"/>
+                        </a:rPr>
+                        <a:t>21</a:t>
+                      </a:r>
+                    </a:p>
+                  </a:txBody>
+                  <a:tcPr marL="9525" marR="9525" marT="9525" marB="0" anchor="b"/>
+                </a:tc>
+                <a:tc>
+                  <a:txBody>
+                    <a:bodyPr/>
+                    <a:lstStyle/>
+                    <a:p>
+                      <a:pPr algn="r" fontAlgn="b"/>
+                      <a:r>
+                        <a:rPr lang="fr-FR" sz="1100" b="0" i="0" u="none" strike="noStrike">
+                          <a:solidFill>
+                            <a:srgbClr val="000000"/>
+                          </a:solidFill>
+                          <a:latin typeface="Calibri"/>
+                        </a:rPr>
+                        <a:t>19</a:t>
+                      </a:r>
+                    </a:p>
+                  </a:txBody>
+                  <a:tcPr marL="9525" marR="9525" marT="9525" marB="0" anchor="b"/>
+                </a:tc>
+                <a:tc>
+                  <a:txBody>
+                    <a:bodyPr/>
+                    <a:lstStyle/>
+                    <a:p>
+                      <a:pPr algn="r" fontAlgn="b"/>
+                      <a:r>
+                        <a:rPr lang="fr-FR" sz="1100" b="0" i="0" u="none" strike="noStrike">
+                          <a:solidFill>
+                            <a:srgbClr val="000000"/>
+                          </a:solidFill>
+                          <a:latin typeface="Calibri"/>
+                        </a:rPr>
+                        <a:t>17</a:t>
+                      </a:r>
+                    </a:p>
+                  </a:txBody>
+                  <a:tcPr marL="9525" marR="9525" marT="9525" marB="0" anchor="b"/>
+                </a:tc>
+                <a:tc>
+                  <a:txBody>
+                    <a:bodyPr/>
+                    <a:lstStyle/>
+                    <a:p>
+                      <a:pPr algn="r" fontAlgn="b"/>
+                      <a:r>
+                        <a:rPr lang="fr-FR" sz="1100" b="0" i="0" u="none" strike="noStrike">
+                          <a:solidFill>
+                            <a:srgbClr val="000000"/>
+                          </a:solidFill>
+                          <a:latin typeface="Calibri"/>
+                        </a:rPr>
+                        <a:t>21</a:t>
+                      </a:r>
+                    </a:p>
+                  </a:txBody>
+                  <a:tcPr marL="9525" marR="9525" marT="9525" marB="0" anchor="b"/>
+                </a:tc>
+              </a:tr>
+              <a:tr h="370840">
+                <a:tc>
+                  <a:txBody>
+                    <a:bodyPr/>
+                    <a:lstStyle/>
+                    <a:p>
+                      <a:r>
+                        <a:rPr lang="fr-FR" sz="1000" dirty="0" smtClean="0"/>
+                        <a:t>10*60</a:t>
+                      </a:r>
+                      <a:endParaRPr lang="fr-FR" sz="1000" dirty="0"/>
                     </a:p>
                   </a:txBody>
                   <a:tcPr/>
@@ -17841,7 +18863,165 @@
                     <a:bodyPr/>
                     <a:lstStyle/>
                     <a:p>
-                      <a:endParaRPr lang="fr-FR"/>
+                      <a:pPr algn="r" fontAlgn="b"/>
+                      <a:r>
+                        <a:rPr lang="fr-FR" sz="1100" b="0" i="0" u="none" strike="noStrike">
+                          <a:solidFill>
+                            <a:srgbClr val="000000"/>
+                          </a:solidFill>
+                          <a:latin typeface="Calibri"/>
+                        </a:rPr>
+                        <a:t>112</a:t>
+                      </a:r>
+                    </a:p>
+                  </a:txBody>
+                  <a:tcPr marL="9525" marR="9525" marT="9525" marB="0" anchor="b"/>
+                </a:tc>
+                <a:tc>
+                  <a:txBody>
+                    <a:bodyPr/>
+                    <a:lstStyle/>
+                    <a:p>
+                      <a:pPr algn="r" fontAlgn="b"/>
+                      <a:r>
+                        <a:rPr lang="fr-FR" sz="1100" b="0" i="0" u="none" strike="noStrike">
+                          <a:solidFill>
+                            <a:srgbClr val="000000"/>
+                          </a:solidFill>
+                          <a:latin typeface="Calibri"/>
+                        </a:rPr>
+                        <a:t>43</a:t>
+                      </a:r>
+                    </a:p>
+                  </a:txBody>
+                  <a:tcPr marL="9525" marR="9525" marT="9525" marB="0" anchor="b"/>
+                </a:tc>
+                <a:tc>
+                  <a:txBody>
+                    <a:bodyPr/>
+                    <a:lstStyle/>
+                    <a:p>
+                      <a:pPr algn="r" fontAlgn="b"/>
+                      <a:r>
+                        <a:rPr lang="fr-FR" sz="1100" b="0" i="0" u="none" strike="noStrike">
+                          <a:solidFill>
+                            <a:srgbClr val="000000"/>
+                          </a:solidFill>
+                          <a:latin typeface="Calibri"/>
+                        </a:rPr>
+                        <a:t>19</a:t>
+                      </a:r>
+                    </a:p>
+                  </a:txBody>
+                  <a:tcPr marL="9525" marR="9525" marT="9525" marB="0" anchor="b"/>
+                </a:tc>
+                <a:tc>
+                  <a:txBody>
+                    <a:bodyPr/>
+                    <a:lstStyle/>
+                    <a:p>
+                      <a:pPr algn="r" fontAlgn="b"/>
+                      <a:r>
+                        <a:rPr lang="fr-FR" sz="1100" b="0" i="0" u="none" strike="noStrike">
+                          <a:solidFill>
+                            <a:srgbClr val="000000"/>
+                          </a:solidFill>
+                          <a:latin typeface="Calibri"/>
+                        </a:rPr>
+                        <a:t>22</a:t>
+                      </a:r>
+                    </a:p>
+                  </a:txBody>
+                  <a:tcPr marL="9525" marR="9525" marT="9525" marB="0" anchor="b"/>
+                </a:tc>
+                <a:tc>
+                  <a:txBody>
+                    <a:bodyPr/>
+                    <a:lstStyle/>
+                    <a:p>
+                      <a:pPr algn="r" fontAlgn="b"/>
+                      <a:r>
+                        <a:rPr lang="fr-FR" sz="1100" b="0" i="0" u="none" strike="noStrike">
+                          <a:solidFill>
+                            <a:srgbClr val="000000"/>
+                          </a:solidFill>
+                          <a:latin typeface="Calibri"/>
+                        </a:rPr>
+                        <a:t>20</a:t>
+                      </a:r>
+                    </a:p>
+                  </a:txBody>
+                  <a:tcPr marL="9525" marR="9525" marT="9525" marB="0" anchor="b"/>
+                </a:tc>
+                <a:tc>
+                  <a:txBody>
+                    <a:bodyPr/>
+                    <a:lstStyle/>
+                    <a:p>
+                      <a:pPr algn="r" fontAlgn="b"/>
+                      <a:r>
+                        <a:rPr lang="fr-FR" sz="1100" b="0" i="0" u="none" strike="noStrike">
+                          <a:solidFill>
+                            <a:srgbClr val="000000"/>
+                          </a:solidFill>
+                          <a:latin typeface="Calibri"/>
+                        </a:rPr>
+                        <a:t>17</a:t>
+                      </a:r>
+                    </a:p>
+                  </a:txBody>
+                  <a:tcPr marL="9525" marR="9525" marT="9525" marB="0" anchor="b"/>
+                </a:tc>
+                <a:tc>
+                  <a:txBody>
+                    <a:bodyPr/>
+                    <a:lstStyle/>
+                    <a:p>
+                      <a:pPr algn="r" fontAlgn="b"/>
+                      <a:r>
+                        <a:rPr lang="fr-FR" sz="1100" b="0" i="0" u="none" strike="noStrike">
+                          <a:solidFill>
+                            <a:srgbClr val="000000"/>
+                          </a:solidFill>
+                          <a:latin typeface="Calibri"/>
+                        </a:rPr>
+                        <a:t>19</a:t>
+                      </a:r>
+                    </a:p>
+                  </a:txBody>
+                  <a:tcPr marL="9525" marR="9525" marT="9525" marB="0" anchor="b"/>
+                </a:tc>
+                <a:tc>
+                  <a:txBody>
+                    <a:bodyPr/>
+                    <a:lstStyle/>
+                    <a:p>
+                      <a:pPr algn="r" fontAlgn="b"/>
+                      <a:r>
+                        <a:rPr lang="fr-FR" sz="1100" b="0" i="0" u="none" strike="noStrike">
+                          <a:solidFill>
+                            <a:srgbClr val="000000"/>
+                          </a:solidFill>
+                          <a:latin typeface="Calibri"/>
+                        </a:rPr>
+                        <a:t>19</a:t>
+                      </a:r>
+                    </a:p>
+                  </a:txBody>
+                  <a:tcPr marL="9525" marR="9525" marT="9525" marB="0" anchor="b"/>
+                </a:tc>
+              </a:tr>
+              <a:tr h="370840">
+                <a:tc>
+                  <a:txBody>
+                    <a:bodyPr/>
+                    <a:lstStyle/>
+                    <a:p>
+                      <a:r>
+                        <a:rPr lang="fr-FR" sz="1000" smtClean="0"/>
+                        <a:t>15*110</a:t>
+                      </a:r>
+                      <a:endParaRPr lang="fr-FR" sz="1000" dirty="0"/>
                     </a:p>
                   </a:txBody>
                   <a:tcPr/>
@@ -17851,7 +19031,165 @@
                     <a:bodyPr/>
                     <a:lstStyle/>
                     <a:p>
-                      <a:endParaRPr lang="fr-FR"/>
+                      <a:pPr algn="r" fontAlgn="b"/>
+                      <a:r>
+                        <a:rPr lang="fr-FR" sz="1100" b="0" i="0" u="none" strike="noStrike">
+                          <a:solidFill>
+                            <a:srgbClr val="000000"/>
+                          </a:solidFill>
+                          <a:latin typeface="Calibri"/>
+                        </a:rPr>
+                        <a:t>186</a:t>
+                      </a:r>
+                    </a:p>
+                  </a:txBody>
+                  <a:tcPr marL="9525" marR="9525" marT="9525" marB="0" anchor="b"/>
+                </a:tc>
+                <a:tc>
+                  <a:txBody>
+                    <a:bodyPr/>
+                    <a:lstStyle/>
+                    <a:p>
+                      <a:pPr algn="r" fontAlgn="b"/>
+                      <a:r>
+                        <a:rPr lang="fr-FR" sz="1100" b="0" i="0" u="none" strike="noStrike">
+                          <a:solidFill>
+                            <a:srgbClr val="000000"/>
+                          </a:solidFill>
+                          <a:latin typeface="Calibri"/>
+                        </a:rPr>
+                        <a:t>48</a:t>
+                      </a:r>
+                    </a:p>
+                  </a:txBody>
+                  <a:tcPr marL="9525" marR="9525" marT="9525" marB="0" anchor="b"/>
+                </a:tc>
+                <a:tc>
+                  <a:txBody>
+                    <a:bodyPr/>
+                    <a:lstStyle/>
+                    <a:p>
+                      <a:pPr algn="r" fontAlgn="b"/>
+                      <a:r>
+                        <a:rPr lang="fr-FR" sz="1100" b="0" i="0" u="none" strike="noStrike">
+                          <a:solidFill>
+                            <a:srgbClr val="000000"/>
+                          </a:solidFill>
+                          <a:latin typeface="Calibri"/>
+                        </a:rPr>
+                        <a:t>42</a:t>
+                      </a:r>
+                    </a:p>
+                  </a:txBody>
+                  <a:tcPr marL="9525" marR="9525" marT="9525" marB="0" anchor="b"/>
+                </a:tc>
+                <a:tc>
+                  <a:txBody>
+                    <a:bodyPr/>
+                    <a:lstStyle/>
+                    <a:p>
+                      <a:pPr algn="r" fontAlgn="b"/>
+                      <a:r>
+                        <a:rPr lang="fr-FR" sz="1100" b="0" i="0" u="none" strike="noStrike">
+                          <a:solidFill>
+                            <a:srgbClr val="000000"/>
+                          </a:solidFill>
+                          <a:latin typeface="Calibri"/>
+                        </a:rPr>
+                        <a:t>18</a:t>
+                      </a:r>
+                    </a:p>
+                  </a:txBody>
+                  <a:tcPr marL="9525" marR="9525" marT="9525" marB="0" anchor="b"/>
+                </a:tc>
+                <a:tc>
+                  <a:txBody>
+                    <a:bodyPr/>
+                    <a:lstStyle/>
+                    <a:p>
+                      <a:pPr algn="r" fontAlgn="b"/>
+                      <a:r>
+                        <a:rPr lang="fr-FR" sz="1100" b="0" i="0" u="none" strike="noStrike">
+                          <a:solidFill>
+                            <a:srgbClr val="000000"/>
+                          </a:solidFill>
+                          <a:latin typeface="Calibri"/>
+                        </a:rPr>
+                        <a:t>28</a:t>
+                      </a:r>
+                    </a:p>
+                  </a:txBody>
+                  <a:tcPr marL="9525" marR="9525" marT="9525" marB="0" anchor="b"/>
+                </a:tc>
+                <a:tc>
+                  <a:txBody>
+                    <a:bodyPr/>
+                    <a:lstStyle/>
+                    <a:p>
+                      <a:pPr algn="r" fontAlgn="b"/>
+                      <a:r>
+                        <a:rPr lang="fr-FR" sz="1100" b="0" i="0" u="none" strike="noStrike">
+                          <a:solidFill>
+                            <a:srgbClr val="000000"/>
+                          </a:solidFill>
+                          <a:latin typeface="Calibri"/>
+                        </a:rPr>
+                        <a:t>28</a:t>
+                      </a:r>
+                    </a:p>
+                  </a:txBody>
+                  <a:tcPr marL="9525" marR="9525" marT="9525" marB="0" anchor="b"/>
+                </a:tc>
+                <a:tc>
+                  <a:txBody>
+                    <a:bodyPr/>
+                    <a:lstStyle/>
+                    <a:p>
+                      <a:pPr algn="r" fontAlgn="b"/>
+                      <a:r>
+                        <a:rPr lang="fr-FR" sz="1100" b="0" i="0" u="none" strike="noStrike">
+                          <a:solidFill>
+                            <a:srgbClr val="000000"/>
+                          </a:solidFill>
+                          <a:latin typeface="Calibri"/>
+                        </a:rPr>
+                        <a:t>20</a:t>
+                      </a:r>
+                    </a:p>
+                  </a:txBody>
+                  <a:tcPr marL="9525" marR="9525" marT="9525" marB="0" anchor="b"/>
+                </a:tc>
+                <a:tc>
+                  <a:txBody>
+                    <a:bodyPr/>
+                    <a:lstStyle/>
+                    <a:p>
+                      <a:pPr algn="r" fontAlgn="b"/>
+                      <a:r>
+                        <a:rPr lang="fr-FR" sz="1100" b="0" i="0" u="none" strike="noStrike">
+                          <a:solidFill>
+                            <a:srgbClr val="000000"/>
+                          </a:solidFill>
+                          <a:latin typeface="Calibri"/>
+                        </a:rPr>
+                        <a:t>19</a:t>
+                      </a:r>
+                    </a:p>
+                  </a:txBody>
+                  <a:tcPr marL="9525" marR="9525" marT="9525" marB="0" anchor="b"/>
+                </a:tc>
+              </a:tr>
+              <a:tr h="370840">
+                <a:tc>
+                  <a:txBody>
+                    <a:bodyPr/>
+                    <a:lstStyle/>
+                    <a:p>
+                      <a:r>
+                        <a:rPr lang="fr-FR" sz="1000" dirty="0" smtClean="0"/>
+                        <a:t>20*160</a:t>
+                      </a:r>
+                      <a:endParaRPr lang="fr-FR" sz="1000" dirty="0"/>
                     </a:p>
                   </a:txBody>
                   <a:tcPr/>
@@ -17861,7 +19199,165 @@
                     <a:bodyPr/>
                     <a:lstStyle/>
                     <a:p>
-                      <a:endParaRPr lang="fr-FR"/>
+                      <a:pPr algn="r" fontAlgn="b"/>
+                      <a:r>
+                        <a:rPr lang="fr-FR" sz="1100" b="0" i="0" u="none" strike="noStrike">
+                          <a:solidFill>
+                            <a:srgbClr val="000000"/>
+                          </a:solidFill>
+                          <a:latin typeface="Calibri"/>
+                        </a:rPr>
+                        <a:t>213</a:t>
+                      </a:r>
+                    </a:p>
+                  </a:txBody>
+                  <a:tcPr marL="9525" marR="9525" marT="9525" marB="0" anchor="b"/>
+                </a:tc>
+                <a:tc>
+                  <a:txBody>
+                    <a:bodyPr/>
+                    <a:lstStyle/>
+                    <a:p>
+                      <a:pPr algn="r" fontAlgn="b"/>
+                      <a:r>
+                        <a:rPr lang="fr-FR" sz="1100" b="0" i="0" u="none" strike="noStrike">
+                          <a:solidFill>
+                            <a:srgbClr val="000000"/>
+                          </a:solidFill>
+                          <a:latin typeface="Calibri"/>
+                        </a:rPr>
+                        <a:t>100</a:t>
+                      </a:r>
+                    </a:p>
+                  </a:txBody>
+                  <a:tcPr marL="9525" marR="9525" marT="9525" marB="0" anchor="b"/>
+                </a:tc>
+                <a:tc>
+                  <a:txBody>
+                    <a:bodyPr/>
+                    <a:lstStyle/>
+                    <a:p>
+                      <a:pPr algn="r" fontAlgn="b"/>
+                      <a:r>
+                        <a:rPr lang="fr-FR" sz="1100" b="0" i="0" u="none" strike="noStrike">
+                          <a:solidFill>
+                            <a:srgbClr val="000000"/>
+                          </a:solidFill>
+                          <a:latin typeface="Calibri"/>
+                        </a:rPr>
+                        <a:t>55</a:t>
+                      </a:r>
+                    </a:p>
+                  </a:txBody>
+                  <a:tcPr marL="9525" marR="9525" marT="9525" marB="0" anchor="b"/>
+                </a:tc>
+                <a:tc>
+                  <a:txBody>
+                    <a:bodyPr/>
+                    <a:lstStyle/>
+                    <a:p>
+                      <a:pPr algn="r" fontAlgn="b"/>
+                      <a:r>
+                        <a:rPr lang="fr-FR" sz="1100" b="0" i="0" u="none" strike="noStrike">
+                          <a:solidFill>
+                            <a:srgbClr val="000000"/>
+                          </a:solidFill>
+                          <a:latin typeface="Calibri"/>
+                        </a:rPr>
+                        <a:t>31</a:t>
+                      </a:r>
+                    </a:p>
+                  </a:txBody>
+                  <a:tcPr marL="9525" marR="9525" marT="9525" marB="0" anchor="b"/>
+                </a:tc>
+                <a:tc>
+                  <a:txBody>
+                    <a:bodyPr/>
+                    <a:lstStyle/>
+                    <a:p>
+                      <a:pPr algn="r" fontAlgn="b"/>
+                      <a:r>
+                        <a:rPr lang="fr-FR" sz="1100" b="0" i="0" u="none" strike="noStrike">
+                          <a:solidFill>
+                            <a:srgbClr val="000000"/>
+                          </a:solidFill>
+                          <a:latin typeface="Calibri"/>
+                        </a:rPr>
+                        <a:t>22</a:t>
+                      </a:r>
+                    </a:p>
+                  </a:txBody>
+                  <a:tcPr marL="9525" marR="9525" marT="9525" marB="0" anchor="b"/>
+                </a:tc>
+                <a:tc>
+                  <a:txBody>
+                    <a:bodyPr/>
+                    <a:lstStyle/>
+                    <a:p>
+                      <a:pPr algn="r" fontAlgn="b"/>
+                      <a:r>
+                        <a:rPr lang="fr-FR" sz="1100" b="0" i="0" u="none" strike="noStrike">
+                          <a:solidFill>
+                            <a:srgbClr val="000000"/>
+                          </a:solidFill>
+                          <a:latin typeface="Calibri"/>
+                        </a:rPr>
+                        <a:t>32</a:t>
+                      </a:r>
+                    </a:p>
+                  </a:txBody>
+                  <a:tcPr marL="9525" marR="9525" marT="9525" marB="0" anchor="b"/>
+                </a:tc>
+                <a:tc>
+                  <a:txBody>
+                    <a:bodyPr/>
+                    <a:lstStyle/>
+                    <a:p>
+                      <a:pPr algn="r" fontAlgn="b"/>
+                      <a:r>
+                        <a:rPr lang="fr-FR" sz="1100" b="0" i="0" u="none" strike="noStrike">
+                          <a:solidFill>
+                            <a:srgbClr val="000000"/>
+                          </a:solidFill>
+                          <a:latin typeface="Calibri"/>
+                        </a:rPr>
+                        <a:t>23</a:t>
+                      </a:r>
+                    </a:p>
+                  </a:txBody>
+                  <a:tcPr marL="9525" marR="9525" marT="9525" marB="0" anchor="b"/>
+                </a:tc>
+                <a:tc>
+                  <a:txBody>
+                    <a:bodyPr/>
+                    <a:lstStyle/>
+                    <a:p>
+                      <a:pPr algn="r" fontAlgn="b"/>
+                      <a:r>
+                        <a:rPr lang="fr-FR" sz="1100" b="0" i="0" u="none" strike="noStrike">
+                          <a:solidFill>
+                            <a:srgbClr val="000000"/>
+                          </a:solidFill>
+                          <a:latin typeface="Calibri"/>
+                        </a:rPr>
+                        <a:t>30</a:t>
+                      </a:r>
+                    </a:p>
+                  </a:txBody>
+                  <a:tcPr marL="9525" marR="9525" marT="9525" marB="0" anchor="b"/>
+                </a:tc>
+              </a:tr>
+              <a:tr h="370840">
+                <a:tc>
+                  <a:txBody>
+                    <a:bodyPr/>
+                    <a:lstStyle/>
+                    <a:p>
+                      <a:r>
+                        <a:rPr lang="fr-FR" sz="1000" dirty="0" smtClean="0"/>
+                        <a:t>25*210</a:t>
+                      </a:r>
+                      <a:endParaRPr lang="fr-FR" sz="1000" dirty="0"/>
                     </a:p>
                   </a:txBody>
                   <a:tcPr/>
@@ -17871,7 +19367,165 @@
                     <a:bodyPr/>
                     <a:lstStyle/>
                     <a:p>
-                      <a:endParaRPr lang="fr-FR"/>
+                      <a:pPr algn="r" fontAlgn="b"/>
+                      <a:r>
+                        <a:rPr lang="fr-FR" sz="1100" b="0" i="0" u="none" strike="noStrike">
+                          <a:solidFill>
+                            <a:srgbClr val="000000"/>
+                          </a:solidFill>
+                          <a:latin typeface="Calibri"/>
+                        </a:rPr>
+                        <a:t>323</a:t>
+                      </a:r>
+                    </a:p>
+                  </a:txBody>
+                  <a:tcPr marL="9525" marR="9525" marT="9525" marB="0" anchor="b"/>
+                </a:tc>
+                <a:tc>
+                  <a:txBody>
+                    <a:bodyPr/>
+                    <a:lstStyle/>
+                    <a:p>
+                      <a:pPr algn="r" fontAlgn="b"/>
+                      <a:r>
+                        <a:rPr lang="fr-FR" sz="1100" b="0" i="0" u="none" strike="noStrike">
+                          <a:solidFill>
+                            <a:srgbClr val="000000"/>
+                          </a:solidFill>
+                          <a:latin typeface="Calibri"/>
+                        </a:rPr>
+                        <a:t>138</a:t>
+                      </a:r>
+                    </a:p>
+                  </a:txBody>
+                  <a:tcPr marL="9525" marR="9525" marT="9525" marB="0" anchor="b"/>
+                </a:tc>
+                <a:tc>
+                  <a:txBody>
+                    <a:bodyPr/>
+                    <a:lstStyle/>
+                    <a:p>
+                      <a:pPr algn="r" fontAlgn="b"/>
+                      <a:r>
+                        <a:rPr lang="fr-FR" sz="1100" b="0" i="0" u="none" strike="noStrike">
+                          <a:solidFill>
+                            <a:srgbClr val="000000"/>
+                          </a:solidFill>
+                          <a:latin typeface="Calibri"/>
+                        </a:rPr>
+                        <a:t>62</a:t>
+                      </a:r>
+                    </a:p>
+                  </a:txBody>
+                  <a:tcPr marL="9525" marR="9525" marT="9525" marB="0" anchor="b"/>
+                </a:tc>
+                <a:tc>
+                  <a:txBody>
+                    <a:bodyPr/>
+                    <a:lstStyle/>
+                    <a:p>
+                      <a:pPr algn="r" fontAlgn="b"/>
+                      <a:r>
+                        <a:rPr lang="fr-FR" sz="1100" b="0" i="0" u="none" strike="noStrike">
+                          <a:solidFill>
+                            <a:srgbClr val="000000"/>
+                          </a:solidFill>
+                          <a:latin typeface="Calibri"/>
+                        </a:rPr>
+                        <a:t>23</a:t>
+                      </a:r>
+                    </a:p>
+                  </a:txBody>
+                  <a:tcPr marL="9525" marR="9525" marT="9525" marB="0" anchor="b"/>
+                </a:tc>
+                <a:tc>
+                  <a:txBody>
+                    <a:bodyPr/>
+                    <a:lstStyle/>
+                    <a:p>
+                      <a:pPr algn="r" fontAlgn="b"/>
+                      <a:r>
+                        <a:rPr lang="fr-FR" sz="1100" b="0" i="0" u="none" strike="noStrike">
+                          <a:solidFill>
+                            <a:srgbClr val="000000"/>
+                          </a:solidFill>
+                          <a:latin typeface="Calibri"/>
+                        </a:rPr>
+                        <a:t>30</a:t>
+                      </a:r>
+                    </a:p>
+                  </a:txBody>
+                  <a:tcPr marL="9525" marR="9525" marT="9525" marB="0" anchor="b"/>
+                </a:tc>
+                <a:tc>
+                  <a:txBody>
+                    <a:bodyPr/>
+                    <a:lstStyle/>
+                    <a:p>
+                      <a:pPr algn="r" fontAlgn="b"/>
+                      <a:r>
+                        <a:rPr lang="fr-FR" sz="1100" b="0" i="0" u="none" strike="noStrike">
+                          <a:solidFill>
+                            <a:srgbClr val="000000"/>
+                          </a:solidFill>
+                          <a:latin typeface="Calibri"/>
+                        </a:rPr>
+                        <a:t>28</a:t>
+                      </a:r>
+                    </a:p>
+                  </a:txBody>
+                  <a:tcPr marL="9525" marR="9525" marT="9525" marB="0" anchor="b"/>
+                </a:tc>
+                <a:tc>
+                  <a:txBody>
+                    <a:bodyPr/>
+                    <a:lstStyle/>
+                    <a:p>
+                      <a:pPr algn="r" fontAlgn="b"/>
+                      <a:r>
+                        <a:rPr lang="fr-FR" sz="1100" b="0" i="0" u="none" strike="noStrike">
+                          <a:solidFill>
+                            <a:srgbClr val="000000"/>
+                          </a:solidFill>
+                          <a:latin typeface="Calibri"/>
+                        </a:rPr>
+                        <a:t>25</a:t>
+                      </a:r>
+                    </a:p>
+                  </a:txBody>
+                  <a:tcPr marL="9525" marR="9525" marT="9525" marB="0" anchor="b"/>
+                </a:tc>
+                <a:tc>
+                  <a:txBody>
+                    <a:bodyPr/>
+                    <a:lstStyle/>
+                    <a:p>
+                      <a:pPr algn="r" fontAlgn="b"/>
+                      <a:r>
+                        <a:rPr lang="fr-FR" sz="1100" b="0" i="0" u="none" strike="noStrike">
+                          <a:solidFill>
+                            <a:srgbClr val="000000"/>
+                          </a:solidFill>
+                          <a:latin typeface="Calibri"/>
+                        </a:rPr>
+                        <a:t>21</a:t>
+                      </a:r>
+                    </a:p>
+                  </a:txBody>
+                  <a:tcPr marL="9525" marR="9525" marT="9525" marB="0" anchor="b"/>
+                </a:tc>
+              </a:tr>
+              <a:tr h="370840">
+                <a:tc>
+                  <a:txBody>
+                    <a:bodyPr/>
+                    <a:lstStyle/>
+                    <a:p>
+                      <a:r>
+                        <a:rPr lang="fr-FR" sz="1000" dirty="0" smtClean="0"/>
+                        <a:t>30*260</a:t>
+                      </a:r>
+                      <a:endParaRPr lang="fr-FR" sz="1000" dirty="0"/>
                     </a:p>
                   </a:txBody>
                   <a:tcPr/>
@@ -17881,7 +19535,165 @@
                     <a:bodyPr/>
                     <a:lstStyle/>
                     <a:p>
-                      <a:endParaRPr lang="fr-FR"/>
+                      <a:pPr algn="r" fontAlgn="b"/>
+                      <a:r>
+                        <a:rPr lang="fr-FR" sz="1100" b="0" i="0" u="none" strike="noStrike">
+                          <a:solidFill>
+                            <a:srgbClr val="000000"/>
+                          </a:solidFill>
+                          <a:latin typeface="Calibri"/>
+                        </a:rPr>
+                        <a:t>372</a:t>
+                      </a:r>
+                    </a:p>
+                  </a:txBody>
+                  <a:tcPr marL="9525" marR="9525" marT="9525" marB="0" anchor="b"/>
+                </a:tc>
+                <a:tc>
+                  <a:txBody>
+                    <a:bodyPr/>
+                    <a:lstStyle/>
+                    <a:p>
+                      <a:pPr algn="r" fontAlgn="b"/>
+                      <a:r>
+                        <a:rPr lang="fr-FR" sz="1100" b="0" i="0" u="none" strike="noStrike">
+                          <a:solidFill>
+                            <a:srgbClr val="000000"/>
+                          </a:solidFill>
+                          <a:latin typeface="Calibri"/>
+                        </a:rPr>
+                        <a:t>302</a:t>
+                      </a:r>
+                    </a:p>
+                  </a:txBody>
+                  <a:tcPr marL="9525" marR="9525" marT="9525" marB="0" anchor="b"/>
+                </a:tc>
+                <a:tc>
+                  <a:txBody>
+                    <a:bodyPr/>
+                    <a:lstStyle/>
+                    <a:p>
+                      <a:pPr algn="r" fontAlgn="b"/>
+                      <a:r>
+                        <a:rPr lang="fr-FR" sz="1100" b="0" i="0" u="none" strike="noStrike">
+                          <a:solidFill>
+                            <a:srgbClr val="000000"/>
+                          </a:solidFill>
+                          <a:latin typeface="Calibri"/>
+                        </a:rPr>
+                        <a:t>59</a:t>
+                      </a:r>
+                    </a:p>
+                  </a:txBody>
+                  <a:tcPr marL="9525" marR="9525" marT="9525" marB="0" anchor="b"/>
+                </a:tc>
+                <a:tc>
+                  <a:txBody>
+                    <a:bodyPr/>
+                    <a:lstStyle/>
+                    <a:p>
+                      <a:pPr algn="r" fontAlgn="b"/>
+                      <a:r>
+                        <a:rPr lang="fr-FR" sz="1100" b="0" i="0" u="none" strike="noStrike">
+                          <a:solidFill>
+                            <a:srgbClr val="000000"/>
+                          </a:solidFill>
+                          <a:latin typeface="Calibri"/>
+                        </a:rPr>
+                        <a:t>23</a:t>
+                      </a:r>
+                    </a:p>
+                  </a:txBody>
+                  <a:tcPr marL="9525" marR="9525" marT="9525" marB="0" anchor="b"/>
+                </a:tc>
+                <a:tc>
+                  <a:txBody>
+                    <a:bodyPr/>
+                    <a:lstStyle/>
+                    <a:p>
+                      <a:pPr algn="r" fontAlgn="b"/>
+                      <a:r>
+                        <a:rPr lang="fr-FR" sz="1100" b="0" i="0" u="none" strike="noStrike">
+                          <a:solidFill>
+                            <a:srgbClr val="000000"/>
+                          </a:solidFill>
+                          <a:latin typeface="Calibri"/>
+                        </a:rPr>
+                        <a:t>24</a:t>
+                      </a:r>
+                    </a:p>
+                  </a:txBody>
+                  <a:tcPr marL="9525" marR="9525" marT="9525" marB="0" anchor="b"/>
+                </a:tc>
+                <a:tc>
+                  <a:txBody>
+                    <a:bodyPr/>
+                    <a:lstStyle/>
+                    <a:p>
+                      <a:pPr algn="r" fontAlgn="b"/>
+                      <a:r>
+                        <a:rPr lang="fr-FR" sz="1100" b="0" i="0" u="none" strike="noStrike">
+                          <a:solidFill>
+                            <a:srgbClr val="000000"/>
+                          </a:solidFill>
+                          <a:latin typeface="Calibri"/>
+                        </a:rPr>
+                        <a:t>24</a:t>
+                      </a:r>
+                    </a:p>
+                  </a:txBody>
+                  <a:tcPr marL="9525" marR="9525" marT="9525" marB="0" anchor="b"/>
+                </a:tc>
+                <a:tc>
+                  <a:txBody>
+                    <a:bodyPr/>
+                    <a:lstStyle/>
+                    <a:p>
+                      <a:pPr algn="r" fontAlgn="b"/>
+                      <a:r>
+                        <a:rPr lang="fr-FR" sz="1100" b="0" i="0" u="none" strike="noStrike">
+                          <a:solidFill>
+                            <a:srgbClr val="000000"/>
+                          </a:solidFill>
+                          <a:latin typeface="Calibri"/>
+                        </a:rPr>
+                        <a:t>26</a:t>
+                      </a:r>
+                    </a:p>
+                  </a:txBody>
+                  <a:tcPr marL="9525" marR="9525" marT="9525" marB="0" anchor="b"/>
+                </a:tc>
+                <a:tc>
+                  <a:txBody>
+                    <a:bodyPr/>
+                    <a:lstStyle/>
+                    <a:p>
+                      <a:pPr algn="r" fontAlgn="b"/>
+                      <a:r>
+                        <a:rPr lang="fr-FR" sz="1100" b="0" i="0" u="none" strike="noStrike">
+                          <a:solidFill>
+                            <a:srgbClr val="000000"/>
+                          </a:solidFill>
+                          <a:latin typeface="Calibri"/>
+                        </a:rPr>
+                        <a:t>31</a:t>
+                      </a:r>
+                    </a:p>
+                  </a:txBody>
+                  <a:tcPr marL="9525" marR="9525" marT="9525" marB="0" anchor="b"/>
+                </a:tc>
+              </a:tr>
+              <a:tr h="370840">
+                <a:tc>
+                  <a:txBody>
+                    <a:bodyPr/>
+                    <a:lstStyle/>
+                    <a:p>
+                      <a:r>
+                        <a:rPr lang="fr-FR" sz="1000" dirty="0" smtClean="0"/>
+                        <a:t>35*310</a:t>
+                      </a:r>
+                      <a:endParaRPr lang="fr-FR" sz="1000" dirty="0"/>
                     </a:p>
                   </a:txBody>
                   <a:tcPr/>
@@ -17891,7 +19703,165 @@
                     <a:bodyPr/>
                     <a:lstStyle/>
                     <a:p>
-                      <a:endParaRPr lang="fr-FR"/>
+                      <a:pPr algn="r" fontAlgn="b"/>
+                      <a:r>
+                        <a:rPr lang="fr-FR" sz="1100" b="0" i="0" u="none" strike="noStrike">
+                          <a:solidFill>
+                            <a:srgbClr val="000000"/>
+                          </a:solidFill>
+                          <a:latin typeface="Calibri"/>
+                        </a:rPr>
+                        <a:t>345</a:t>
+                      </a:r>
+                    </a:p>
+                  </a:txBody>
+                  <a:tcPr marL="9525" marR="9525" marT="9525" marB="0" anchor="b"/>
+                </a:tc>
+                <a:tc>
+                  <a:txBody>
+                    <a:bodyPr/>
+                    <a:lstStyle/>
+                    <a:p>
+                      <a:pPr algn="r" fontAlgn="b"/>
+                      <a:r>
+                        <a:rPr lang="fr-FR" sz="1100" b="0" i="0" u="none" strike="noStrike">
+                          <a:solidFill>
+                            <a:srgbClr val="000000"/>
+                          </a:solidFill>
+                          <a:latin typeface="Calibri"/>
+                        </a:rPr>
+                        <a:t>203</a:t>
+                      </a:r>
+                    </a:p>
+                  </a:txBody>
+                  <a:tcPr marL="9525" marR="9525" marT="9525" marB="0" anchor="b"/>
+                </a:tc>
+                <a:tc>
+                  <a:txBody>
+                    <a:bodyPr/>
+                    <a:lstStyle/>
+                    <a:p>
+                      <a:pPr algn="r" fontAlgn="b"/>
+                      <a:r>
+                        <a:rPr lang="fr-FR" sz="1100" b="0" i="0" u="none" strike="noStrike">
+                          <a:solidFill>
+                            <a:srgbClr val="000000"/>
+                          </a:solidFill>
+                          <a:latin typeface="Calibri"/>
+                        </a:rPr>
+                        <a:t>81</a:t>
+                      </a:r>
+                    </a:p>
+                  </a:txBody>
+                  <a:tcPr marL="9525" marR="9525" marT="9525" marB="0" anchor="b"/>
+                </a:tc>
+                <a:tc>
+                  <a:txBody>
+                    <a:bodyPr/>
+                    <a:lstStyle/>
+                    <a:p>
+                      <a:pPr algn="r" fontAlgn="b"/>
+                      <a:r>
+                        <a:rPr lang="fr-FR" sz="1100" b="0" i="0" u="none" strike="noStrike">
+                          <a:solidFill>
+                            <a:srgbClr val="000000"/>
+                          </a:solidFill>
+                          <a:latin typeface="Calibri"/>
+                        </a:rPr>
+                        <a:t>43</a:t>
+                      </a:r>
+                    </a:p>
+                  </a:txBody>
+                  <a:tcPr marL="9525" marR="9525" marT="9525" marB="0" anchor="b"/>
+                </a:tc>
+                <a:tc>
+                  <a:txBody>
+                    <a:bodyPr/>
+                    <a:lstStyle/>
+                    <a:p>
+                      <a:pPr algn="r" fontAlgn="b"/>
+                      <a:r>
+                        <a:rPr lang="fr-FR" sz="1100" b="0" i="0" u="none" strike="noStrike">
+                          <a:solidFill>
+                            <a:srgbClr val="000000"/>
+                          </a:solidFill>
+                          <a:latin typeface="Calibri"/>
+                        </a:rPr>
+                        <a:t>35</a:t>
+                      </a:r>
+                    </a:p>
+                  </a:txBody>
+                  <a:tcPr marL="9525" marR="9525" marT="9525" marB="0" anchor="b"/>
+                </a:tc>
+                <a:tc>
+                  <a:txBody>
+                    <a:bodyPr/>
+                    <a:lstStyle/>
+                    <a:p>
+                      <a:pPr algn="r" fontAlgn="b"/>
+                      <a:r>
+                        <a:rPr lang="fr-FR" sz="1100" b="0" i="0" u="none" strike="noStrike">
+                          <a:solidFill>
+                            <a:srgbClr val="000000"/>
+                          </a:solidFill>
+                          <a:latin typeface="Calibri"/>
+                        </a:rPr>
+                        <a:t>30</a:t>
+                      </a:r>
+                    </a:p>
+                  </a:txBody>
+                  <a:tcPr marL="9525" marR="9525" marT="9525" marB="0" anchor="b"/>
+                </a:tc>
+                <a:tc>
+                  <a:txBody>
+                    <a:bodyPr/>
+                    <a:lstStyle/>
+                    <a:p>
+                      <a:pPr algn="r" fontAlgn="b"/>
+                      <a:r>
+                        <a:rPr lang="fr-FR" sz="1100" b="0" i="0" u="none" strike="noStrike">
+                          <a:solidFill>
+                            <a:srgbClr val="000000"/>
+                          </a:solidFill>
+                          <a:latin typeface="Calibri"/>
+                        </a:rPr>
+                        <a:t>28</a:t>
+                      </a:r>
+                    </a:p>
+                  </a:txBody>
+                  <a:tcPr marL="9525" marR="9525" marT="9525" marB="0" anchor="b"/>
+                </a:tc>
+                <a:tc>
+                  <a:txBody>
+                    <a:bodyPr/>
+                    <a:lstStyle/>
+                    <a:p>
+                      <a:pPr algn="r" fontAlgn="b"/>
+                      <a:r>
+                        <a:rPr lang="fr-FR" sz="1100" b="0" i="0" u="none" strike="noStrike">
+                          <a:solidFill>
+                            <a:srgbClr val="000000"/>
+                          </a:solidFill>
+                          <a:latin typeface="Calibri"/>
+                        </a:rPr>
+                        <a:t>39</a:t>
+                      </a:r>
+                    </a:p>
+                  </a:txBody>
+                  <a:tcPr marL="9525" marR="9525" marT="9525" marB="0" anchor="b"/>
+                </a:tc>
+              </a:tr>
+              <a:tr h="370840">
+                <a:tc>
+                  <a:txBody>
+                    <a:bodyPr/>
+                    <a:lstStyle/>
+                    <a:p>
+                      <a:r>
+                        <a:rPr lang="fr-FR" sz="1000" dirty="0" smtClean="0"/>
+                        <a:t>40*360</a:t>
+                      </a:r>
+                      <a:endParaRPr lang="fr-FR" sz="1000" dirty="0"/>
                     </a:p>
                   </a:txBody>
                   <a:tcPr/>
@@ -17901,7 +19871,165 @@
                     <a:bodyPr/>
                     <a:lstStyle/>
                     <a:p>
-                      <a:endParaRPr lang="fr-FR"/>
+                      <a:pPr algn="r" fontAlgn="b"/>
+                      <a:r>
+                        <a:rPr lang="fr-FR" sz="1100" b="0" i="0" u="none" strike="noStrike">
+                          <a:solidFill>
+                            <a:srgbClr val="000000"/>
+                          </a:solidFill>
+                          <a:latin typeface="Calibri"/>
+                        </a:rPr>
+                        <a:t>493</a:t>
+                      </a:r>
+                    </a:p>
+                  </a:txBody>
+                  <a:tcPr marL="9525" marR="9525" marT="9525" marB="0" anchor="b"/>
+                </a:tc>
+                <a:tc>
+                  <a:txBody>
+                    <a:bodyPr/>
+                    <a:lstStyle/>
+                    <a:p>
+                      <a:pPr algn="r" fontAlgn="b"/>
+                      <a:r>
+                        <a:rPr lang="fr-FR" sz="1100" b="0" i="0" u="none" strike="noStrike">
+                          <a:solidFill>
+                            <a:srgbClr val="000000"/>
+                          </a:solidFill>
+                          <a:latin typeface="Calibri"/>
+                        </a:rPr>
+                        <a:t>255</a:t>
+                      </a:r>
+                    </a:p>
+                  </a:txBody>
+                  <a:tcPr marL="9525" marR="9525" marT="9525" marB="0" anchor="b"/>
+                </a:tc>
+                <a:tc>
+                  <a:txBody>
+                    <a:bodyPr/>
+                    <a:lstStyle/>
+                    <a:p>
+                      <a:pPr algn="r" fontAlgn="b"/>
+                      <a:r>
+                        <a:rPr lang="fr-FR" sz="1100" b="0" i="0" u="none" strike="noStrike">
+                          <a:solidFill>
+                            <a:srgbClr val="000000"/>
+                          </a:solidFill>
+                          <a:latin typeface="Calibri"/>
+                        </a:rPr>
+                        <a:t>102</a:t>
+                      </a:r>
+                    </a:p>
+                  </a:txBody>
+                  <a:tcPr marL="9525" marR="9525" marT="9525" marB="0" anchor="b"/>
+                </a:tc>
+                <a:tc>
+                  <a:txBody>
+                    <a:bodyPr/>
+                    <a:lstStyle/>
+                    <a:p>
+                      <a:pPr algn="r" fontAlgn="b"/>
+                      <a:r>
+                        <a:rPr lang="fr-FR" sz="1100" b="0" i="0" u="none" strike="noStrike">
+                          <a:solidFill>
+                            <a:srgbClr val="000000"/>
+                          </a:solidFill>
+                          <a:latin typeface="Calibri"/>
+                        </a:rPr>
+                        <a:t>50</a:t>
+                      </a:r>
+                    </a:p>
+                  </a:txBody>
+                  <a:tcPr marL="9525" marR="9525" marT="9525" marB="0" anchor="b"/>
+                </a:tc>
+                <a:tc>
+                  <a:txBody>
+                    <a:bodyPr/>
+                    <a:lstStyle/>
+                    <a:p>
+                      <a:pPr algn="r" fontAlgn="b"/>
+                      <a:r>
+                        <a:rPr lang="fr-FR" sz="1100" b="0" i="0" u="none" strike="noStrike">
+                          <a:solidFill>
+                            <a:srgbClr val="000000"/>
+                          </a:solidFill>
+                          <a:latin typeface="Calibri"/>
+                        </a:rPr>
+                        <a:t>37</a:t>
+                      </a:r>
+                    </a:p>
+                  </a:txBody>
+                  <a:tcPr marL="9525" marR="9525" marT="9525" marB="0" anchor="b"/>
+                </a:tc>
+                <a:tc>
+                  <a:txBody>
+                    <a:bodyPr/>
+                    <a:lstStyle/>
+                    <a:p>
+                      <a:pPr algn="r" fontAlgn="b"/>
+                      <a:r>
+                        <a:rPr lang="fr-FR" sz="1100" b="0" i="0" u="none" strike="noStrike">
+                          <a:solidFill>
+                            <a:srgbClr val="000000"/>
+                          </a:solidFill>
+                          <a:latin typeface="Calibri"/>
+                        </a:rPr>
+                        <a:t>34</a:t>
+                      </a:r>
+                    </a:p>
+                  </a:txBody>
+                  <a:tcPr marL="9525" marR="9525" marT="9525" marB="0" anchor="b"/>
+                </a:tc>
+                <a:tc>
+                  <a:txBody>
+                    <a:bodyPr/>
+                    <a:lstStyle/>
+                    <a:p>
+                      <a:pPr algn="r" fontAlgn="b"/>
+                      <a:r>
+                        <a:rPr lang="fr-FR" sz="1100" b="0" i="0" u="none" strike="noStrike">
+                          <a:solidFill>
+                            <a:srgbClr val="000000"/>
+                          </a:solidFill>
+                          <a:latin typeface="Calibri"/>
+                        </a:rPr>
+                        <a:t>24</a:t>
+                      </a:r>
+                    </a:p>
+                  </a:txBody>
+                  <a:tcPr marL="9525" marR="9525" marT="9525" marB="0" anchor="b"/>
+                </a:tc>
+                <a:tc>
+                  <a:txBody>
+                    <a:bodyPr/>
+                    <a:lstStyle/>
+                    <a:p>
+                      <a:pPr algn="r" fontAlgn="b"/>
+                      <a:r>
+                        <a:rPr lang="fr-FR" sz="1100" b="0" i="0" u="none" strike="noStrike">
+                          <a:solidFill>
+                            <a:srgbClr val="000000"/>
+                          </a:solidFill>
+                          <a:latin typeface="Calibri"/>
+                        </a:rPr>
+                        <a:t>98</a:t>
+                      </a:r>
+                    </a:p>
+                  </a:txBody>
+                  <a:tcPr marL="9525" marR="9525" marT="9525" marB="0" anchor="b"/>
+                </a:tc>
+              </a:tr>
+              <a:tr h="370840">
+                <a:tc>
+                  <a:txBody>
+                    <a:bodyPr/>
+                    <a:lstStyle/>
+                    <a:p>
+                      <a:r>
+                        <a:rPr lang="fr-FR" sz="1000" dirty="0" smtClean="0"/>
+                        <a:t>45*410</a:t>
+                      </a:r>
+                      <a:endParaRPr lang="fr-FR" sz="1000" dirty="0"/>
                     </a:p>
                   </a:txBody>
                   <a:tcPr/>
@@ -17911,10 +20039,152 @@
                     <a:bodyPr/>
                     <a:lstStyle/>
                     <a:p>
-                      <a:endParaRPr lang="fr-FR"/>
+                      <a:pPr algn="r" fontAlgn="b"/>
+                      <a:r>
+                        <a:rPr lang="fr-FR" sz="1100" b="0" i="0" u="none" strike="noStrike">
+                          <a:solidFill>
+                            <a:srgbClr val="000000"/>
+                          </a:solidFill>
+                          <a:latin typeface="Calibri"/>
+                        </a:rPr>
+                        <a:t>726</a:t>
+                      </a:r>
                     </a:p>
                   </a:txBody>
-                  <a:tcPr/>
+                  <a:tcPr marL="9525" marR="9525" marT="9525" marB="0" anchor="b"/>
+                </a:tc>
+                <a:tc>
+                  <a:txBody>
+                    <a:bodyPr/>
+                    <a:lstStyle/>
+                    <a:p>
+                      <a:pPr algn="r" fontAlgn="b"/>
+                      <a:r>
+                        <a:rPr lang="fr-FR" sz="1100" b="0" i="0" u="none" strike="noStrike">
+                          <a:solidFill>
+                            <a:srgbClr val="000000"/>
+                          </a:solidFill>
+                          <a:latin typeface="Calibri"/>
+                        </a:rPr>
+                        <a:t>369</a:t>
+                      </a:r>
+                    </a:p>
+                  </a:txBody>
+                  <a:tcPr marL="9525" marR="9525" marT="9525" marB="0" anchor="b"/>
+                </a:tc>
+                <a:tc>
+                  <a:txBody>
+                    <a:bodyPr/>
+                    <a:lstStyle/>
+                    <a:p>
+                      <a:pPr algn="r" fontAlgn="b"/>
+                      <a:r>
+                        <a:rPr lang="fr-FR" sz="1100" b="0" i="0" u="none" strike="noStrike">
+                          <a:solidFill>
+                            <a:srgbClr val="000000"/>
+                          </a:solidFill>
+                          <a:latin typeface="Calibri"/>
+                        </a:rPr>
+                        <a:t>111</a:t>
+                      </a:r>
+                    </a:p>
+                  </a:txBody>
+                  <a:tcPr marL="9525" marR="9525" marT="9525" marB="0" anchor="b"/>
+                </a:tc>
+                <a:tc>
+                  <a:txBody>
+                    <a:bodyPr/>
+                    <a:lstStyle/>
+                    <a:p>
+                      <a:pPr algn="r" fontAlgn="b"/>
+                      <a:r>
+                        <a:rPr lang="fr-FR" sz="1100" b="0" i="0" u="none" strike="noStrike">
+                          <a:solidFill>
+                            <a:srgbClr val="000000"/>
+                          </a:solidFill>
+                          <a:latin typeface="Calibri"/>
+                        </a:rPr>
+                        <a:t>41</a:t>
+                      </a:r>
+                    </a:p>
+                  </a:txBody>
+                  <a:tcPr marL="9525" marR="9525" marT="9525" marB="0" anchor="b"/>
+                </a:tc>
+                <a:tc>
+                  <a:txBody>
+                    <a:bodyPr/>
+                    <a:lstStyle/>
+                    <a:p>
+                      <a:pPr algn="r" fontAlgn="b"/>
+                      <a:r>
+                        <a:rPr lang="fr-FR" sz="1100" b="0" i="0" u="none" strike="noStrike">
+                          <a:solidFill>
+                            <a:srgbClr val="000000"/>
+                          </a:solidFill>
+                          <a:latin typeface="Calibri"/>
+                        </a:rPr>
+                        <a:t>38</a:t>
+                      </a:r>
+                    </a:p>
+                  </a:txBody>
+                  <a:tcPr marL="9525" marR="9525" marT="9525" marB="0" anchor="b"/>
+                </a:tc>
+                <a:tc>
+                  <a:txBody>
+                    <a:bodyPr/>
+                    <a:lstStyle/>
+                    <a:p>
+                      <a:pPr algn="r" fontAlgn="b"/>
+                      <a:r>
+                        <a:rPr lang="fr-FR" sz="1100" b="0" i="0" u="none" strike="noStrike">
+                          <a:solidFill>
+                            <a:srgbClr val="000000"/>
+                          </a:solidFill>
+                          <a:latin typeface="Calibri"/>
+                        </a:rPr>
+                        <a:t>35</a:t>
+                      </a:r>
+                    </a:p>
+                  </a:txBody>
+                  <a:tcPr marL="9525" marR="9525" marT="9525" marB="0" anchor="b"/>
+                </a:tc>
+                <a:tc>
+                  <a:txBody>
+                    <a:bodyPr/>
+                    <a:lstStyle/>
+                    <a:p>
+                      <a:pPr algn="r" fontAlgn="b"/>
+                      <a:r>
+                        <a:rPr lang="fr-FR" sz="1100" b="0" i="0" u="none" strike="noStrike">
+                          <a:solidFill>
+                            <a:srgbClr val="000000"/>
+                          </a:solidFill>
+                          <a:latin typeface="Calibri"/>
+                        </a:rPr>
+                        <a:t>33</a:t>
+                      </a:r>
+                    </a:p>
+                  </a:txBody>
+                  <a:tcPr marL="9525" marR="9525" marT="9525" marB="0" anchor="b"/>
+                </a:tc>
+                <a:tc>
+                  <a:txBody>
+                    <a:bodyPr/>
+                    <a:lstStyle/>
+                    <a:p>
+                      <a:pPr algn="r" fontAlgn="b"/>
+                      <a:r>
+                        <a:rPr lang="fr-FR" sz="1100" b="0" i="0" u="none" strike="noStrike">
+                          <a:solidFill>
+                            <a:srgbClr val="000000"/>
+                          </a:solidFill>
+                          <a:latin typeface="Calibri"/>
+                        </a:rPr>
+                        <a:t>65</a:t>
+                      </a:r>
+                    </a:p>
+                  </a:txBody>
+                  <a:tcPr marL="9525" marR="9525" marT="9525" marB="0" anchor="b"/>
                 </a:tc>
               </a:tr>
               <a:tr h="370840">
@@ -17923,7 +20193,11 @@
                     <a:bodyPr/>
                     <a:lstStyle/>
                     <a:p>
-                      <a:endParaRPr lang="fr-FR"/>
+                      <a:r>
+                        <a:rPr lang="fr-FR" sz="1000" dirty="0" smtClean="0"/>
+                        <a:t>50*460</a:t>
+                      </a:r>
+                      <a:endParaRPr lang="fr-FR" sz="1000" dirty="0"/>
                     </a:p>
                   </a:txBody>
                   <a:tcPr/>
@@ -17933,804 +20207,152 @@
                     <a:bodyPr/>
                     <a:lstStyle/>
                     <a:p>
-                      <a:endParaRPr lang="fr-FR"/>
+                      <a:pPr algn="r" fontAlgn="b"/>
+                      <a:r>
+                        <a:rPr lang="fr-FR" sz="1100" b="0" i="0" u="none" strike="noStrike">
+                          <a:solidFill>
+                            <a:srgbClr val="000000"/>
+                          </a:solidFill>
+                          <a:latin typeface="Calibri"/>
+                        </a:rPr>
+                        <a:t>660</a:t>
+                      </a:r>
                     </a:p>
                   </a:txBody>
-                  <a:tcPr/>
+                  <a:tcPr marL="9525" marR="9525" marT="9525" marB="0" anchor="b"/>
                 </a:tc>
                 <a:tc>
                   <a:txBody>
                     <a:bodyPr/>
                     <a:lstStyle/>
                     <a:p>
-                      <a:endParaRPr lang="fr-FR"/>
+                      <a:pPr algn="r" fontAlgn="b"/>
+                      <a:r>
+                        <a:rPr lang="fr-FR" sz="1100" b="0" i="0" u="none" strike="noStrike">
+                          <a:solidFill>
+                            <a:srgbClr val="000000"/>
+                          </a:solidFill>
+                          <a:latin typeface="Calibri"/>
+                        </a:rPr>
+                        <a:t>483</a:t>
+                      </a:r>
                     </a:p>
                   </a:txBody>
-                  <a:tcPr/>
+                  <a:tcPr marL="9525" marR="9525" marT="9525" marB="0" anchor="b"/>
                 </a:tc>
                 <a:tc>
                   <a:txBody>
                     <a:bodyPr/>
                     <a:lstStyle/>
                     <a:p>
-                      <a:endParaRPr lang="fr-FR"/>
+                      <a:pPr algn="r" fontAlgn="b"/>
+                      <a:r>
+                        <a:rPr lang="fr-FR" sz="1100" b="0" i="0" u="none" strike="noStrike">
+                          <a:solidFill>
+                            <a:srgbClr val="000000"/>
+                          </a:solidFill>
+                          <a:latin typeface="Calibri"/>
+                        </a:rPr>
+                        <a:t>120</a:t>
+                      </a:r>
                     </a:p>
                   </a:txBody>
-                  <a:tcPr/>
+                  <a:tcPr marL="9525" marR="9525" marT="9525" marB="0" anchor="b"/>
                 </a:tc>
                 <a:tc>
                   <a:txBody>
                     <a:bodyPr/>
                     <a:lstStyle/>
                     <a:p>
-                      <a:endParaRPr lang="fr-FR"/>
+                      <a:pPr algn="r" fontAlgn="b"/>
+                      <a:r>
+                        <a:rPr lang="fr-FR" sz="1100" b="0" i="0" u="none" strike="noStrike">
+                          <a:solidFill>
+                            <a:srgbClr val="000000"/>
+                          </a:solidFill>
+                          <a:latin typeface="Calibri"/>
+                        </a:rPr>
+                        <a:t>32</a:t>
+                      </a:r>
                     </a:p>
                   </a:txBody>
-                  <a:tcPr/>
+                  <a:tcPr marL="9525" marR="9525" marT="9525" marB="0" anchor="b"/>
                 </a:tc>
                 <a:tc>
                   <a:txBody>
                     <a:bodyPr/>
                     <a:lstStyle/>
                     <a:p>
-                      <a:endParaRPr lang="fr-FR"/>
+                      <a:pPr algn="r" fontAlgn="b"/>
+                      <a:r>
+                        <a:rPr lang="fr-FR" sz="1100" b="0" i="0" u="none" strike="noStrike">
+                          <a:solidFill>
+                            <a:srgbClr val="000000"/>
+                          </a:solidFill>
+                          <a:latin typeface="Calibri"/>
+                        </a:rPr>
+                        <a:t>45</a:t>
+                      </a:r>
                     </a:p>
                   </a:txBody>
-                  <a:tcPr/>
+                  <a:tcPr marL="9525" marR="9525" marT="9525" marB="0" anchor="b"/>
                 </a:tc>
                 <a:tc>
                   <a:txBody>
                     <a:bodyPr/>
                     <a:lstStyle/>
                     <a:p>
-                      <a:endParaRPr lang="fr-FR"/>
+                      <a:pPr algn="r" fontAlgn="b"/>
+                      <a:r>
+                        <a:rPr lang="fr-FR" sz="1100" b="0" i="0" u="none" strike="noStrike">
+                          <a:solidFill>
+                            <a:srgbClr val="000000"/>
+                          </a:solidFill>
+                          <a:latin typeface="Calibri"/>
+                        </a:rPr>
+                        <a:t>43</a:t>
+                      </a:r>
                     </a:p>
                   </a:txBody>
-                  <a:tcPr/>
+                  <a:tcPr marL="9525" marR="9525" marT="9525" marB="0" anchor="b"/>
                 </a:tc>
                 <a:tc>
                   <a:txBody>
                     <a:bodyPr/>
                     <a:lstStyle/>
                     <a:p>
-                      <a:endParaRPr lang="fr-FR"/>
+                      <a:pPr algn="r" fontAlgn="b"/>
+                      <a:r>
+                        <a:rPr lang="fr-FR" sz="1100" b="0" i="0" u="none" strike="noStrike">
+                          <a:solidFill>
+                            <a:srgbClr val="000000"/>
+                          </a:solidFill>
+                          <a:latin typeface="Calibri"/>
+                        </a:rPr>
+                        <a:t>32</a:t>
+                      </a:r>
                     </a:p>
                   </a:txBody>
-                  <a:tcPr/>
+                  <a:tcPr marL="9525" marR="9525" marT="9525" marB="0" anchor="b"/>
                 </a:tc>
                 <a:tc>
                   <a:txBody>
                     <a:bodyPr/>
                     <a:lstStyle/>
                     <a:p>
-                      <a:endParaRPr lang="fr-FR"/>
+                      <a:pPr algn="r" fontAlgn="b"/>
+                      <a:r>
+                        <a:rPr lang="fr-FR" sz="1100" b="0" i="0" u="none" strike="noStrike" dirty="0">
+                          <a:solidFill>
+                            <a:srgbClr val="000000"/>
+                          </a:solidFill>
+                          <a:latin typeface="Calibri"/>
+                        </a:rPr>
+                        <a:t>27</a:t>
+                      </a:r>
                     </a:p>
                   </a:txBody>
-                  <a:tcPr/>
-                </a:tc>
-                <a:tc>
-                  <a:txBody>
-                    <a:bodyPr/>
-                    <a:lstStyle/>
-                    <a:p>
-                      <a:endParaRPr lang="fr-FR"/>
-                    </a:p>
-                  </a:txBody>
-                  <a:tcPr/>
-                </a:tc>
-              </a:tr>
-              <a:tr h="370840">
-                <a:tc>
-                  <a:txBody>
-                    <a:bodyPr/>
-                    <a:lstStyle/>
-                    <a:p>
-                      <a:endParaRPr lang="fr-FR"/>
-                    </a:p>
-                  </a:txBody>
-                  <a:tcPr/>
-                </a:tc>
-                <a:tc>
-                  <a:txBody>
-                    <a:bodyPr/>
-                    <a:lstStyle/>
-                    <a:p>
-                      <a:endParaRPr lang="fr-FR"/>
-                    </a:p>
-                  </a:txBody>
-                  <a:tcPr/>
-                </a:tc>
-                <a:tc>
-                  <a:txBody>
-                    <a:bodyPr/>
-                    <a:lstStyle/>
-                    <a:p>
-                      <a:endParaRPr lang="fr-FR"/>
-                    </a:p>
-                  </a:txBody>
-                  <a:tcPr/>
-                </a:tc>
-                <a:tc>
-                  <a:txBody>
-                    <a:bodyPr/>
-                    <a:lstStyle/>
-                    <a:p>
-                      <a:endParaRPr lang="fr-FR"/>
-                    </a:p>
-                  </a:txBody>
-                  <a:tcPr/>
-                </a:tc>
-                <a:tc>
-                  <a:txBody>
-                    <a:bodyPr/>
-                    <a:lstStyle/>
-                    <a:p>
-                      <a:endParaRPr lang="fr-FR"/>
-                    </a:p>
-                  </a:txBody>
-                  <a:tcPr/>
-                </a:tc>
-                <a:tc>
-                  <a:txBody>
-                    <a:bodyPr/>
-                    <a:lstStyle/>
-                    <a:p>
-                      <a:endParaRPr lang="fr-FR"/>
-                    </a:p>
-                  </a:txBody>
-                  <a:tcPr/>
-                </a:tc>
-                <a:tc>
-                  <a:txBody>
-                    <a:bodyPr/>
-                    <a:lstStyle/>
-                    <a:p>
-                      <a:endParaRPr lang="fr-FR"/>
-                    </a:p>
-                  </a:txBody>
-                  <a:tcPr/>
-                </a:tc>
-                <a:tc>
-                  <a:txBody>
-                    <a:bodyPr/>
-                    <a:lstStyle/>
-                    <a:p>
-                      <a:endParaRPr lang="fr-FR"/>
-                    </a:p>
-                  </a:txBody>
-                  <a:tcPr/>
-                </a:tc>
-                <a:tc>
-                  <a:txBody>
-                    <a:bodyPr/>
-                    <a:lstStyle/>
-                    <a:p>
-                      <a:endParaRPr lang="fr-FR"/>
-                    </a:p>
-                  </a:txBody>
-                  <a:tcPr/>
-                </a:tc>
-                <a:tc>
-                  <a:txBody>
-                    <a:bodyPr/>
-                    <a:lstStyle/>
-                    <a:p>
-                      <a:endParaRPr lang="fr-FR"/>
-                    </a:p>
-                  </a:txBody>
-                  <a:tcPr/>
-                </a:tc>
-              </a:tr>
-              <a:tr h="370840">
-                <a:tc>
-                  <a:txBody>
-                    <a:bodyPr/>
-                    <a:lstStyle/>
-                    <a:p>
-                      <a:endParaRPr lang="fr-FR"/>
-                    </a:p>
-                  </a:txBody>
-                  <a:tcPr/>
-                </a:tc>
-                <a:tc>
-                  <a:txBody>
-                    <a:bodyPr/>
-                    <a:lstStyle/>
-                    <a:p>
-                      <a:endParaRPr lang="fr-FR"/>
-                    </a:p>
-                  </a:txBody>
-                  <a:tcPr/>
-                </a:tc>
-                <a:tc>
-                  <a:txBody>
-                    <a:bodyPr/>
-                    <a:lstStyle/>
-                    <a:p>
-                      <a:endParaRPr lang="fr-FR"/>
-                    </a:p>
-                  </a:txBody>
-                  <a:tcPr/>
-                </a:tc>
-                <a:tc>
-                  <a:txBody>
-                    <a:bodyPr/>
-                    <a:lstStyle/>
-                    <a:p>
-                      <a:endParaRPr lang="fr-FR"/>
-                    </a:p>
-                  </a:txBody>
-                  <a:tcPr/>
-                </a:tc>
-                <a:tc>
-                  <a:txBody>
-                    <a:bodyPr/>
-                    <a:lstStyle/>
-                    <a:p>
-                      <a:endParaRPr lang="fr-FR"/>
-                    </a:p>
-                  </a:txBody>
-                  <a:tcPr/>
-                </a:tc>
-                <a:tc>
-                  <a:txBody>
-                    <a:bodyPr/>
-                    <a:lstStyle/>
-                    <a:p>
-                      <a:endParaRPr lang="fr-FR"/>
-                    </a:p>
-                  </a:txBody>
-                  <a:tcPr/>
-                </a:tc>
-                <a:tc>
-                  <a:txBody>
-                    <a:bodyPr/>
-                    <a:lstStyle/>
-                    <a:p>
-                      <a:endParaRPr lang="fr-FR"/>
-                    </a:p>
-                  </a:txBody>
-                  <a:tcPr/>
-                </a:tc>
-                <a:tc>
-                  <a:txBody>
-                    <a:bodyPr/>
-                    <a:lstStyle/>
-                    <a:p>
-                      <a:endParaRPr lang="fr-FR"/>
-                    </a:p>
-                  </a:txBody>
-                  <a:tcPr/>
-                </a:tc>
-                <a:tc>
-                  <a:txBody>
-                    <a:bodyPr/>
-                    <a:lstStyle/>
-                    <a:p>
-                      <a:endParaRPr lang="fr-FR"/>
-                    </a:p>
-                  </a:txBody>
-                  <a:tcPr/>
-                </a:tc>
-                <a:tc>
-                  <a:txBody>
-                    <a:bodyPr/>
-                    <a:lstStyle/>
-                    <a:p>
-                      <a:endParaRPr lang="fr-FR"/>
-                    </a:p>
-                  </a:txBody>
-                  <a:tcPr/>
-                </a:tc>
-              </a:tr>
-              <a:tr h="370840">
-                <a:tc>
-                  <a:txBody>
-                    <a:bodyPr/>
-                    <a:lstStyle/>
-                    <a:p>
-                      <a:endParaRPr lang="fr-FR"/>
-                    </a:p>
-                  </a:txBody>
-                  <a:tcPr/>
-                </a:tc>
-                <a:tc>
-                  <a:txBody>
-                    <a:bodyPr/>
-                    <a:lstStyle/>
-                    <a:p>
-                      <a:endParaRPr lang="fr-FR"/>
-                    </a:p>
-                  </a:txBody>
-                  <a:tcPr/>
-                </a:tc>
-                <a:tc>
-                  <a:txBody>
-                    <a:bodyPr/>
-                    <a:lstStyle/>
-                    <a:p>
-                      <a:endParaRPr lang="fr-FR"/>
-                    </a:p>
-                  </a:txBody>
-                  <a:tcPr/>
-                </a:tc>
-                <a:tc>
-                  <a:txBody>
-                    <a:bodyPr/>
-                    <a:lstStyle/>
-                    <a:p>
-                      <a:endParaRPr lang="fr-FR"/>
-                    </a:p>
-                  </a:txBody>
-                  <a:tcPr/>
-                </a:tc>
-                <a:tc>
-                  <a:txBody>
-                    <a:bodyPr/>
-                    <a:lstStyle/>
-                    <a:p>
-                      <a:endParaRPr lang="fr-FR"/>
-                    </a:p>
-                  </a:txBody>
-                  <a:tcPr/>
-                </a:tc>
-                <a:tc>
-                  <a:txBody>
-                    <a:bodyPr/>
-                    <a:lstStyle/>
-                    <a:p>
-                      <a:endParaRPr lang="fr-FR"/>
-                    </a:p>
-                  </a:txBody>
-                  <a:tcPr/>
-                </a:tc>
-                <a:tc>
-                  <a:txBody>
-                    <a:bodyPr/>
-                    <a:lstStyle/>
-                    <a:p>
-                      <a:endParaRPr lang="fr-FR"/>
-                    </a:p>
-                  </a:txBody>
-                  <a:tcPr/>
-                </a:tc>
-                <a:tc>
-                  <a:txBody>
-                    <a:bodyPr/>
-                    <a:lstStyle/>
-                    <a:p>
-                      <a:endParaRPr lang="fr-FR"/>
-                    </a:p>
-                  </a:txBody>
-                  <a:tcPr/>
-                </a:tc>
-                <a:tc>
-                  <a:txBody>
-                    <a:bodyPr/>
-                    <a:lstStyle/>
-                    <a:p>
-                      <a:endParaRPr lang="fr-FR"/>
-                    </a:p>
-                  </a:txBody>
-                  <a:tcPr/>
-                </a:tc>
-                <a:tc>
-                  <a:txBody>
-                    <a:bodyPr/>
-                    <a:lstStyle/>
-                    <a:p>
-                      <a:endParaRPr lang="fr-FR"/>
-                    </a:p>
-                  </a:txBody>
-                  <a:tcPr/>
-                </a:tc>
-              </a:tr>
-              <a:tr h="370840">
-                <a:tc>
-                  <a:txBody>
-                    <a:bodyPr/>
-                    <a:lstStyle/>
-                    <a:p>
-                      <a:endParaRPr lang="fr-FR"/>
-                    </a:p>
-                  </a:txBody>
-                  <a:tcPr/>
-                </a:tc>
-                <a:tc>
-                  <a:txBody>
-                    <a:bodyPr/>
-                    <a:lstStyle/>
-                    <a:p>
-                      <a:endParaRPr lang="fr-FR"/>
-                    </a:p>
-                  </a:txBody>
-                  <a:tcPr/>
-                </a:tc>
-                <a:tc>
-                  <a:txBody>
-                    <a:bodyPr/>
-                    <a:lstStyle/>
-                    <a:p>
-                      <a:endParaRPr lang="fr-FR"/>
-                    </a:p>
-                  </a:txBody>
-                  <a:tcPr/>
-                </a:tc>
-                <a:tc>
-                  <a:txBody>
-                    <a:bodyPr/>
-                    <a:lstStyle/>
-                    <a:p>
-                      <a:endParaRPr lang="fr-FR"/>
-                    </a:p>
-                  </a:txBody>
-                  <a:tcPr/>
-                </a:tc>
-                <a:tc>
-                  <a:txBody>
-                    <a:bodyPr/>
-                    <a:lstStyle/>
-                    <a:p>
-                      <a:endParaRPr lang="fr-FR"/>
-                    </a:p>
-                  </a:txBody>
-                  <a:tcPr/>
-                </a:tc>
-                <a:tc>
-                  <a:txBody>
-                    <a:bodyPr/>
-                    <a:lstStyle/>
-                    <a:p>
-                      <a:endParaRPr lang="fr-FR"/>
-                    </a:p>
-                  </a:txBody>
-                  <a:tcPr/>
-                </a:tc>
-                <a:tc>
-                  <a:txBody>
-                    <a:bodyPr/>
-                    <a:lstStyle/>
-                    <a:p>
-                      <a:endParaRPr lang="fr-FR"/>
-                    </a:p>
-                  </a:txBody>
-                  <a:tcPr/>
-                </a:tc>
-                <a:tc>
-                  <a:txBody>
-                    <a:bodyPr/>
-                    <a:lstStyle/>
-                    <a:p>
-                      <a:endParaRPr lang="fr-FR"/>
-                    </a:p>
-                  </a:txBody>
-                  <a:tcPr/>
-                </a:tc>
-                <a:tc>
-                  <a:txBody>
-                    <a:bodyPr/>
-                    <a:lstStyle/>
-                    <a:p>
-                      <a:endParaRPr lang="fr-FR"/>
-                    </a:p>
-                  </a:txBody>
-                  <a:tcPr/>
-                </a:tc>
-                <a:tc>
-                  <a:txBody>
-                    <a:bodyPr/>
-                    <a:lstStyle/>
-                    <a:p>
-                      <a:endParaRPr lang="fr-FR"/>
-                    </a:p>
-                  </a:txBody>
-                  <a:tcPr/>
-                </a:tc>
-              </a:tr>
-              <a:tr h="370840">
-                <a:tc>
-                  <a:txBody>
-                    <a:bodyPr/>
-                    <a:lstStyle/>
-                    <a:p>
-                      <a:endParaRPr lang="fr-FR"/>
-                    </a:p>
-                  </a:txBody>
-                  <a:tcPr/>
-                </a:tc>
-                <a:tc>
-                  <a:txBody>
-                    <a:bodyPr/>
-                    <a:lstStyle/>
-                    <a:p>
-                      <a:endParaRPr lang="fr-FR"/>
-                    </a:p>
-                  </a:txBody>
-                  <a:tcPr/>
-                </a:tc>
-                <a:tc>
-                  <a:txBody>
-                    <a:bodyPr/>
-                    <a:lstStyle/>
-                    <a:p>
-                      <a:endParaRPr lang="fr-FR"/>
-                    </a:p>
-                  </a:txBody>
-                  <a:tcPr/>
-                </a:tc>
-                <a:tc>
-                  <a:txBody>
-                    <a:bodyPr/>
-                    <a:lstStyle/>
-                    <a:p>
-                      <a:endParaRPr lang="fr-FR"/>
-                    </a:p>
-                  </a:txBody>
-                  <a:tcPr/>
-                </a:tc>
-                <a:tc>
-                  <a:txBody>
-                    <a:bodyPr/>
-                    <a:lstStyle/>
-                    <a:p>
-                      <a:endParaRPr lang="fr-FR"/>
-                    </a:p>
-                  </a:txBody>
-                  <a:tcPr/>
-                </a:tc>
-                <a:tc>
-                  <a:txBody>
-                    <a:bodyPr/>
-                    <a:lstStyle/>
-                    <a:p>
-                      <a:endParaRPr lang="fr-FR"/>
-                    </a:p>
-                  </a:txBody>
-                  <a:tcPr/>
-                </a:tc>
-                <a:tc>
-                  <a:txBody>
-                    <a:bodyPr/>
-                    <a:lstStyle/>
-                    <a:p>
-                      <a:endParaRPr lang="fr-FR"/>
-                    </a:p>
-                  </a:txBody>
-                  <a:tcPr/>
-                </a:tc>
-                <a:tc>
-                  <a:txBody>
-                    <a:bodyPr/>
-                    <a:lstStyle/>
-                    <a:p>
-                      <a:endParaRPr lang="fr-FR"/>
-                    </a:p>
-                  </a:txBody>
-                  <a:tcPr/>
-                </a:tc>
-                <a:tc>
-                  <a:txBody>
-                    <a:bodyPr/>
-                    <a:lstStyle/>
-                    <a:p>
-                      <a:endParaRPr lang="fr-FR"/>
-                    </a:p>
-                  </a:txBody>
-                  <a:tcPr/>
-                </a:tc>
-                <a:tc>
-                  <a:txBody>
-                    <a:bodyPr/>
-                    <a:lstStyle/>
-                    <a:p>
-                      <a:endParaRPr lang="fr-FR"/>
-                    </a:p>
-                  </a:txBody>
-                  <a:tcPr/>
-                </a:tc>
-              </a:tr>
-              <a:tr h="370840">
-                <a:tc>
-                  <a:txBody>
-                    <a:bodyPr/>
-                    <a:lstStyle/>
-                    <a:p>
-                      <a:endParaRPr lang="fr-FR"/>
-                    </a:p>
-                  </a:txBody>
-                  <a:tcPr/>
-                </a:tc>
-                <a:tc>
-                  <a:txBody>
-                    <a:bodyPr/>
-                    <a:lstStyle/>
-                    <a:p>
-                      <a:endParaRPr lang="fr-FR"/>
-                    </a:p>
-                  </a:txBody>
-                  <a:tcPr/>
-                </a:tc>
-                <a:tc>
-                  <a:txBody>
-                    <a:bodyPr/>
-                    <a:lstStyle/>
-                    <a:p>
-                      <a:endParaRPr lang="fr-FR"/>
-                    </a:p>
-                  </a:txBody>
-                  <a:tcPr/>
-                </a:tc>
-                <a:tc>
-                  <a:txBody>
-                    <a:bodyPr/>
-                    <a:lstStyle/>
-                    <a:p>
-                      <a:endParaRPr lang="fr-FR"/>
-                    </a:p>
-                  </a:txBody>
-                  <a:tcPr/>
-                </a:tc>
-                <a:tc>
-                  <a:txBody>
-                    <a:bodyPr/>
-                    <a:lstStyle/>
-                    <a:p>
-                      <a:endParaRPr lang="fr-FR"/>
-                    </a:p>
-                  </a:txBody>
-                  <a:tcPr/>
-                </a:tc>
-                <a:tc>
-                  <a:txBody>
-                    <a:bodyPr/>
-                    <a:lstStyle/>
-                    <a:p>
-                      <a:endParaRPr lang="fr-FR"/>
-                    </a:p>
-                  </a:txBody>
-                  <a:tcPr/>
-                </a:tc>
-                <a:tc>
-                  <a:txBody>
-                    <a:bodyPr/>
-                    <a:lstStyle/>
-                    <a:p>
-                      <a:endParaRPr lang="fr-FR"/>
-                    </a:p>
-                  </a:txBody>
-                  <a:tcPr/>
-                </a:tc>
-                <a:tc>
-                  <a:txBody>
-                    <a:bodyPr/>
-                    <a:lstStyle/>
-                    <a:p>
-                      <a:endParaRPr lang="fr-FR"/>
-                    </a:p>
-                  </a:txBody>
-                  <a:tcPr/>
-                </a:tc>
-                <a:tc>
-                  <a:txBody>
-                    <a:bodyPr/>
-                    <a:lstStyle/>
-                    <a:p>
-                      <a:endParaRPr lang="fr-FR"/>
-                    </a:p>
-                  </a:txBody>
-                  <a:tcPr/>
-                </a:tc>
-                <a:tc>
-                  <a:txBody>
-                    <a:bodyPr/>
-                    <a:lstStyle/>
-                    <a:p>
-                      <a:endParaRPr lang="fr-FR"/>
-                    </a:p>
-                  </a:txBody>
-                  <a:tcPr/>
-                </a:tc>
-              </a:tr>
-              <a:tr h="370840">
-                <a:tc>
-                  <a:txBody>
-                    <a:bodyPr/>
-                    <a:lstStyle/>
-                    <a:p>
-                      <a:endParaRPr lang="fr-FR"/>
-                    </a:p>
-                  </a:txBody>
-                  <a:tcPr/>
-                </a:tc>
-                <a:tc>
-                  <a:txBody>
-                    <a:bodyPr/>
-                    <a:lstStyle/>
-                    <a:p>
-                      <a:endParaRPr lang="fr-FR"/>
-                    </a:p>
-                  </a:txBody>
-                  <a:tcPr/>
-                </a:tc>
-                <a:tc>
-                  <a:txBody>
-                    <a:bodyPr/>
-                    <a:lstStyle/>
-                    <a:p>
-                      <a:endParaRPr lang="fr-FR"/>
-                    </a:p>
-                  </a:txBody>
-                  <a:tcPr/>
-                </a:tc>
-                <a:tc>
-                  <a:txBody>
-                    <a:bodyPr/>
-                    <a:lstStyle/>
-                    <a:p>
-                      <a:endParaRPr lang="fr-FR"/>
-                    </a:p>
-                  </a:txBody>
-                  <a:tcPr/>
-                </a:tc>
-                <a:tc>
-                  <a:txBody>
-                    <a:bodyPr/>
-                    <a:lstStyle/>
-                    <a:p>
-                      <a:endParaRPr lang="fr-FR"/>
-                    </a:p>
-                  </a:txBody>
-                  <a:tcPr/>
-                </a:tc>
-                <a:tc>
-                  <a:txBody>
-                    <a:bodyPr/>
-                    <a:lstStyle/>
-                    <a:p>
-                      <a:endParaRPr lang="fr-FR"/>
-                    </a:p>
-                  </a:txBody>
-                  <a:tcPr/>
-                </a:tc>
-                <a:tc>
-                  <a:txBody>
-                    <a:bodyPr/>
-                    <a:lstStyle/>
-                    <a:p>
-                      <a:endParaRPr lang="fr-FR"/>
-                    </a:p>
-                  </a:txBody>
-                  <a:tcPr/>
-                </a:tc>
-                <a:tc>
-                  <a:txBody>
-                    <a:bodyPr/>
-                    <a:lstStyle/>
-                    <a:p>
-                      <a:endParaRPr lang="fr-FR"/>
-                    </a:p>
-                  </a:txBody>
-                  <a:tcPr/>
-                </a:tc>
-                <a:tc>
-                  <a:txBody>
-                    <a:bodyPr/>
-                    <a:lstStyle/>
-                    <a:p>
-                      <a:endParaRPr lang="fr-FR"/>
-                    </a:p>
-                  </a:txBody>
-                  <a:tcPr/>
-                </a:tc>
-                <a:tc>
-                  <a:txBody>
-                    <a:bodyPr/>
-                    <a:lstStyle/>
-                    <a:p>
-                      <a:endParaRPr lang="fr-FR"/>
-                    </a:p>
-                  </a:txBody>
-                  <a:tcPr/>
+                  <a:tcPr marL="9525" marR="9525" marT="9525" marB="0" anchor="b"/>
                 </a:tc>
               </a:tr>
             </a:tbl>
@@ -18750,15 +20372,66 @@
         <p:spPr/>
         <p:txBody>
           <a:bodyPr>
-            <a:normAutofit fontScale="90000"/>
+            <a:normAutofit/>
           </a:bodyPr>
           <a:lstStyle/>
           <a:p>
             <a:r>
               <a:rPr lang="fr-FR" dirty="0" smtClean="0"/>
-              <a:t>Analyse de performance : Taille de la table et seuils</a:t>
+              <a:t>Analyse de </a:t>
+            </a:r>
+            <a:r>
+              <a:rPr lang="fr-FR" dirty="0" smtClean="0"/>
+              <a:t>performance</a:t>
             </a:r>
             <a:endParaRPr lang="fr-FR" dirty="0"/>
+          </a:p>
+        </p:txBody>
+      </p:sp>
+      <p:sp>
+        <p:nvSpPr>
+          <p:cNvPr id="5" name="Espace réservé du numéro de diapositive 4"/>
+          <p:cNvSpPr>
+            <a:spLocks noGrp="1"/>
+          </p:cNvSpPr>
+          <p:nvPr>
+            <p:ph type="sldNum" sz="quarter" idx="12"/>
+          </p:nvPr>
+        </p:nvSpPr>
+        <p:spPr/>
+        <p:txBody>
+          <a:bodyPr/>
+          <a:lstStyle/>
+          <a:p>
+            <a:fld id="{39A6FB64-6B0D-416D-97C5-CB77EEC53406}" type="slidenum">
+              <a:rPr lang="fr-FR" smtClean="0"/>
+              <a:pPr/>
+              <a:t>8</a:t>
+            </a:fld>
+            <a:endParaRPr lang="fr-FR"/>
+          </a:p>
+        </p:txBody>
+      </p:sp>
+      <p:sp>
+        <p:nvSpPr>
+          <p:cNvPr id="6" name="Espace réservé du pied de page 5"/>
+          <p:cNvSpPr>
+            <a:spLocks noGrp="1"/>
+          </p:cNvSpPr>
+          <p:nvPr>
+            <p:ph type="ftr" sz="quarter" idx="11"/>
+          </p:nvPr>
+        </p:nvSpPr>
+        <p:spPr/>
+        <p:txBody>
+          <a:bodyPr/>
+          <a:lstStyle/>
+          <a:p>
+            <a:r>
+              <a:rPr lang="fr-FR" smtClean="0"/>
+              <a:t>Projet numéro 2 : Règles d'associations</a:t>
+            </a:r>
+            <a:endParaRPr lang="fr-FR"/>
           </a:p>
         </p:txBody>
       </p:sp>
@@ -18799,10 +20472,69 @@
         </p:nvSpPr>
         <p:spPr/>
         <p:txBody>
-          <a:bodyPr/>
+          <a:bodyPr>
+            <a:normAutofit fontScale="92500"/>
+          </a:bodyPr>
           <a:lstStyle/>
           <a:p>
-            <a:endParaRPr lang="fr-FR"/>
+            <a:pPr>
+              <a:lnSpc>
+                <a:spcPct val="200000"/>
+              </a:lnSpc>
+            </a:pPr>
+            <a:r>
+              <a:rPr lang="fr-FR" dirty="0" smtClean="0"/>
+              <a:t>Mise en pratique d’un algorithme étudié en cours</a:t>
+            </a:r>
+          </a:p>
+          <a:p>
+            <a:pPr>
+              <a:lnSpc>
+                <a:spcPct val="200000"/>
+              </a:lnSpc>
+            </a:pPr>
+            <a:r>
+              <a:rPr lang="fr-FR" dirty="0" smtClean="0"/>
+              <a:t>Sensibilisation à l’optimisation </a:t>
+            </a:r>
+          </a:p>
+          <a:p>
+            <a:pPr lvl="1">
+              <a:lnSpc>
+                <a:spcPct val="200000"/>
+              </a:lnSpc>
+            </a:pPr>
+            <a:r>
+              <a:rPr lang="fr-FR" dirty="0" err="1" smtClean="0"/>
+              <a:t>A-Priori</a:t>
+            </a:r>
+            <a:r>
+              <a:rPr lang="fr-FR" dirty="0" smtClean="0"/>
+              <a:t> performant jusqu’à une certaine taille</a:t>
+            </a:r>
+          </a:p>
+          <a:p>
+            <a:pPr lvl="1">
+              <a:lnSpc>
+                <a:spcPct val="200000"/>
+              </a:lnSpc>
+            </a:pPr>
+            <a:r>
+              <a:rPr lang="fr-FR" dirty="0" smtClean="0"/>
+              <a:t>Non optimale sur des bases de production</a:t>
+            </a:r>
+          </a:p>
+          <a:p>
+            <a:pPr lvl="1">
+              <a:lnSpc>
+                <a:spcPct val="200000"/>
+              </a:lnSpc>
+            </a:pPr>
+            <a:r>
+              <a:rPr lang="fr-FR" dirty="0" smtClean="0"/>
+              <a:t>Passage à des algorithmes plus performants</a:t>
+            </a:r>
+            <a:endParaRPr lang="fr-FR" dirty="0"/>
           </a:p>
         </p:txBody>
       </p:sp>
@@ -18824,6 +20556,53 @@
             <a:r>
               <a:rPr lang="fr-FR" smtClean="0"/>
               <a:t>Conclusion</a:t>
+            </a:r>
+            <a:endParaRPr lang="fr-FR"/>
+          </a:p>
+        </p:txBody>
+      </p:sp>
+      <p:sp>
+        <p:nvSpPr>
+          <p:cNvPr id="4" name="Espace réservé du numéro de diapositive 3"/>
+          <p:cNvSpPr>
+            <a:spLocks noGrp="1"/>
+          </p:cNvSpPr>
+          <p:nvPr>
+            <p:ph type="sldNum" sz="quarter" idx="12"/>
+          </p:nvPr>
+        </p:nvSpPr>
+        <p:spPr/>
+        <p:txBody>
+          <a:bodyPr/>
+          <a:lstStyle/>
+          <a:p>
+            <a:fld id="{39A6FB64-6B0D-416D-97C5-CB77EEC53406}" type="slidenum">
+              <a:rPr lang="fr-FR" smtClean="0"/>
+              <a:pPr/>
+              <a:t>9</a:t>
+            </a:fld>
+            <a:endParaRPr lang="fr-FR"/>
+          </a:p>
+        </p:txBody>
+      </p:sp>
+      <p:sp>
+        <p:nvSpPr>
+          <p:cNvPr id="5" name="Espace réservé du pied de page 4"/>
+          <p:cNvSpPr>
+            <a:spLocks noGrp="1"/>
+          </p:cNvSpPr>
+          <p:nvPr>
+            <p:ph type="ftr" sz="quarter" idx="11"/>
+          </p:nvPr>
+        </p:nvSpPr>
+        <p:spPr/>
+        <p:txBody>
+          <a:bodyPr/>
+          <a:lstStyle/>
+          <a:p>
+            <a:r>
+              <a:rPr lang="fr-FR" smtClean="0"/>
+              <a:t>Projet numéro 2 : Règles d'associations</a:t>
             </a:r>
             <a:endParaRPr lang="fr-FR"/>
           </a:p>
@@ -19120,4 +20899,287 @@
   <a:objectDefaults/>
   <a:extraClrSchemeLst/>
 </a:theme>
+</file>
+
+<file path=ppt/theme/theme2.xml><?xml version="1.0" encoding="utf-8"?>
+<a:theme xmlns:a="http://schemas.openxmlformats.org/drawingml/2006/main" name="Thème Office">
+  <a:themeElements>
+    <a:clrScheme name="Office">
+      <a:dk1>
+        <a:sysClr val="windowText" lastClr="000000"/>
+      </a:dk1>
+      <a:lt1>
+        <a:sysClr val="window" lastClr="FFFFFF"/>
+      </a:lt1>
+      <a:dk2>
+        <a:srgbClr val="1F497D"/>
+      </a:dk2>
+      <a:lt2>
+        <a:srgbClr val="EEECE1"/>
+      </a:lt2>
+      <a:accent1>
+        <a:srgbClr val="4F81BD"/>
+      </a:accent1>
+      <a:accent2>
+        <a:srgbClr val="C0504D"/>
+      </a:accent2>
+      <a:accent3>
+        <a:srgbClr val="9BBB59"/>
+      </a:accent3>
+      <a:accent4>
+        <a:srgbClr val="8064A2"/>
+      </a:accent4>
+      <a:accent5>
+        <a:srgbClr val="4BACC6"/>
+      </a:accent5>
+      <a:accent6>
+        <a:srgbClr val="F79646"/>
+      </a:accent6>
+      <a:hlink>
+        <a:srgbClr val="0000FF"/>
+      </a:hlink>
+      <a:folHlink>
+        <a:srgbClr val="800080"/>
+      </a:folHlink>
+    </a:clrScheme>
+    <a:fontScheme name="Office">
+      <a:majorFont>
+        <a:latin typeface="Calibri"/>
+        <a:ea typeface=""/>
+        <a:cs typeface=""/>
+        <a:font script="Jpan" typeface="ＭＳ Ｐゴシック"/>
+        <a:font script="Hang" typeface="맑은 고딕"/>
+        <a:font script="Hans" typeface="宋体"/>
+        <a:font script="Hant" typeface="新細明體"/>
+        <a:font script="Arab" typeface="Times New Roman"/>
+        <a:font script="Hebr" typeface="Times New Roman"/>
+        <a:font script="Thai" typeface="Angsana New"/>
+        <a:font script="Ethi" typeface="Nyala"/>
+        <a:font script="Beng" typeface="Vrinda"/>
+        <a:font script="Gujr" typeface="Shruti"/>
+        <a:font script="Khmr" typeface="MoolBoran"/>
+        <a:font script="Knda" typeface="Tunga"/>
+        <a:font script="Guru" typeface="Raavi"/>
+        <a:font script="Cans" typeface="Euphemia"/>
+        <a:font script="Cher" typeface="Plantagenet Cherokee"/>
+        <a:font script="Yiii" typeface="Microsoft Yi Baiti"/>
+        <a:font script="Tibt" typeface="Microsoft Himalaya"/>
+        <a:font script="Thaa" typeface="MV Boli"/>
+        <a:font script="Deva" typeface="Mangal"/>
+        <a:font script="Telu" typeface="Gautami"/>
+        <a:font script="Taml" typeface="Latha"/>
+        <a:font script="Syrc" typeface="Estrangelo Edessa"/>
+        <a:font script="Orya" typeface="Kalinga"/>
+        <a:font script="Mlym" typeface="Kartika"/>
+        <a:font script="Laoo" typeface="DokChampa"/>
+        <a:font script="Sinh" typeface="Iskoola Pota"/>
+        <a:font script="Mong" typeface="Mongolian Baiti"/>
+        <a:font script="Viet" typeface="Times New Roman"/>
+        <a:font script="Uigh" typeface="Microsoft Uighur"/>
+      </a:majorFont>
+      <a:minorFont>
+        <a:latin typeface="Calibri"/>
+        <a:ea typeface=""/>
+        <a:cs typeface=""/>
+        <a:font script="Jpan" typeface="ＭＳ Ｐゴシック"/>
+        <a:font script="Hang" typeface="맑은 고딕"/>
+        <a:font script="Hans" typeface="宋体"/>
+        <a:font script="Hant" typeface="新細明體"/>
+        <a:font script="Arab" typeface="Arial"/>
+        <a:font script="Hebr" typeface="Arial"/>
+        <a:font script="Thai" typeface="Cordia New"/>
+        <a:font script="Ethi" typeface="Nyala"/>
+        <a:font script="Beng" typeface="Vrinda"/>
+        <a:font script="Gujr" typeface="Shruti"/>
+        <a:font script="Khmr" typeface="DaunPenh"/>
+        <a:font script="Knda" typeface="Tunga"/>
+        <a:font script="Guru" typeface="Raavi"/>
+        <a:font script="Cans" typeface="Euphemia"/>
+        <a:font script="Cher" typeface="Plantagenet Cherokee"/>
+        <a:font script="Yiii" typeface="Microsoft Yi Baiti"/>
+        <a:font script="Tibt" typeface="Microsoft Himalaya"/>
+        <a:font script="Thaa" typeface="MV Boli"/>
+        <a:font script="Deva" typeface="Mangal"/>
+        <a:font script="Telu" typeface="Gautami"/>
+        <a:font script="Taml" typeface="Latha"/>
+        <a:font script="Syrc" typeface="Estrangelo Edessa"/>
+        <a:font script="Orya" typeface="Kalinga"/>
+        <a:font script="Mlym" typeface="Kartika"/>
+        <a:font script="Laoo" typeface="DokChampa"/>
+        <a:font script="Sinh" typeface="Iskoola Pota"/>
+        <a:font script="Mong" typeface="Mongolian Baiti"/>
+        <a:font script="Viet" typeface="Arial"/>
+        <a:font script="Uigh" typeface="Microsoft Uighur"/>
+      </a:minorFont>
+    </a:fontScheme>
+    <a:fmtScheme name="Office">
+      <a:fillStyleLst>
+        <a:solidFill>
+          <a:schemeClr val="phClr"/>
+        </a:solidFill>
+        <a:gradFill rotWithShape="1">
+          <a:gsLst>
+            <a:gs pos="0">
+              <a:schemeClr val="phClr">
+                <a:tint val="50000"/>
+                <a:satMod val="300000"/>
+              </a:schemeClr>
+            </a:gs>
+            <a:gs pos="35000">
+              <a:schemeClr val="phClr">
+                <a:tint val="37000"/>
+                <a:satMod val="300000"/>
+              </a:schemeClr>
+            </a:gs>
+            <a:gs pos="100000">
+              <a:schemeClr val="phClr">
+                <a:tint val="15000"/>
+                <a:satMod val="350000"/>
+              </a:schemeClr>
+            </a:gs>
+          </a:gsLst>
+          <a:lin ang="16200000" scaled="1"/>
+        </a:gradFill>
+        <a:gradFill rotWithShape="1">
+          <a:gsLst>
+            <a:gs pos="0">
+              <a:schemeClr val="phClr">
+                <a:shade val="51000"/>
+                <a:satMod val="130000"/>
+              </a:schemeClr>
+            </a:gs>
+            <a:gs pos="80000">
+              <a:schemeClr val="phClr">
+                <a:shade val="93000"/>
+                <a:satMod val="130000"/>
+              </a:schemeClr>
+            </a:gs>
+            <a:gs pos="100000">
+              <a:schemeClr val="phClr">
+                <a:shade val="94000"/>
+                <a:satMod val="135000"/>
+              </a:schemeClr>
+            </a:gs>
+          </a:gsLst>
+          <a:lin ang="16200000" scaled="0"/>
+        </a:gradFill>
+      </a:fillStyleLst>
+      <a:lnStyleLst>
+        <a:ln w="9525" cap="flat" cmpd="sng" algn="ctr">
+          <a:solidFill>
+            <a:schemeClr val="phClr">
+              <a:shade val="95000"/>
+              <a:satMod val="105000"/>
+            </a:schemeClr>
+          </a:solidFill>
+          <a:prstDash val="solid"/>
+        </a:ln>
+        <a:ln w="25400" cap="flat" cmpd="sng" algn="ctr">
+          <a:solidFill>
+            <a:schemeClr val="phClr"/>
+          </a:solidFill>
+          <a:prstDash val="solid"/>
+        </a:ln>
+        <a:ln w="38100" cap="flat" cmpd="sng" algn="ctr">
+          <a:solidFill>
+            <a:schemeClr val="phClr"/>
+          </a:solidFill>
+          <a:prstDash val="solid"/>
+        </a:ln>
+      </a:lnStyleLst>
+      <a:effectStyleLst>
+        <a:effectStyle>
+          <a:effectLst>
+            <a:outerShdw blurRad="40000" dist="20000" dir="5400000" rotWithShape="0">
+              <a:srgbClr val="000000">
+                <a:alpha val="38000"/>
+              </a:srgbClr>
+            </a:outerShdw>
+          </a:effectLst>
+        </a:effectStyle>
+        <a:effectStyle>
+          <a:effectLst>
+            <a:outerShdw blurRad="40000" dist="23000" dir="5400000" rotWithShape="0">
+              <a:srgbClr val="000000">
+                <a:alpha val="35000"/>
+              </a:srgbClr>
+            </a:outerShdw>
+          </a:effectLst>
+        </a:effectStyle>
+        <a:effectStyle>
+          <a:effectLst>
+            <a:outerShdw blurRad="40000" dist="23000" dir="5400000" rotWithShape="0">
+              <a:srgbClr val="000000">
+                <a:alpha val="35000"/>
+              </a:srgbClr>
+            </a:outerShdw>
+          </a:effectLst>
+          <a:scene3d>
+            <a:camera prst="orthographicFront">
+              <a:rot lat="0" lon="0" rev="0"/>
+            </a:camera>
+            <a:lightRig rig="threePt" dir="t">
+              <a:rot lat="0" lon="0" rev="1200000"/>
+            </a:lightRig>
+          </a:scene3d>
+          <a:sp3d>
+            <a:bevelT w="63500" h="25400"/>
+          </a:sp3d>
+        </a:effectStyle>
+      </a:effectStyleLst>
+      <a:bgFillStyleLst>
+        <a:solidFill>
+          <a:schemeClr val="phClr"/>
+        </a:solidFill>
+        <a:gradFill rotWithShape="1">
+          <a:gsLst>
+            <a:gs pos="0">
+              <a:schemeClr val="phClr">
+                <a:tint val="40000"/>
+                <a:satMod val="350000"/>
+              </a:schemeClr>
+            </a:gs>
+            <a:gs pos="40000">
+              <a:schemeClr val="phClr">
+                <a:tint val="45000"/>
+                <a:shade val="99000"/>
+                <a:satMod val="350000"/>
+              </a:schemeClr>
+            </a:gs>
+            <a:gs pos="100000">
+              <a:schemeClr val="phClr">
+                <a:shade val="20000"/>
+                <a:satMod val="255000"/>
+              </a:schemeClr>
+            </a:gs>
+          </a:gsLst>
+          <a:path path="circle">
+            <a:fillToRect l="50000" t="-80000" r="50000" b="180000"/>
+          </a:path>
+        </a:gradFill>
+        <a:gradFill rotWithShape="1">
+          <a:gsLst>
+            <a:gs pos="0">
+              <a:schemeClr val="phClr">
+                <a:tint val="80000"/>
+                <a:satMod val="300000"/>
+              </a:schemeClr>
+            </a:gs>
+            <a:gs pos="100000">
+              <a:schemeClr val="phClr">
+                <a:shade val="30000"/>
+                <a:satMod val="200000"/>
+              </a:schemeClr>
+            </a:gs>
+          </a:gsLst>
+          <a:path path="circle">
+            <a:fillToRect l="50000" t="50000" r="50000" b="50000"/>
+          </a:path>
+        </a:gradFill>
+      </a:bgFillStyleLst>
+    </a:fmtScheme>
+  </a:themeElements>
+  <a:objectDefaults/>
+  <a:extraClrSchemeLst/>
+</a:theme>
 </file>
</xml_diff>

<commit_message>
Légère modification pour ajouter SVN
</commit_message>
<xml_diff>
--- a/Projet OLAP/ressources/Base de données multi-dimensionnelles et OLAP - Projet Numéro 2 - Présentation.pptx
+++ b/Projet OLAP/ressources/Base de données multi-dimensionnelles et OLAP - Projet Numéro 2 - Présentation.pptx
@@ -3110,7 +3110,7 @@
 <dgm:dataModel xmlns:dgm="http://schemas.openxmlformats.org/drawingml/2006/diagram" xmlns:a="http://schemas.openxmlformats.org/drawingml/2006/main">
   <dgm:ptLst>
     <dgm:pt modelId="{5045E2E4-0BCB-45C8-BEC8-562A81950857}" type="doc">
-      <dgm:prSet loTypeId="urn:microsoft.com/office/officeart/2005/8/layout/target3" loCatId="relationship" qsTypeId="urn:microsoft.com/office/officeart/2005/8/quickstyle/simple1" qsCatId="simple" csTypeId="urn:microsoft.com/office/officeart/2005/8/colors/accent1_2" csCatId="accent1" phldr="1"/>
+      <dgm:prSet loTypeId="urn:microsoft.com/office/officeart/2005/8/layout/target3" loCatId="relationship" qsTypeId="urn:microsoft.com/office/officeart/2005/8/quickstyle/simple5" qsCatId="simple" csTypeId="urn:microsoft.com/office/officeart/2005/8/colors/accent1_2" csCatId="accent1" phldr="1"/>
       <dgm:spPr/>
       <dgm:t>
         <a:bodyPr/>
@@ -3439,14 +3439,35 @@
         </dgm:presLayoutVars>
       </dgm:prSet>
       <dgm:spPr/>
+      <dgm:t>
+        <a:bodyPr/>
+        <a:lstStyle/>
+        <a:p>
+          <a:endParaRPr lang="fr-FR"/>
+        </a:p>
+      </dgm:t>
     </dgm:pt>
     <dgm:pt modelId="{6F030DDA-D166-478C-91C8-FACEBDDF9390}" type="pres">
       <dgm:prSet presAssocID="{FA206D9D-D7C3-4277-A0D4-3722447E9CA3}" presName="circle1" presStyleLbl="node1" presStyleIdx="0" presStyleCnt="3"/>
       <dgm:spPr/>
+      <dgm:t>
+        <a:bodyPr/>
+        <a:lstStyle/>
+        <a:p>
+          <a:endParaRPr lang="fr-FR"/>
+        </a:p>
+      </dgm:t>
     </dgm:pt>
     <dgm:pt modelId="{59114E17-1610-4431-88CD-98A33517C0FB}" type="pres">
       <dgm:prSet presAssocID="{FA206D9D-D7C3-4277-A0D4-3722447E9CA3}" presName="space" presStyleCnt="0"/>
       <dgm:spPr/>
+      <dgm:t>
+        <a:bodyPr/>
+        <a:lstStyle/>
+        <a:p>
+          <a:endParaRPr lang="fr-FR"/>
+        </a:p>
+      </dgm:t>
     </dgm:pt>
     <dgm:pt modelId="{E54E618C-EAB4-4AC2-941E-371E58385292}" type="pres">
       <dgm:prSet presAssocID="{FA206D9D-D7C3-4277-A0D4-3722447E9CA3}" presName="rect1" presStyleLbl="alignAcc1" presStyleIdx="0" presStyleCnt="3"/>
@@ -3462,26 +3483,68 @@
     <dgm:pt modelId="{EA0D0336-EBA1-4CA3-8393-26CFA4D7D0EE}" type="pres">
       <dgm:prSet presAssocID="{D040B921-C113-4B26-9DE5-BE1CBCE21260}" presName="vertSpace2" presStyleLbl="node1" presStyleIdx="0" presStyleCnt="3"/>
       <dgm:spPr/>
+      <dgm:t>
+        <a:bodyPr/>
+        <a:lstStyle/>
+        <a:p>
+          <a:endParaRPr lang="fr-FR"/>
+        </a:p>
+      </dgm:t>
     </dgm:pt>
     <dgm:pt modelId="{BCF97AE4-288F-4DF9-92F6-C31125C0BB4B}" type="pres">
       <dgm:prSet presAssocID="{D040B921-C113-4B26-9DE5-BE1CBCE21260}" presName="circle2" presStyleLbl="node1" presStyleIdx="1" presStyleCnt="3"/>
       <dgm:spPr/>
+      <dgm:t>
+        <a:bodyPr/>
+        <a:lstStyle/>
+        <a:p>
+          <a:endParaRPr lang="fr-FR"/>
+        </a:p>
+      </dgm:t>
     </dgm:pt>
     <dgm:pt modelId="{FC59B988-DFA2-4B29-8B6E-2DBE645F887A}" type="pres">
       <dgm:prSet presAssocID="{D040B921-C113-4B26-9DE5-BE1CBCE21260}" presName="rect2" presStyleLbl="alignAcc1" presStyleIdx="1" presStyleCnt="3"/>
       <dgm:spPr/>
+      <dgm:t>
+        <a:bodyPr/>
+        <a:lstStyle/>
+        <a:p>
+          <a:endParaRPr lang="fr-FR"/>
+        </a:p>
+      </dgm:t>
     </dgm:pt>
     <dgm:pt modelId="{E1ED8523-586D-4B28-93FD-F2737C3F14F8}" type="pres">
       <dgm:prSet presAssocID="{5ADEB24A-9993-4187-9C01-3E39E20C6455}" presName="vertSpace3" presStyleLbl="node1" presStyleIdx="1" presStyleCnt="3"/>
       <dgm:spPr/>
+      <dgm:t>
+        <a:bodyPr/>
+        <a:lstStyle/>
+        <a:p>
+          <a:endParaRPr lang="fr-FR"/>
+        </a:p>
+      </dgm:t>
     </dgm:pt>
     <dgm:pt modelId="{7C19A195-982E-4F11-88A4-62C6FEDC881A}" type="pres">
       <dgm:prSet presAssocID="{5ADEB24A-9993-4187-9C01-3E39E20C6455}" presName="circle3" presStyleLbl="node1" presStyleIdx="2" presStyleCnt="3"/>
       <dgm:spPr/>
+      <dgm:t>
+        <a:bodyPr/>
+        <a:lstStyle/>
+        <a:p>
+          <a:endParaRPr lang="fr-FR"/>
+        </a:p>
+      </dgm:t>
     </dgm:pt>
     <dgm:pt modelId="{C207763C-36DC-456A-9645-9F5C337E7E08}" type="pres">
       <dgm:prSet presAssocID="{5ADEB24A-9993-4187-9C01-3E39E20C6455}" presName="rect3" presStyleLbl="alignAcc1" presStyleIdx="2" presStyleCnt="3"/>
       <dgm:spPr/>
+      <dgm:t>
+        <a:bodyPr/>
+        <a:lstStyle/>
+        <a:p>
+          <a:endParaRPr lang="fr-FR"/>
+        </a:p>
+      </dgm:t>
     </dgm:pt>
     <dgm:pt modelId="{C7123417-496D-40A8-8D26-F1051666D481}" type="pres">
       <dgm:prSet presAssocID="{FA206D9D-D7C3-4277-A0D4-3722447E9CA3}" presName="rect1ParTx" presStyleLbl="alignAcc1" presStyleIdx="2" presStyleCnt="3">
@@ -3506,6 +3569,13 @@
         </dgm:presLayoutVars>
       </dgm:prSet>
       <dgm:spPr/>
+      <dgm:t>
+        <a:bodyPr/>
+        <a:lstStyle/>
+        <a:p>
+          <a:endParaRPr lang="fr-FR"/>
+        </a:p>
+      </dgm:t>
     </dgm:pt>
     <dgm:pt modelId="{C5549C68-CACF-4009-BA4E-43BAAFD9F35F}" type="pres">
       <dgm:prSet presAssocID="{D040B921-C113-4B26-9DE5-BE1CBCE21260}" presName="rect2ParTx" presStyleLbl="alignAcc1" presStyleIdx="2" presStyleCnt="3">
@@ -3515,6 +3585,13 @@
         </dgm:presLayoutVars>
       </dgm:prSet>
       <dgm:spPr/>
+      <dgm:t>
+        <a:bodyPr/>
+        <a:lstStyle/>
+        <a:p>
+          <a:endParaRPr lang="fr-FR"/>
+        </a:p>
+      </dgm:t>
     </dgm:pt>
     <dgm:pt modelId="{6804F6C2-8B0A-44A8-9515-ED0AA9D8B422}" type="pres">
       <dgm:prSet presAssocID="{D040B921-C113-4B26-9DE5-BE1CBCE21260}" presName="rect2ChTx" presStyleLbl="alignAcc1" presStyleIdx="2" presStyleCnt="3">
@@ -3523,6 +3600,13 @@
         </dgm:presLayoutVars>
       </dgm:prSet>
       <dgm:spPr/>
+      <dgm:t>
+        <a:bodyPr/>
+        <a:lstStyle/>
+        <a:p>
+          <a:endParaRPr lang="fr-FR"/>
+        </a:p>
+      </dgm:t>
     </dgm:pt>
     <dgm:pt modelId="{11C57694-A64A-4FE0-AD45-CA86CE82A072}" type="pres">
       <dgm:prSet presAssocID="{5ADEB24A-9993-4187-9C01-3E39E20C6455}" presName="rect3ParTx" presStyleLbl="alignAcc1" presStyleIdx="2" presStyleCnt="3">
@@ -3532,6 +3616,13 @@
         </dgm:presLayoutVars>
       </dgm:prSet>
       <dgm:spPr/>
+      <dgm:t>
+        <a:bodyPr/>
+        <a:lstStyle/>
+        <a:p>
+          <a:endParaRPr lang="fr-FR"/>
+        </a:p>
+      </dgm:t>
     </dgm:pt>
     <dgm:pt modelId="{DD9696E8-A6AA-4CB6-8DFF-DE8BF474CD5C}" type="pres">
       <dgm:prSet presAssocID="{5ADEB24A-9993-4187-9C01-3E39E20C6455}" presName="rect3ChTx" presStyleLbl="alignAcc1" presStyleIdx="2" presStyleCnt="3">
@@ -3540,31 +3631,38 @@
         </dgm:presLayoutVars>
       </dgm:prSet>
       <dgm:spPr/>
+      <dgm:t>
+        <a:bodyPr/>
+        <a:lstStyle/>
+        <a:p>
+          <a:endParaRPr lang="fr-FR"/>
+        </a:p>
+      </dgm:t>
     </dgm:pt>
   </dgm:ptLst>
   <dgm:cxnLst>
+    <dgm:cxn modelId="{63B03385-BB77-486E-8CC7-DBEE71F75392}" type="presOf" srcId="{FA206D9D-D7C3-4277-A0D4-3722447E9CA3}" destId="{E54E618C-EAB4-4AC2-941E-371E58385292}" srcOrd="0" destOrd="0" presId="urn:microsoft.com/office/officeart/2005/8/layout/target3"/>
+    <dgm:cxn modelId="{B32B2A61-889F-48F4-BABE-7231370ADD1B}" srcId="{FA206D9D-D7C3-4277-A0D4-3722447E9CA3}" destId="{8CBD3A5C-F7F8-4CCA-A547-7EAE1BA6BE13}" srcOrd="1" destOrd="0" parTransId="{94A658AB-2E25-4FA1-B24B-6DFC430D1EE4}" sibTransId="{462A08D7-3A6C-44F8-BB81-CF6A12BBF357}"/>
+    <dgm:cxn modelId="{14CCBE62-CF36-4A00-8161-473C6115205E}" type="presOf" srcId="{23DC7FB8-70FB-4BB8-8595-B0251954FFE8}" destId="{1DD53AA5-C979-4BD5-811D-7C9FFF8C3A8C}" srcOrd="0" destOrd="0" presId="urn:microsoft.com/office/officeart/2005/8/layout/target3"/>
+    <dgm:cxn modelId="{1D1CDE87-1083-45C1-A5A2-7F5399A407C7}" srcId="{5045E2E4-0BCB-45C8-BEC8-562A81950857}" destId="{D040B921-C113-4B26-9DE5-BE1CBCE21260}" srcOrd="1" destOrd="0" parTransId="{73117849-28E1-4CBD-8358-DDE9FE61365B}" sibTransId="{CB9ABE3C-3E3D-447F-9E05-649DDB6548C2}"/>
+    <dgm:cxn modelId="{062DB5EE-079C-48EF-A281-F25A5A746426}" type="presOf" srcId="{8A0A79B8-A78F-4EEB-9881-D96988943A64}" destId="{6804F6C2-8B0A-44A8-9515-ED0AA9D8B422}" srcOrd="0" destOrd="1" presId="urn:microsoft.com/office/officeart/2005/8/layout/target3"/>
+    <dgm:cxn modelId="{588BBFE9-357D-4374-AA49-08337D4448CD}" type="presOf" srcId="{5045E2E4-0BCB-45C8-BEC8-562A81950857}" destId="{EBEA420C-5EED-41FF-966E-C2CCD3258E16}" srcOrd="0" destOrd="0" presId="urn:microsoft.com/office/officeart/2005/8/layout/target3"/>
+    <dgm:cxn modelId="{C8E37052-335F-47BB-ACE3-F099033D00F5}" type="presOf" srcId="{8F43BE92-E2AE-4ADF-AB7D-C30FE2C8DED5}" destId="{DD9696E8-A6AA-4CB6-8DFF-DE8BF474CD5C}" srcOrd="0" destOrd="1" presId="urn:microsoft.com/office/officeart/2005/8/layout/target3"/>
+    <dgm:cxn modelId="{1E996D22-A932-422A-8861-DA9BDA08FE7E}" srcId="{D040B921-C113-4B26-9DE5-BE1CBCE21260}" destId="{87174FB8-9300-4311-8A24-1F60B3FDCF09}" srcOrd="0" destOrd="0" parTransId="{E42F3314-0AC1-4774-96CD-480B35159594}" sibTransId="{4DA15CFC-B58D-437F-9337-553956DEA6DC}"/>
+    <dgm:cxn modelId="{8C2D5990-D0BC-42AA-AB15-0139C5DB7725}" srcId="{5045E2E4-0BCB-45C8-BEC8-562A81950857}" destId="{5ADEB24A-9993-4187-9C01-3E39E20C6455}" srcOrd="2" destOrd="0" parTransId="{287E26E9-670B-4171-ADD3-E6DB18C03240}" sibTransId="{4A79F738-0906-40BA-936C-6B0EB36A7B9A}"/>
+    <dgm:cxn modelId="{E80B5015-099D-444A-A61E-8EB21AF8C858}" srcId="{FA206D9D-D7C3-4277-A0D4-3722447E9CA3}" destId="{23DC7FB8-70FB-4BB8-8595-B0251954FFE8}" srcOrd="0" destOrd="0" parTransId="{B8EC3428-A15D-4125-BC15-F445A814445D}" sibTransId="{F46454BC-1073-49D6-8639-223020682E85}"/>
+    <dgm:cxn modelId="{86B5CC67-04B8-4A1E-8417-40599AEC15A4}" type="presOf" srcId="{D040B921-C113-4B26-9DE5-BE1CBCE21260}" destId="{FC59B988-DFA2-4B29-8B6E-2DBE645F887A}" srcOrd="0" destOrd="0" presId="urn:microsoft.com/office/officeart/2005/8/layout/target3"/>
+    <dgm:cxn modelId="{13B9671E-AD91-4086-8E8E-6E23622A46D2}" type="presOf" srcId="{FA206D9D-D7C3-4277-A0D4-3722447E9CA3}" destId="{C7123417-496D-40A8-8D26-F1051666D481}" srcOrd="1" destOrd="0" presId="urn:microsoft.com/office/officeart/2005/8/layout/target3"/>
+    <dgm:cxn modelId="{B7C9552A-F1D6-46D9-9F16-9B1221528560}" type="presOf" srcId="{87174FB8-9300-4311-8A24-1F60B3FDCF09}" destId="{6804F6C2-8B0A-44A8-9515-ED0AA9D8B422}" srcOrd="0" destOrd="0" presId="urn:microsoft.com/office/officeart/2005/8/layout/target3"/>
+    <dgm:cxn modelId="{940B4866-E5AA-43EB-9724-1EF1AE6EED09}" srcId="{D040B921-C113-4B26-9DE5-BE1CBCE21260}" destId="{8A0A79B8-A78F-4EEB-9881-D96988943A64}" srcOrd="1" destOrd="0" parTransId="{D022A5B6-47CC-466E-BC7A-F9F539FB7C79}" sibTransId="{BEB659B8-6803-4553-8539-B31EC0F79F9B}"/>
+    <dgm:cxn modelId="{DC346926-4E8A-49E4-B2A6-E17EC1F7AA09}" type="presOf" srcId="{47EA39A3-6FE9-4F1A-BA24-12B219773729}" destId="{DD9696E8-A6AA-4CB6-8DFF-DE8BF474CD5C}" srcOrd="0" destOrd="0" presId="urn:microsoft.com/office/officeart/2005/8/layout/target3"/>
+    <dgm:cxn modelId="{7E89FBD6-EABB-49E3-8A1A-F9409B305059}" srcId="{5045E2E4-0BCB-45C8-BEC8-562A81950857}" destId="{FA206D9D-D7C3-4277-A0D4-3722447E9CA3}" srcOrd="0" destOrd="0" parTransId="{539F2902-581B-4C7B-8D75-DEF3040279BE}" sibTransId="{4F7EFE67-CDA0-4B18-98B0-702E2C193639}"/>
+    <dgm:cxn modelId="{C4A9A69B-2BF9-44F7-B92F-CE0FF83F493A}" type="presOf" srcId="{D040B921-C113-4B26-9DE5-BE1CBCE21260}" destId="{C5549C68-CACF-4009-BA4E-43BAAFD9F35F}" srcOrd="1" destOrd="0" presId="urn:microsoft.com/office/officeart/2005/8/layout/target3"/>
     <dgm:cxn modelId="{098D1CEC-FDF2-46FC-AA38-C03C0011D3C2}" type="presOf" srcId="{5ADEB24A-9993-4187-9C01-3E39E20C6455}" destId="{C207763C-36DC-456A-9645-9F5C337E7E08}" srcOrd="0" destOrd="0" presId="urn:microsoft.com/office/officeart/2005/8/layout/target3"/>
-    <dgm:cxn modelId="{86B5CC67-04B8-4A1E-8417-40599AEC15A4}" type="presOf" srcId="{D040B921-C113-4B26-9DE5-BE1CBCE21260}" destId="{FC59B988-DFA2-4B29-8B6E-2DBE645F887A}" srcOrd="0" destOrd="0" presId="urn:microsoft.com/office/officeart/2005/8/layout/target3"/>
-    <dgm:cxn modelId="{C8E37052-335F-47BB-ACE3-F099033D00F5}" type="presOf" srcId="{8F43BE92-E2AE-4ADF-AB7D-C30FE2C8DED5}" destId="{DD9696E8-A6AA-4CB6-8DFF-DE8BF474CD5C}" srcOrd="0" destOrd="1" presId="urn:microsoft.com/office/officeart/2005/8/layout/target3"/>
-    <dgm:cxn modelId="{062DB5EE-079C-48EF-A281-F25A5A746426}" type="presOf" srcId="{8A0A79B8-A78F-4EEB-9881-D96988943A64}" destId="{6804F6C2-8B0A-44A8-9515-ED0AA9D8B422}" srcOrd="0" destOrd="1" presId="urn:microsoft.com/office/officeart/2005/8/layout/target3"/>
-    <dgm:cxn modelId="{1D1CDE87-1083-45C1-A5A2-7F5399A407C7}" srcId="{5045E2E4-0BCB-45C8-BEC8-562A81950857}" destId="{D040B921-C113-4B26-9DE5-BE1CBCE21260}" srcOrd="1" destOrd="0" parTransId="{73117849-28E1-4CBD-8358-DDE9FE61365B}" sibTransId="{CB9ABE3C-3E3D-447F-9E05-649DDB6548C2}"/>
-    <dgm:cxn modelId="{14CCBE62-CF36-4A00-8161-473C6115205E}" type="presOf" srcId="{23DC7FB8-70FB-4BB8-8595-B0251954FFE8}" destId="{1DD53AA5-C979-4BD5-811D-7C9FFF8C3A8C}" srcOrd="0" destOrd="0" presId="urn:microsoft.com/office/officeart/2005/8/layout/target3"/>
+    <dgm:cxn modelId="{FB27F5C8-47DF-4D56-8742-B8171C9A5D77}" srcId="{5ADEB24A-9993-4187-9C01-3E39E20C6455}" destId="{8F43BE92-E2AE-4ADF-AB7D-C30FE2C8DED5}" srcOrd="1" destOrd="0" parTransId="{453E8120-26A4-4397-AE50-3885CA690F46}" sibTransId="{1FA2C281-5749-473F-A1DB-91C6A71C9690}"/>
+    <dgm:cxn modelId="{77336FEB-9A3B-44B0-B369-E48799804692}" type="presOf" srcId="{8CBD3A5C-F7F8-4CCA-A547-7EAE1BA6BE13}" destId="{1DD53AA5-C979-4BD5-811D-7C9FFF8C3A8C}" srcOrd="0" destOrd="1" presId="urn:microsoft.com/office/officeart/2005/8/layout/target3"/>
+    <dgm:cxn modelId="{3CB42773-2E6A-4F7E-A4D9-FC19B1B347C6}" srcId="{5ADEB24A-9993-4187-9C01-3E39E20C6455}" destId="{47EA39A3-6FE9-4F1A-BA24-12B219773729}" srcOrd="0" destOrd="0" parTransId="{50AF66CF-8388-4AB9-A640-F994F3A5EA98}" sibTransId="{0CBF4A81-FB8D-496C-99AE-07FDDDC54C24}"/>
     <dgm:cxn modelId="{F1DD7515-ECE5-4793-B667-063D711EC179}" type="presOf" srcId="{5ADEB24A-9993-4187-9C01-3E39E20C6455}" destId="{11C57694-A64A-4FE0-AD45-CA86CE82A072}" srcOrd="1" destOrd="0" presId="urn:microsoft.com/office/officeart/2005/8/layout/target3"/>
-    <dgm:cxn modelId="{DC346926-4E8A-49E4-B2A6-E17EC1F7AA09}" type="presOf" srcId="{47EA39A3-6FE9-4F1A-BA24-12B219773729}" destId="{DD9696E8-A6AA-4CB6-8DFF-DE8BF474CD5C}" srcOrd="0" destOrd="0" presId="urn:microsoft.com/office/officeart/2005/8/layout/target3"/>
-    <dgm:cxn modelId="{1E996D22-A932-422A-8861-DA9BDA08FE7E}" srcId="{D040B921-C113-4B26-9DE5-BE1CBCE21260}" destId="{87174FB8-9300-4311-8A24-1F60B3FDCF09}" srcOrd="0" destOrd="0" parTransId="{E42F3314-0AC1-4774-96CD-480B35159594}" sibTransId="{4DA15CFC-B58D-437F-9337-553956DEA6DC}"/>
-    <dgm:cxn modelId="{B32B2A61-889F-48F4-BABE-7231370ADD1B}" srcId="{FA206D9D-D7C3-4277-A0D4-3722447E9CA3}" destId="{8CBD3A5C-F7F8-4CCA-A547-7EAE1BA6BE13}" srcOrd="1" destOrd="0" parTransId="{94A658AB-2E25-4FA1-B24B-6DFC430D1EE4}" sibTransId="{462A08D7-3A6C-44F8-BB81-CF6A12BBF357}"/>
-    <dgm:cxn modelId="{E80B5015-099D-444A-A61E-8EB21AF8C858}" srcId="{FA206D9D-D7C3-4277-A0D4-3722447E9CA3}" destId="{23DC7FB8-70FB-4BB8-8595-B0251954FFE8}" srcOrd="0" destOrd="0" parTransId="{B8EC3428-A15D-4125-BC15-F445A814445D}" sibTransId="{F46454BC-1073-49D6-8639-223020682E85}"/>
-    <dgm:cxn modelId="{B7C9552A-F1D6-46D9-9F16-9B1221528560}" type="presOf" srcId="{87174FB8-9300-4311-8A24-1F60B3FDCF09}" destId="{6804F6C2-8B0A-44A8-9515-ED0AA9D8B422}" srcOrd="0" destOrd="0" presId="urn:microsoft.com/office/officeart/2005/8/layout/target3"/>
-    <dgm:cxn modelId="{13B9671E-AD91-4086-8E8E-6E23622A46D2}" type="presOf" srcId="{FA206D9D-D7C3-4277-A0D4-3722447E9CA3}" destId="{C7123417-496D-40A8-8D26-F1051666D481}" srcOrd="1" destOrd="0" presId="urn:microsoft.com/office/officeart/2005/8/layout/target3"/>
-    <dgm:cxn modelId="{63B03385-BB77-486E-8CC7-DBEE71F75392}" type="presOf" srcId="{FA206D9D-D7C3-4277-A0D4-3722447E9CA3}" destId="{E54E618C-EAB4-4AC2-941E-371E58385292}" srcOrd="0" destOrd="0" presId="urn:microsoft.com/office/officeart/2005/8/layout/target3"/>
-    <dgm:cxn modelId="{8C2D5990-D0BC-42AA-AB15-0139C5DB7725}" srcId="{5045E2E4-0BCB-45C8-BEC8-562A81950857}" destId="{5ADEB24A-9993-4187-9C01-3E39E20C6455}" srcOrd="2" destOrd="0" parTransId="{287E26E9-670B-4171-ADD3-E6DB18C03240}" sibTransId="{4A79F738-0906-40BA-936C-6B0EB36A7B9A}"/>
-    <dgm:cxn modelId="{77336FEB-9A3B-44B0-B369-E48799804692}" type="presOf" srcId="{8CBD3A5C-F7F8-4CCA-A547-7EAE1BA6BE13}" destId="{1DD53AA5-C979-4BD5-811D-7C9FFF8C3A8C}" srcOrd="0" destOrd="1" presId="urn:microsoft.com/office/officeart/2005/8/layout/target3"/>
-    <dgm:cxn modelId="{588BBFE9-357D-4374-AA49-08337D4448CD}" type="presOf" srcId="{5045E2E4-0BCB-45C8-BEC8-562A81950857}" destId="{EBEA420C-5EED-41FF-966E-C2CCD3258E16}" srcOrd="0" destOrd="0" presId="urn:microsoft.com/office/officeart/2005/8/layout/target3"/>
-    <dgm:cxn modelId="{940B4866-E5AA-43EB-9724-1EF1AE6EED09}" srcId="{D040B921-C113-4B26-9DE5-BE1CBCE21260}" destId="{8A0A79B8-A78F-4EEB-9881-D96988943A64}" srcOrd="1" destOrd="0" parTransId="{D022A5B6-47CC-466E-BC7A-F9F539FB7C79}" sibTransId="{BEB659B8-6803-4553-8539-B31EC0F79F9B}"/>
-    <dgm:cxn modelId="{FB27F5C8-47DF-4D56-8742-B8171C9A5D77}" srcId="{5ADEB24A-9993-4187-9C01-3E39E20C6455}" destId="{8F43BE92-E2AE-4ADF-AB7D-C30FE2C8DED5}" srcOrd="1" destOrd="0" parTransId="{453E8120-26A4-4397-AE50-3885CA690F46}" sibTransId="{1FA2C281-5749-473F-A1DB-91C6A71C9690}"/>
-    <dgm:cxn modelId="{7E89FBD6-EABB-49E3-8A1A-F9409B305059}" srcId="{5045E2E4-0BCB-45C8-BEC8-562A81950857}" destId="{FA206D9D-D7C3-4277-A0D4-3722447E9CA3}" srcOrd="0" destOrd="0" parTransId="{539F2902-581B-4C7B-8D75-DEF3040279BE}" sibTransId="{4F7EFE67-CDA0-4B18-98B0-702E2C193639}"/>
-    <dgm:cxn modelId="{3CB42773-2E6A-4F7E-A4D9-FC19B1B347C6}" srcId="{5ADEB24A-9993-4187-9C01-3E39E20C6455}" destId="{47EA39A3-6FE9-4F1A-BA24-12B219773729}" srcOrd="0" destOrd="0" parTransId="{50AF66CF-8388-4AB9-A640-F994F3A5EA98}" sibTransId="{0CBF4A81-FB8D-496C-99AE-07FDDDC54C24}"/>
-    <dgm:cxn modelId="{C4A9A69B-2BF9-44F7-B92F-CE0FF83F493A}" type="presOf" srcId="{D040B921-C113-4B26-9DE5-BE1CBCE21260}" destId="{C5549C68-CACF-4009-BA4E-43BAAFD9F35F}" srcOrd="1" destOrd="0" presId="urn:microsoft.com/office/officeart/2005/8/layout/target3"/>
     <dgm:cxn modelId="{273001B8-41F3-4561-BE81-AABA1E729348}" type="presParOf" srcId="{EBEA420C-5EED-41FF-966E-C2CCD3258E16}" destId="{6F030DDA-D166-478C-91C8-FACEBDDF9390}" srcOrd="0" destOrd="0" presId="urn:microsoft.com/office/officeart/2005/8/layout/target3"/>
     <dgm:cxn modelId="{8537BA66-2017-49D3-85B0-0A533BAE7D10}" type="presParOf" srcId="{EBEA420C-5EED-41FF-966E-C2CCD3258E16}" destId="{59114E17-1610-4431-88CD-98A33517C0FB}" srcOrd="1" destOrd="0" presId="urn:microsoft.com/office/officeart/2005/8/layout/target3"/>
     <dgm:cxn modelId="{FDBF894D-3A02-419D-84B6-0DAE2043F11E}" type="presParOf" srcId="{EBEA420C-5EED-41FF-966E-C2CCD3258E16}" destId="{E54E618C-EAB4-4AC2-941E-371E58385292}" srcOrd="2" destOrd="0" presId="urn:microsoft.com/office/officeart/2005/8/layout/target3"/>
@@ -3595,7 +3693,7 @@
 <dgm:dataModel xmlns:dgm="http://schemas.openxmlformats.org/drawingml/2006/diagram" xmlns:a="http://schemas.openxmlformats.org/drawingml/2006/main">
   <dgm:ptLst>
     <dgm:pt modelId="{5045E2E4-0BCB-45C8-BEC8-562A81950857}" type="doc">
-      <dgm:prSet loTypeId="urn:microsoft.com/office/officeart/2005/8/layout/target3" loCatId="relationship" qsTypeId="urn:microsoft.com/office/officeart/2005/8/quickstyle/simple1" qsCatId="simple" csTypeId="urn:microsoft.com/office/officeart/2005/8/colors/accent1_2" csCatId="accent1" phldr="1"/>
+      <dgm:prSet loTypeId="urn:microsoft.com/office/officeart/2005/8/layout/target3" loCatId="relationship" qsTypeId="urn:microsoft.com/office/officeart/2005/8/quickstyle/simple5" qsCatId="simple" csTypeId="urn:microsoft.com/office/officeart/2005/8/colors/accent1_2" csCatId="accent1" phldr="1"/>
       <dgm:spPr/>
       <dgm:t>
         <a:bodyPr/>
@@ -3790,39 +3888,6 @@
         </a:p>
       </dgm:t>
     </dgm:pt>
-    <dgm:pt modelId="{8A0A79B8-A78F-4EEB-9881-D96988943A64}">
-      <dgm:prSet phldrT="[Texte]" phldr="1"/>
-      <dgm:spPr/>
-      <dgm:t>
-        <a:bodyPr/>
-        <a:lstStyle/>
-        <a:p>
-          <a:endParaRPr lang="fr-FR" dirty="0"/>
-        </a:p>
-      </dgm:t>
-    </dgm:pt>
-    <dgm:pt modelId="{D022A5B6-47CC-466E-BC7A-F9F539FB7C79}" type="parTrans" cxnId="{940B4866-E5AA-43EB-9724-1EF1AE6EED09}">
-      <dgm:prSet/>
-      <dgm:spPr/>
-      <dgm:t>
-        <a:bodyPr/>
-        <a:lstStyle/>
-        <a:p>
-          <a:endParaRPr lang="fr-FR"/>
-        </a:p>
-      </dgm:t>
-    </dgm:pt>
-    <dgm:pt modelId="{BEB659B8-6803-4553-8539-B31EC0F79F9B}" type="sibTrans" cxnId="{940B4866-E5AA-43EB-9724-1EF1AE6EED09}">
-      <dgm:prSet/>
-      <dgm:spPr/>
-      <dgm:t>
-        <a:bodyPr/>
-        <a:lstStyle/>
-        <a:p>
-          <a:endParaRPr lang="fr-FR"/>
-        </a:p>
-      </dgm:t>
-    </dgm:pt>
     <dgm:pt modelId="{5ADEB24A-9993-4187-9C01-3E39E20C6455}">
       <dgm:prSet phldrT="[Texte]"/>
       <dgm:spPr/>
@@ -3897,38 +3962,51 @@
         </a:p>
       </dgm:t>
     </dgm:pt>
-    <dgm:pt modelId="{8F43BE92-E2AE-4ADF-AB7D-C30FE2C8DED5}">
-      <dgm:prSet phldrT="[Texte]" phldr="1"/>
-      <dgm:spPr/>
-      <dgm:t>
-        <a:bodyPr/>
-        <a:lstStyle/>
-        <a:p>
-          <a:endParaRPr lang="fr-FR" dirty="0"/>
-        </a:p>
-      </dgm:t>
-    </dgm:pt>
-    <dgm:pt modelId="{453E8120-26A4-4397-AE50-3885CA690F46}" type="parTrans" cxnId="{FB27F5C8-47DF-4D56-8742-B8171C9A5D77}">
+    <dgm:pt modelId="{72E5C0A2-CDBB-4248-8857-1960FB47F98A}">
       <dgm:prSet/>
       <dgm:spPr/>
       <dgm:t>
         <a:bodyPr/>
         <a:lstStyle/>
         <a:p>
-          <a:endParaRPr lang="fr-FR"/>
+          <a:r>
+            <a:rPr lang="fr-FR" dirty="0" smtClean="0"/>
+            <a:t>Gestionnaire de source</a:t>
+          </a:r>
+          <a:endParaRPr lang="fr-FR" dirty="0"/>
         </a:p>
       </dgm:t>
     </dgm:pt>
-    <dgm:pt modelId="{1FA2C281-5749-473F-A1DB-91C6A71C9690}" type="sibTrans" cxnId="{FB27F5C8-47DF-4D56-8742-B8171C9A5D77}">
+    <dgm:pt modelId="{77309179-1EF0-4FCB-A6EF-AF0DCBAD6F1F}" type="parTrans" cxnId="{D1FAECA4-8A07-4DC1-ACDA-79A2C72CE2E1}">
+      <dgm:prSet/>
+      <dgm:spPr/>
+    </dgm:pt>
+    <dgm:pt modelId="{17F22FCC-34C8-462E-B9AC-23332B226B25}" type="sibTrans" cxnId="{D1FAECA4-8A07-4DC1-ACDA-79A2C72CE2E1}">
+      <dgm:prSet/>
+      <dgm:spPr/>
+    </dgm:pt>
+    <dgm:pt modelId="{CF371485-CF31-4165-9D40-68A84884887F}">
       <dgm:prSet/>
       <dgm:spPr/>
       <dgm:t>
         <a:bodyPr/>
         <a:lstStyle/>
         <a:p>
-          <a:endParaRPr lang="fr-FR"/>
+          <a:r>
+            <a:rPr lang="fr-FR" dirty="0" smtClean="0"/>
+            <a:t>SVN</a:t>
+          </a:r>
+          <a:endParaRPr lang="fr-FR" dirty="0"/>
         </a:p>
       </dgm:t>
+    </dgm:pt>
+    <dgm:pt modelId="{A94CBD8D-A4E9-4197-9649-AEA017FD24DC}" type="parTrans" cxnId="{0D270934-A108-4C97-B80B-8279216D610C}">
+      <dgm:prSet/>
+      <dgm:spPr/>
+    </dgm:pt>
+    <dgm:pt modelId="{837883DF-E2BA-4DDE-BB42-E7532C8D2370}" type="sibTrans" cxnId="{0D270934-A108-4C97-B80B-8279216D610C}">
+      <dgm:prSet/>
+      <dgm:spPr/>
     </dgm:pt>
     <dgm:pt modelId="{EBEA420C-5EED-41FF-966E-C2CCD3258E16}" type="pres">
       <dgm:prSet presAssocID="{5045E2E4-0BCB-45C8-BEC8-562A81950857}" presName="Name0" presStyleCnt="0">
@@ -3940,17 +4018,38 @@
         </dgm:presLayoutVars>
       </dgm:prSet>
       <dgm:spPr/>
+      <dgm:t>
+        <a:bodyPr/>
+        <a:lstStyle/>
+        <a:p>
+          <a:endParaRPr lang="fr-FR"/>
+        </a:p>
+      </dgm:t>
     </dgm:pt>
     <dgm:pt modelId="{6F030DDA-D166-478C-91C8-FACEBDDF9390}" type="pres">
-      <dgm:prSet presAssocID="{FA206D9D-D7C3-4277-A0D4-3722447E9CA3}" presName="circle1" presStyleLbl="node1" presStyleIdx="0" presStyleCnt="3"/>
+      <dgm:prSet presAssocID="{FA206D9D-D7C3-4277-A0D4-3722447E9CA3}" presName="circle1" presStyleLbl="node1" presStyleIdx="0" presStyleCnt="4"/>
       <dgm:spPr/>
+      <dgm:t>
+        <a:bodyPr/>
+        <a:lstStyle/>
+        <a:p>
+          <a:endParaRPr lang="fr-FR"/>
+        </a:p>
+      </dgm:t>
     </dgm:pt>
     <dgm:pt modelId="{59114E17-1610-4431-88CD-98A33517C0FB}" type="pres">
       <dgm:prSet presAssocID="{FA206D9D-D7C3-4277-A0D4-3722447E9CA3}" presName="space" presStyleCnt="0"/>
       <dgm:spPr/>
+      <dgm:t>
+        <a:bodyPr/>
+        <a:lstStyle/>
+        <a:p>
+          <a:endParaRPr lang="fr-FR"/>
+        </a:p>
+      </dgm:t>
     </dgm:pt>
     <dgm:pt modelId="{E54E618C-EAB4-4AC2-941E-371E58385292}" type="pres">
-      <dgm:prSet presAssocID="{FA206D9D-D7C3-4277-A0D4-3722447E9CA3}" presName="rect1" presStyleLbl="alignAcc1" presStyleIdx="0" presStyleCnt="3"/>
+      <dgm:prSet presAssocID="{FA206D9D-D7C3-4277-A0D4-3722447E9CA3}" presName="rect1" presStyleLbl="alignAcc1" presStyleIdx="0" presStyleCnt="4"/>
       <dgm:spPr/>
       <dgm:t>
         <a:bodyPr/>
@@ -3961,31 +4060,85 @@
       </dgm:t>
     </dgm:pt>
     <dgm:pt modelId="{EA0D0336-EBA1-4CA3-8393-26CFA4D7D0EE}" type="pres">
-      <dgm:prSet presAssocID="{D040B921-C113-4B26-9DE5-BE1CBCE21260}" presName="vertSpace2" presStyleLbl="node1" presStyleIdx="0" presStyleCnt="3"/>
+      <dgm:prSet presAssocID="{D040B921-C113-4B26-9DE5-BE1CBCE21260}" presName="vertSpace2" presStyleLbl="node1" presStyleIdx="0" presStyleCnt="4"/>
+      <dgm:spPr/>
+      <dgm:t>
+        <a:bodyPr/>
+        <a:lstStyle/>
+        <a:p>
+          <a:endParaRPr lang="fr-FR"/>
+        </a:p>
+      </dgm:t>
+    </dgm:pt>
+    <dgm:pt modelId="{BCF97AE4-288F-4DF9-92F6-C31125C0BB4B}" type="pres">
+      <dgm:prSet presAssocID="{D040B921-C113-4B26-9DE5-BE1CBCE21260}" presName="circle2" presStyleLbl="node1" presStyleIdx="1" presStyleCnt="4"/>
+      <dgm:spPr/>
+      <dgm:t>
+        <a:bodyPr/>
+        <a:lstStyle/>
+        <a:p>
+          <a:endParaRPr lang="fr-FR"/>
+        </a:p>
+      </dgm:t>
+    </dgm:pt>
+    <dgm:pt modelId="{FC59B988-DFA2-4B29-8B6E-2DBE645F887A}" type="pres">
+      <dgm:prSet presAssocID="{D040B921-C113-4B26-9DE5-BE1CBCE21260}" presName="rect2" presStyleLbl="alignAcc1" presStyleIdx="1" presStyleCnt="4"/>
+      <dgm:spPr/>
+      <dgm:t>
+        <a:bodyPr/>
+        <a:lstStyle/>
+        <a:p>
+          <a:endParaRPr lang="fr-FR"/>
+        </a:p>
+      </dgm:t>
+    </dgm:pt>
+    <dgm:pt modelId="{E1ED8523-586D-4B28-93FD-F2737C3F14F8}" type="pres">
+      <dgm:prSet presAssocID="{5ADEB24A-9993-4187-9C01-3E39E20C6455}" presName="vertSpace3" presStyleLbl="node1" presStyleIdx="1" presStyleCnt="4"/>
+      <dgm:spPr/>
+      <dgm:t>
+        <a:bodyPr/>
+        <a:lstStyle/>
+        <a:p>
+          <a:endParaRPr lang="fr-FR"/>
+        </a:p>
+      </dgm:t>
+    </dgm:pt>
+    <dgm:pt modelId="{7C19A195-982E-4F11-88A4-62C6FEDC881A}" type="pres">
+      <dgm:prSet presAssocID="{5ADEB24A-9993-4187-9C01-3E39E20C6455}" presName="circle3" presStyleLbl="node1" presStyleIdx="2" presStyleCnt="4"/>
+      <dgm:spPr/>
+      <dgm:t>
+        <a:bodyPr/>
+        <a:lstStyle/>
+        <a:p>
+          <a:endParaRPr lang="fr-FR"/>
+        </a:p>
+      </dgm:t>
+    </dgm:pt>
+    <dgm:pt modelId="{C207763C-36DC-456A-9645-9F5C337E7E08}" type="pres">
+      <dgm:prSet presAssocID="{5ADEB24A-9993-4187-9C01-3E39E20C6455}" presName="rect3" presStyleLbl="alignAcc1" presStyleIdx="2" presStyleCnt="4"/>
+      <dgm:spPr/>
+      <dgm:t>
+        <a:bodyPr/>
+        <a:lstStyle/>
+        <a:p>
+          <a:endParaRPr lang="fr-FR"/>
+        </a:p>
+      </dgm:t>
+    </dgm:pt>
+    <dgm:pt modelId="{2E9572C3-6E26-42D7-A979-16D5FF533531}" type="pres">
+      <dgm:prSet presAssocID="{72E5C0A2-CDBB-4248-8857-1960FB47F98A}" presName="vertSpace4" presStyleLbl="node1" presStyleIdx="2" presStyleCnt="4"/>
       <dgm:spPr/>
     </dgm:pt>
-    <dgm:pt modelId="{BCF97AE4-288F-4DF9-92F6-C31125C0BB4B}" type="pres">
-      <dgm:prSet presAssocID="{D040B921-C113-4B26-9DE5-BE1CBCE21260}" presName="circle2" presStyleLbl="node1" presStyleIdx="1" presStyleCnt="3"/>
+    <dgm:pt modelId="{F17034C1-3050-4F5B-A3AA-7EE9EB380453}" type="pres">
+      <dgm:prSet presAssocID="{72E5C0A2-CDBB-4248-8857-1960FB47F98A}" presName="circle4" presStyleLbl="node1" presStyleIdx="3" presStyleCnt="4"/>
       <dgm:spPr/>
     </dgm:pt>
-    <dgm:pt modelId="{FC59B988-DFA2-4B29-8B6E-2DBE645F887A}" type="pres">
-      <dgm:prSet presAssocID="{D040B921-C113-4B26-9DE5-BE1CBCE21260}" presName="rect2" presStyleLbl="alignAcc1" presStyleIdx="1" presStyleCnt="3"/>
-      <dgm:spPr/>
-    </dgm:pt>
-    <dgm:pt modelId="{E1ED8523-586D-4B28-93FD-F2737C3F14F8}" type="pres">
-      <dgm:prSet presAssocID="{5ADEB24A-9993-4187-9C01-3E39E20C6455}" presName="vertSpace3" presStyleLbl="node1" presStyleIdx="1" presStyleCnt="3"/>
-      <dgm:spPr/>
-    </dgm:pt>
-    <dgm:pt modelId="{7C19A195-982E-4F11-88A4-62C6FEDC881A}" type="pres">
-      <dgm:prSet presAssocID="{5ADEB24A-9993-4187-9C01-3E39E20C6455}" presName="circle3" presStyleLbl="node1" presStyleIdx="2" presStyleCnt="3"/>
-      <dgm:spPr/>
-    </dgm:pt>
-    <dgm:pt modelId="{C207763C-36DC-456A-9645-9F5C337E7E08}" type="pres">
-      <dgm:prSet presAssocID="{5ADEB24A-9993-4187-9C01-3E39E20C6455}" presName="rect3" presStyleLbl="alignAcc1" presStyleIdx="2" presStyleCnt="3"/>
+    <dgm:pt modelId="{324332A2-187F-40EC-9D32-90A01310E001}" type="pres">
+      <dgm:prSet presAssocID="{72E5C0A2-CDBB-4248-8857-1960FB47F98A}" presName="rect4" presStyleLbl="alignAcc1" presStyleIdx="3" presStyleCnt="4"/>
       <dgm:spPr/>
     </dgm:pt>
     <dgm:pt modelId="{C7123417-496D-40A8-8D26-F1051666D481}" type="pres">
-      <dgm:prSet presAssocID="{FA206D9D-D7C3-4277-A0D4-3722447E9CA3}" presName="rect1ParTx" presStyleLbl="alignAcc1" presStyleIdx="2" presStyleCnt="3">
+      <dgm:prSet presAssocID="{FA206D9D-D7C3-4277-A0D4-3722447E9CA3}" presName="rect1ParTx" presStyleLbl="alignAcc1" presStyleIdx="3" presStyleCnt="4">
         <dgm:presLayoutVars>
           <dgm:chMax val="1"/>
           <dgm:bulletEnabled val="1"/>
@@ -4001,7 +4154,7 @@
       </dgm:t>
     </dgm:pt>
     <dgm:pt modelId="{1DD53AA5-C979-4BD5-811D-7C9FFF8C3A8C}" type="pres">
-      <dgm:prSet presAssocID="{FA206D9D-D7C3-4277-A0D4-3722447E9CA3}" presName="rect1ChTx" presStyleLbl="alignAcc1" presStyleIdx="2" presStyleCnt="3">
+      <dgm:prSet presAssocID="{FA206D9D-D7C3-4277-A0D4-3722447E9CA3}" presName="rect1ChTx" presStyleLbl="alignAcc1" presStyleIdx="3" presStyleCnt="4">
         <dgm:presLayoutVars>
           <dgm:bulletEnabled val="1"/>
         </dgm:presLayoutVars>
@@ -4016,7 +4169,69 @@
       </dgm:t>
     </dgm:pt>
     <dgm:pt modelId="{C5549C68-CACF-4009-BA4E-43BAAFD9F35F}" type="pres">
-      <dgm:prSet presAssocID="{D040B921-C113-4B26-9DE5-BE1CBCE21260}" presName="rect2ParTx" presStyleLbl="alignAcc1" presStyleIdx="2" presStyleCnt="3">
+      <dgm:prSet presAssocID="{D040B921-C113-4B26-9DE5-BE1CBCE21260}" presName="rect2ParTx" presStyleLbl="alignAcc1" presStyleIdx="3" presStyleCnt="4">
+        <dgm:presLayoutVars>
+          <dgm:chMax val="1"/>
+          <dgm:bulletEnabled val="1"/>
+        </dgm:presLayoutVars>
+      </dgm:prSet>
+      <dgm:spPr/>
+      <dgm:t>
+        <a:bodyPr/>
+        <a:lstStyle/>
+        <a:p>
+          <a:endParaRPr lang="fr-FR"/>
+        </a:p>
+      </dgm:t>
+    </dgm:pt>
+    <dgm:pt modelId="{6804F6C2-8B0A-44A8-9515-ED0AA9D8B422}" type="pres">
+      <dgm:prSet presAssocID="{D040B921-C113-4B26-9DE5-BE1CBCE21260}" presName="rect2ChTx" presStyleLbl="alignAcc1" presStyleIdx="3" presStyleCnt="4">
+        <dgm:presLayoutVars>
+          <dgm:bulletEnabled val="1"/>
+        </dgm:presLayoutVars>
+      </dgm:prSet>
+      <dgm:spPr/>
+      <dgm:t>
+        <a:bodyPr/>
+        <a:lstStyle/>
+        <a:p>
+          <a:endParaRPr lang="fr-FR"/>
+        </a:p>
+      </dgm:t>
+    </dgm:pt>
+    <dgm:pt modelId="{11C57694-A64A-4FE0-AD45-CA86CE82A072}" type="pres">
+      <dgm:prSet presAssocID="{5ADEB24A-9993-4187-9C01-3E39E20C6455}" presName="rect3ParTx" presStyleLbl="alignAcc1" presStyleIdx="3" presStyleCnt="4">
+        <dgm:presLayoutVars>
+          <dgm:chMax val="1"/>
+          <dgm:bulletEnabled val="1"/>
+        </dgm:presLayoutVars>
+      </dgm:prSet>
+      <dgm:spPr/>
+      <dgm:t>
+        <a:bodyPr/>
+        <a:lstStyle/>
+        <a:p>
+          <a:endParaRPr lang="fr-FR"/>
+        </a:p>
+      </dgm:t>
+    </dgm:pt>
+    <dgm:pt modelId="{DD9696E8-A6AA-4CB6-8DFF-DE8BF474CD5C}" type="pres">
+      <dgm:prSet presAssocID="{5ADEB24A-9993-4187-9C01-3E39E20C6455}" presName="rect3ChTx" presStyleLbl="alignAcc1" presStyleIdx="3" presStyleCnt="4">
+        <dgm:presLayoutVars>
+          <dgm:bulletEnabled val="1"/>
+        </dgm:presLayoutVars>
+      </dgm:prSet>
+      <dgm:spPr/>
+      <dgm:t>
+        <a:bodyPr/>
+        <a:lstStyle/>
+        <a:p>
+          <a:endParaRPr lang="fr-FR"/>
+        </a:p>
+      </dgm:t>
+    </dgm:pt>
+    <dgm:pt modelId="{9767178A-C424-4C85-B545-A9071A5FA168}" type="pres">
+      <dgm:prSet presAssocID="{72E5C0A2-CDBB-4248-8857-1960FB47F98A}" presName="rect4ParTx" presStyleLbl="alignAcc1" presStyleIdx="3" presStyleCnt="4">
         <dgm:presLayoutVars>
           <dgm:chMax val="1"/>
           <dgm:bulletEnabled val="1"/>
@@ -4024,25 +4239,8 @@
       </dgm:prSet>
       <dgm:spPr/>
     </dgm:pt>
-    <dgm:pt modelId="{6804F6C2-8B0A-44A8-9515-ED0AA9D8B422}" type="pres">
-      <dgm:prSet presAssocID="{D040B921-C113-4B26-9DE5-BE1CBCE21260}" presName="rect2ChTx" presStyleLbl="alignAcc1" presStyleIdx="2" presStyleCnt="3">
-        <dgm:presLayoutVars>
-          <dgm:bulletEnabled val="1"/>
-        </dgm:presLayoutVars>
-      </dgm:prSet>
-      <dgm:spPr/>
-    </dgm:pt>
-    <dgm:pt modelId="{11C57694-A64A-4FE0-AD45-CA86CE82A072}" type="pres">
-      <dgm:prSet presAssocID="{5ADEB24A-9993-4187-9C01-3E39E20C6455}" presName="rect3ParTx" presStyleLbl="alignAcc1" presStyleIdx="2" presStyleCnt="3">
-        <dgm:presLayoutVars>
-          <dgm:chMax val="1"/>
-          <dgm:bulletEnabled val="1"/>
-        </dgm:presLayoutVars>
-      </dgm:prSet>
-      <dgm:spPr/>
-    </dgm:pt>
-    <dgm:pt modelId="{DD9696E8-A6AA-4CB6-8DFF-DE8BF474CD5C}" type="pres">
-      <dgm:prSet presAssocID="{5ADEB24A-9993-4187-9C01-3E39E20C6455}" presName="rect3ChTx" presStyleLbl="alignAcc1" presStyleIdx="2" presStyleCnt="3">
+    <dgm:pt modelId="{235D30E3-E903-4180-A297-AE947FA47B83}" type="pres">
+      <dgm:prSet presAssocID="{72E5C0A2-CDBB-4248-8857-1960FB47F98A}" presName="rect4ChTx" presStyleLbl="alignAcc1" presStyleIdx="3" presStyleCnt="4">
         <dgm:presLayoutVars>
           <dgm:bulletEnabled val="1"/>
         </dgm:presLayoutVars>
@@ -4051,28 +4249,29 @@
     </dgm:pt>
   </dgm:ptLst>
   <dgm:cxnLst>
+    <dgm:cxn modelId="{B32B2A61-889F-48F4-BABE-7231370ADD1B}" srcId="{FA206D9D-D7C3-4277-A0D4-3722447E9CA3}" destId="{8CBD3A5C-F7F8-4CCA-A547-7EAE1BA6BE13}" srcOrd="1" destOrd="0" parTransId="{94A658AB-2E25-4FA1-B24B-6DFC430D1EE4}" sibTransId="{462A08D7-3A6C-44F8-BB81-CF6A12BBF357}"/>
     <dgm:cxn modelId="{2C3879EB-A8C3-4DE3-A63B-5DF2E83B1DF5}" type="presOf" srcId="{87174FB8-9300-4311-8A24-1F60B3FDCF09}" destId="{6804F6C2-8B0A-44A8-9515-ED0AA9D8B422}" srcOrd="0" destOrd="0" presId="urn:microsoft.com/office/officeart/2005/8/layout/target3"/>
+    <dgm:cxn modelId="{1D5F7ADF-1B10-43B7-B44E-EF3E373941DC}" type="presOf" srcId="{47EA39A3-6FE9-4F1A-BA24-12B219773729}" destId="{DD9696E8-A6AA-4CB6-8DFF-DE8BF474CD5C}" srcOrd="0" destOrd="0" presId="urn:microsoft.com/office/officeart/2005/8/layout/target3"/>
+    <dgm:cxn modelId="{0FA4F0D3-4E1C-4E9C-BB62-0140901D83B6}" type="presOf" srcId="{5ADEB24A-9993-4187-9C01-3E39E20C6455}" destId="{11C57694-A64A-4FE0-AD45-CA86CE82A072}" srcOrd="1" destOrd="0" presId="urn:microsoft.com/office/officeart/2005/8/layout/target3"/>
+    <dgm:cxn modelId="{966809E2-AE77-46A3-9CBF-F1A0DC6B23A5}" type="presOf" srcId="{5045E2E4-0BCB-45C8-BEC8-562A81950857}" destId="{EBEA420C-5EED-41FF-966E-C2CCD3258E16}" srcOrd="0" destOrd="0" presId="urn:microsoft.com/office/officeart/2005/8/layout/target3"/>
     <dgm:cxn modelId="{1D1CDE87-1083-45C1-A5A2-7F5399A407C7}" srcId="{5045E2E4-0BCB-45C8-BEC8-562A81950857}" destId="{D040B921-C113-4B26-9DE5-BE1CBCE21260}" srcOrd="1" destOrd="0" parTransId="{73117849-28E1-4CBD-8358-DDE9FE61365B}" sibTransId="{CB9ABE3C-3E3D-447F-9E05-649DDB6548C2}"/>
+    <dgm:cxn modelId="{4F11FE80-6B5A-4639-A19A-CB925CC34AD3}" type="presOf" srcId="{72E5C0A2-CDBB-4248-8857-1960FB47F98A}" destId="{9767178A-C424-4C85-B545-A9071A5FA168}" srcOrd="1" destOrd="0" presId="urn:microsoft.com/office/officeart/2005/8/layout/target3"/>
+    <dgm:cxn modelId="{1E996D22-A932-422A-8861-DA9BDA08FE7E}" srcId="{D040B921-C113-4B26-9DE5-BE1CBCE21260}" destId="{87174FB8-9300-4311-8A24-1F60B3FDCF09}" srcOrd="0" destOrd="0" parTransId="{E42F3314-0AC1-4774-96CD-480B35159594}" sibTransId="{4DA15CFC-B58D-437F-9337-553956DEA6DC}"/>
+    <dgm:cxn modelId="{E80B5015-099D-444A-A61E-8EB21AF8C858}" srcId="{FA206D9D-D7C3-4277-A0D4-3722447E9CA3}" destId="{23DC7FB8-70FB-4BB8-8595-B0251954FFE8}" srcOrd="0" destOrd="0" parTransId="{B8EC3428-A15D-4125-BC15-F445A814445D}" sibTransId="{F46454BC-1073-49D6-8639-223020682E85}"/>
+    <dgm:cxn modelId="{3C3FB076-34D5-449D-B944-62C3D3765810}" type="presOf" srcId="{CF371485-CF31-4165-9D40-68A84884887F}" destId="{235D30E3-E903-4180-A297-AE947FA47B83}" srcOrd="0" destOrd="0" presId="urn:microsoft.com/office/officeart/2005/8/layout/target3"/>
+    <dgm:cxn modelId="{8C2D5990-D0BC-42AA-AB15-0139C5DB7725}" srcId="{5045E2E4-0BCB-45C8-BEC8-562A81950857}" destId="{5ADEB24A-9993-4187-9C01-3E39E20C6455}" srcOrd="2" destOrd="0" parTransId="{287E26E9-670B-4171-ADD3-E6DB18C03240}" sibTransId="{4A79F738-0906-40BA-936C-6B0EB36A7B9A}"/>
+    <dgm:cxn modelId="{93B4E71C-1DD6-44FC-85CA-9A1AD1E077EC}" type="presOf" srcId="{23DC7FB8-70FB-4BB8-8595-B0251954FFE8}" destId="{1DD53AA5-C979-4BD5-811D-7C9FFF8C3A8C}" srcOrd="0" destOrd="0" presId="urn:microsoft.com/office/officeart/2005/8/layout/target3"/>
+    <dgm:cxn modelId="{D1FAECA4-8A07-4DC1-ACDA-79A2C72CE2E1}" srcId="{5045E2E4-0BCB-45C8-BEC8-562A81950857}" destId="{72E5C0A2-CDBB-4248-8857-1960FB47F98A}" srcOrd="3" destOrd="0" parTransId="{77309179-1EF0-4FCB-A6EF-AF0DCBAD6F1F}" sibTransId="{17F22FCC-34C8-462E-B9AC-23332B226B25}"/>
+    <dgm:cxn modelId="{9F379B8E-8A71-4ADC-8357-43668B6490E0}" type="presOf" srcId="{8CBD3A5C-F7F8-4CCA-A547-7EAE1BA6BE13}" destId="{1DD53AA5-C979-4BD5-811D-7C9FFF8C3A8C}" srcOrd="0" destOrd="1" presId="urn:microsoft.com/office/officeart/2005/8/layout/target3"/>
+    <dgm:cxn modelId="{0D270934-A108-4C97-B80B-8279216D610C}" srcId="{72E5C0A2-CDBB-4248-8857-1960FB47F98A}" destId="{CF371485-CF31-4165-9D40-68A84884887F}" srcOrd="0" destOrd="0" parTransId="{A94CBD8D-A4E9-4197-9649-AEA017FD24DC}" sibTransId="{837883DF-E2BA-4DDE-BB42-E7532C8D2370}"/>
+    <dgm:cxn modelId="{97970E31-04F1-41C6-8DC4-58EA8996B44F}" type="presOf" srcId="{D040B921-C113-4B26-9DE5-BE1CBCE21260}" destId="{FC59B988-DFA2-4B29-8B6E-2DBE645F887A}" srcOrd="0" destOrd="0" presId="urn:microsoft.com/office/officeart/2005/8/layout/target3"/>
     <dgm:cxn modelId="{DC16979B-1FCE-46F4-BDE3-407E0410BE59}" type="presOf" srcId="{FA206D9D-D7C3-4277-A0D4-3722447E9CA3}" destId="{E54E618C-EAB4-4AC2-941E-371E58385292}" srcOrd="0" destOrd="0" presId="urn:microsoft.com/office/officeart/2005/8/layout/target3"/>
-    <dgm:cxn modelId="{1D5F7ADF-1B10-43B7-B44E-EF3E373941DC}" type="presOf" srcId="{47EA39A3-6FE9-4F1A-BA24-12B219773729}" destId="{DD9696E8-A6AA-4CB6-8DFF-DE8BF474CD5C}" srcOrd="0" destOrd="0" presId="urn:microsoft.com/office/officeart/2005/8/layout/target3"/>
-    <dgm:cxn modelId="{1E996D22-A932-422A-8861-DA9BDA08FE7E}" srcId="{D040B921-C113-4B26-9DE5-BE1CBCE21260}" destId="{87174FB8-9300-4311-8A24-1F60B3FDCF09}" srcOrd="0" destOrd="0" parTransId="{E42F3314-0AC1-4774-96CD-480B35159594}" sibTransId="{4DA15CFC-B58D-437F-9337-553956DEA6DC}"/>
-    <dgm:cxn modelId="{B32B2A61-889F-48F4-BABE-7231370ADD1B}" srcId="{FA206D9D-D7C3-4277-A0D4-3722447E9CA3}" destId="{8CBD3A5C-F7F8-4CCA-A547-7EAE1BA6BE13}" srcOrd="1" destOrd="0" parTransId="{94A658AB-2E25-4FA1-B24B-6DFC430D1EE4}" sibTransId="{462A08D7-3A6C-44F8-BB81-CF6A12BBF357}"/>
-    <dgm:cxn modelId="{E80B5015-099D-444A-A61E-8EB21AF8C858}" srcId="{FA206D9D-D7C3-4277-A0D4-3722447E9CA3}" destId="{23DC7FB8-70FB-4BB8-8595-B0251954FFE8}" srcOrd="0" destOrd="0" parTransId="{B8EC3428-A15D-4125-BC15-F445A814445D}" sibTransId="{F46454BC-1073-49D6-8639-223020682E85}"/>
-    <dgm:cxn modelId="{93B4E71C-1DD6-44FC-85CA-9A1AD1E077EC}" type="presOf" srcId="{23DC7FB8-70FB-4BB8-8595-B0251954FFE8}" destId="{1DD53AA5-C979-4BD5-811D-7C9FFF8C3A8C}" srcOrd="0" destOrd="0" presId="urn:microsoft.com/office/officeart/2005/8/layout/target3"/>
-    <dgm:cxn modelId="{9F379B8E-8A71-4ADC-8357-43668B6490E0}" type="presOf" srcId="{8CBD3A5C-F7F8-4CCA-A547-7EAE1BA6BE13}" destId="{1DD53AA5-C979-4BD5-811D-7C9FFF8C3A8C}" srcOrd="0" destOrd="1" presId="urn:microsoft.com/office/officeart/2005/8/layout/target3"/>
-    <dgm:cxn modelId="{0FA4F0D3-4E1C-4E9C-BB62-0140901D83B6}" type="presOf" srcId="{5ADEB24A-9993-4187-9C01-3E39E20C6455}" destId="{11C57694-A64A-4FE0-AD45-CA86CE82A072}" srcOrd="1" destOrd="0" presId="urn:microsoft.com/office/officeart/2005/8/layout/target3"/>
-    <dgm:cxn modelId="{590E57E1-8AC5-4FD6-9F0A-F749FC458A7B}" type="presOf" srcId="{8F43BE92-E2AE-4ADF-AB7D-C30FE2C8DED5}" destId="{DD9696E8-A6AA-4CB6-8DFF-DE8BF474CD5C}" srcOrd="0" destOrd="1" presId="urn:microsoft.com/office/officeart/2005/8/layout/target3"/>
-    <dgm:cxn modelId="{8C2D5990-D0BC-42AA-AB15-0139C5DB7725}" srcId="{5045E2E4-0BCB-45C8-BEC8-562A81950857}" destId="{5ADEB24A-9993-4187-9C01-3E39E20C6455}" srcOrd="2" destOrd="0" parTransId="{287E26E9-670B-4171-ADD3-E6DB18C03240}" sibTransId="{4A79F738-0906-40BA-936C-6B0EB36A7B9A}"/>
+    <dgm:cxn modelId="{4C6117CC-F531-4141-A1DC-31276D2CFC13}" type="presOf" srcId="{D040B921-C113-4B26-9DE5-BE1CBCE21260}" destId="{C5549C68-CACF-4009-BA4E-43BAAFD9F35F}" srcOrd="1" destOrd="0" presId="urn:microsoft.com/office/officeart/2005/8/layout/target3"/>
+    <dgm:cxn modelId="{7E89FBD6-EABB-49E3-8A1A-F9409B305059}" srcId="{5045E2E4-0BCB-45C8-BEC8-562A81950857}" destId="{FA206D9D-D7C3-4277-A0D4-3722447E9CA3}" srcOrd="0" destOrd="0" parTransId="{539F2902-581B-4C7B-8D75-DEF3040279BE}" sibTransId="{4F7EFE67-CDA0-4B18-98B0-702E2C193639}"/>
+    <dgm:cxn modelId="{7324962B-816B-4D46-AF0A-2D7442A4F694}" type="presOf" srcId="{72E5C0A2-CDBB-4248-8857-1960FB47F98A}" destId="{324332A2-187F-40EC-9D32-90A01310E001}" srcOrd="0" destOrd="0" presId="urn:microsoft.com/office/officeart/2005/8/layout/target3"/>
+    <dgm:cxn modelId="{7E54421C-FE41-40EE-A661-CBF1A2B0520E}" type="presOf" srcId="{FA206D9D-D7C3-4277-A0D4-3722447E9CA3}" destId="{C7123417-496D-40A8-8D26-F1051666D481}" srcOrd="1" destOrd="0" presId="urn:microsoft.com/office/officeart/2005/8/layout/target3"/>
+    <dgm:cxn modelId="{3CB42773-2E6A-4F7E-A4D9-FC19B1B347C6}" srcId="{5ADEB24A-9993-4187-9C01-3E39E20C6455}" destId="{47EA39A3-6FE9-4F1A-BA24-12B219773729}" srcOrd="0" destOrd="0" parTransId="{50AF66CF-8388-4AB9-A640-F994F3A5EA98}" sibTransId="{0CBF4A81-FB8D-496C-99AE-07FDDDC54C24}"/>
     <dgm:cxn modelId="{01705092-DB3F-4674-B939-5345A98BB1C4}" type="presOf" srcId="{5ADEB24A-9993-4187-9C01-3E39E20C6455}" destId="{C207763C-36DC-456A-9645-9F5C337E7E08}" srcOrd="0" destOrd="0" presId="urn:microsoft.com/office/officeart/2005/8/layout/target3"/>
-    <dgm:cxn modelId="{940B4866-E5AA-43EB-9724-1EF1AE6EED09}" srcId="{D040B921-C113-4B26-9DE5-BE1CBCE21260}" destId="{8A0A79B8-A78F-4EEB-9881-D96988943A64}" srcOrd="1" destOrd="0" parTransId="{D022A5B6-47CC-466E-BC7A-F9F539FB7C79}" sibTransId="{BEB659B8-6803-4553-8539-B31EC0F79F9B}"/>
-    <dgm:cxn modelId="{FB27F5C8-47DF-4D56-8742-B8171C9A5D77}" srcId="{5ADEB24A-9993-4187-9C01-3E39E20C6455}" destId="{8F43BE92-E2AE-4ADF-AB7D-C30FE2C8DED5}" srcOrd="1" destOrd="0" parTransId="{453E8120-26A4-4397-AE50-3885CA690F46}" sibTransId="{1FA2C281-5749-473F-A1DB-91C6A71C9690}"/>
-    <dgm:cxn modelId="{7E89FBD6-EABB-49E3-8A1A-F9409B305059}" srcId="{5045E2E4-0BCB-45C8-BEC8-562A81950857}" destId="{FA206D9D-D7C3-4277-A0D4-3722447E9CA3}" srcOrd="0" destOrd="0" parTransId="{539F2902-581B-4C7B-8D75-DEF3040279BE}" sibTransId="{4F7EFE67-CDA0-4B18-98B0-702E2C193639}"/>
-    <dgm:cxn modelId="{95681388-679F-41CE-873A-3685BF5D526D}" type="presOf" srcId="{8A0A79B8-A78F-4EEB-9881-D96988943A64}" destId="{6804F6C2-8B0A-44A8-9515-ED0AA9D8B422}" srcOrd="0" destOrd="1" presId="urn:microsoft.com/office/officeart/2005/8/layout/target3"/>
-    <dgm:cxn modelId="{3CB42773-2E6A-4F7E-A4D9-FC19B1B347C6}" srcId="{5ADEB24A-9993-4187-9C01-3E39E20C6455}" destId="{47EA39A3-6FE9-4F1A-BA24-12B219773729}" srcOrd="0" destOrd="0" parTransId="{50AF66CF-8388-4AB9-A640-F994F3A5EA98}" sibTransId="{0CBF4A81-FB8D-496C-99AE-07FDDDC54C24}"/>
-    <dgm:cxn modelId="{97970E31-04F1-41C6-8DC4-58EA8996B44F}" type="presOf" srcId="{D040B921-C113-4B26-9DE5-BE1CBCE21260}" destId="{FC59B988-DFA2-4B29-8B6E-2DBE645F887A}" srcOrd="0" destOrd="0" presId="urn:microsoft.com/office/officeart/2005/8/layout/target3"/>
-    <dgm:cxn modelId="{4C6117CC-F531-4141-A1DC-31276D2CFC13}" type="presOf" srcId="{D040B921-C113-4B26-9DE5-BE1CBCE21260}" destId="{C5549C68-CACF-4009-BA4E-43BAAFD9F35F}" srcOrd="1" destOrd="0" presId="urn:microsoft.com/office/officeart/2005/8/layout/target3"/>
-    <dgm:cxn modelId="{7E54421C-FE41-40EE-A661-CBF1A2B0520E}" type="presOf" srcId="{FA206D9D-D7C3-4277-A0D4-3722447E9CA3}" destId="{C7123417-496D-40A8-8D26-F1051666D481}" srcOrd="1" destOrd="0" presId="urn:microsoft.com/office/officeart/2005/8/layout/target3"/>
-    <dgm:cxn modelId="{966809E2-AE77-46A3-9CBF-F1A0DC6B23A5}" type="presOf" srcId="{5045E2E4-0BCB-45C8-BEC8-562A81950857}" destId="{EBEA420C-5EED-41FF-966E-C2CCD3258E16}" srcOrd="0" destOrd="0" presId="urn:microsoft.com/office/officeart/2005/8/layout/target3"/>
     <dgm:cxn modelId="{14AE3BFC-FE13-4981-93ED-A09A731480BB}" type="presParOf" srcId="{EBEA420C-5EED-41FF-966E-C2CCD3258E16}" destId="{6F030DDA-D166-478C-91C8-FACEBDDF9390}" srcOrd="0" destOrd="0" presId="urn:microsoft.com/office/officeart/2005/8/layout/target3"/>
     <dgm:cxn modelId="{621022B4-429B-44B1-9285-2DB64D4BE25A}" type="presParOf" srcId="{EBEA420C-5EED-41FF-966E-C2CCD3258E16}" destId="{59114E17-1610-4431-88CD-98A33517C0FB}" srcOrd="1" destOrd="0" presId="urn:microsoft.com/office/officeart/2005/8/layout/target3"/>
     <dgm:cxn modelId="{0143D807-E07B-4A81-8244-6C446E87B831}" type="presParOf" srcId="{EBEA420C-5EED-41FF-966E-C2CCD3258E16}" destId="{E54E618C-EAB4-4AC2-941E-371E58385292}" srcOrd="2" destOrd="0" presId="urn:microsoft.com/office/officeart/2005/8/layout/target3"/>
@@ -4082,12 +4281,17 @@
     <dgm:cxn modelId="{CFFEBEBC-9616-411A-9A55-17AC2928852C}" type="presParOf" srcId="{EBEA420C-5EED-41FF-966E-C2CCD3258E16}" destId="{E1ED8523-586D-4B28-93FD-F2737C3F14F8}" srcOrd="6" destOrd="0" presId="urn:microsoft.com/office/officeart/2005/8/layout/target3"/>
     <dgm:cxn modelId="{9CAA86EF-CCCA-4E1E-AB6C-65D2BE542B51}" type="presParOf" srcId="{EBEA420C-5EED-41FF-966E-C2CCD3258E16}" destId="{7C19A195-982E-4F11-88A4-62C6FEDC881A}" srcOrd="7" destOrd="0" presId="urn:microsoft.com/office/officeart/2005/8/layout/target3"/>
     <dgm:cxn modelId="{C6C6E5EC-CEA3-42E8-8688-54EC97793BD3}" type="presParOf" srcId="{EBEA420C-5EED-41FF-966E-C2CCD3258E16}" destId="{C207763C-36DC-456A-9645-9F5C337E7E08}" srcOrd="8" destOrd="0" presId="urn:microsoft.com/office/officeart/2005/8/layout/target3"/>
-    <dgm:cxn modelId="{D3EDB6FE-8259-4A2B-A0DD-CAB170DE119F}" type="presParOf" srcId="{EBEA420C-5EED-41FF-966E-C2CCD3258E16}" destId="{C7123417-496D-40A8-8D26-F1051666D481}" srcOrd="9" destOrd="0" presId="urn:microsoft.com/office/officeart/2005/8/layout/target3"/>
-    <dgm:cxn modelId="{2094762B-AB1B-48C9-ABC5-1AF85089C993}" type="presParOf" srcId="{EBEA420C-5EED-41FF-966E-C2CCD3258E16}" destId="{1DD53AA5-C979-4BD5-811D-7C9FFF8C3A8C}" srcOrd="10" destOrd="0" presId="urn:microsoft.com/office/officeart/2005/8/layout/target3"/>
-    <dgm:cxn modelId="{F18B3766-2668-4993-ABA0-ED0166D56A67}" type="presParOf" srcId="{EBEA420C-5EED-41FF-966E-C2CCD3258E16}" destId="{C5549C68-CACF-4009-BA4E-43BAAFD9F35F}" srcOrd="11" destOrd="0" presId="urn:microsoft.com/office/officeart/2005/8/layout/target3"/>
-    <dgm:cxn modelId="{2B172133-949D-4E3F-981E-ED963E265543}" type="presParOf" srcId="{EBEA420C-5EED-41FF-966E-C2CCD3258E16}" destId="{6804F6C2-8B0A-44A8-9515-ED0AA9D8B422}" srcOrd="12" destOrd="0" presId="urn:microsoft.com/office/officeart/2005/8/layout/target3"/>
-    <dgm:cxn modelId="{BA6515F3-DA3F-4391-AB8F-00991C19E281}" type="presParOf" srcId="{EBEA420C-5EED-41FF-966E-C2CCD3258E16}" destId="{11C57694-A64A-4FE0-AD45-CA86CE82A072}" srcOrd="13" destOrd="0" presId="urn:microsoft.com/office/officeart/2005/8/layout/target3"/>
-    <dgm:cxn modelId="{727B4437-3422-4E74-B29B-F96A86D692F5}" type="presParOf" srcId="{EBEA420C-5EED-41FF-966E-C2CCD3258E16}" destId="{DD9696E8-A6AA-4CB6-8DFF-DE8BF474CD5C}" srcOrd="14" destOrd="0" presId="urn:microsoft.com/office/officeart/2005/8/layout/target3"/>
+    <dgm:cxn modelId="{16C9EE70-DD76-454F-B520-44317B3808A8}" type="presParOf" srcId="{EBEA420C-5EED-41FF-966E-C2CCD3258E16}" destId="{2E9572C3-6E26-42D7-A979-16D5FF533531}" srcOrd="9" destOrd="0" presId="urn:microsoft.com/office/officeart/2005/8/layout/target3"/>
+    <dgm:cxn modelId="{5E8511DD-464C-44FD-81CF-9BAF1DE3FC27}" type="presParOf" srcId="{EBEA420C-5EED-41FF-966E-C2CCD3258E16}" destId="{F17034C1-3050-4F5B-A3AA-7EE9EB380453}" srcOrd="10" destOrd="0" presId="urn:microsoft.com/office/officeart/2005/8/layout/target3"/>
+    <dgm:cxn modelId="{536F922C-B4DC-422C-A90D-E46D3A20C25E}" type="presParOf" srcId="{EBEA420C-5EED-41FF-966E-C2CCD3258E16}" destId="{324332A2-187F-40EC-9D32-90A01310E001}" srcOrd="11" destOrd="0" presId="urn:microsoft.com/office/officeart/2005/8/layout/target3"/>
+    <dgm:cxn modelId="{D3EDB6FE-8259-4A2B-A0DD-CAB170DE119F}" type="presParOf" srcId="{EBEA420C-5EED-41FF-966E-C2CCD3258E16}" destId="{C7123417-496D-40A8-8D26-F1051666D481}" srcOrd="12" destOrd="0" presId="urn:microsoft.com/office/officeart/2005/8/layout/target3"/>
+    <dgm:cxn modelId="{2094762B-AB1B-48C9-ABC5-1AF85089C993}" type="presParOf" srcId="{EBEA420C-5EED-41FF-966E-C2CCD3258E16}" destId="{1DD53AA5-C979-4BD5-811D-7C9FFF8C3A8C}" srcOrd="13" destOrd="0" presId="urn:microsoft.com/office/officeart/2005/8/layout/target3"/>
+    <dgm:cxn modelId="{F18B3766-2668-4993-ABA0-ED0166D56A67}" type="presParOf" srcId="{EBEA420C-5EED-41FF-966E-C2CCD3258E16}" destId="{C5549C68-CACF-4009-BA4E-43BAAFD9F35F}" srcOrd="14" destOrd="0" presId="urn:microsoft.com/office/officeart/2005/8/layout/target3"/>
+    <dgm:cxn modelId="{2B172133-949D-4E3F-981E-ED963E265543}" type="presParOf" srcId="{EBEA420C-5EED-41FF-966E-C2CCD3258E16}" destId="{6804F6C2-8B0A-44A8-9515-ED0AA9D8B422}" srcOrd="15" destOrd="0" presId="urn:microsoft.com/office/officeart/2005/8/layout/target3"/>
+    <dgm:cxn modelId="{BA6515F3-DA3F-4391-AB8F-00991C19E281}" type="presParOf" srcId="{EBEA420C-5EED-41FF-966E-C2CCD3258E16}" destId="{11C57694-A64A-4FE0-AD45-CA86CE82A072}" srcOrd="16" destOrd="0" presId="urn:microsoft.com/office/officeart/2005/8/layout/target3"/>
+    <dgm:cxn modelId="{727B4437-3422-4E74-B29B-F96A86D692F5}" type="presParOf" srcId="{EBEA420C-5EED-41FF-966E-C2CCD3258E16}" destId="{DD9696E8-A6AA-4CB6-8DFF-DE8BF474CD5C}" srcOrd="17" destOrd="0" presId="urn:microsoft.com/office/officeart/2005/8/layout/target3"/>
+    <dgm:cxn modelId="{FADE5060-40EC-4DA0-896B-E2250098866F}" type="presParOf" srcId="{EBEA420C-5EED-41FF-966E-C2CCD3258E16}" destId="{9767178A-C424-4C85-B545-A9071A5FA168}" srcOrd="18" destOrd="0" presId="urn:microsoft.com/office/officeart/2005/8/layout/target3"/>
+    <dgm:cxn modelId="{59DCF376-A28D-4CAF-A591-7C844FEA55C0}" type="presParOf" srcId="{EBEA420C-5EED-41FF-966E-C2CCD3258E16}" destId="{235D30E3-E903-4180-A297-AE947FA47B83}" srcOrd="19" destOrd="0" presId="urn:microsoft.com/office/officeart/2005/8/layout/target3"/>
   </dgm:cxnLst>
   <dgm:bg/>
   <dgm:whole/>
@@ -4122,15 +4326,7 @@
         <a:p>
           <a:r>
             <a:rPr lang="fr-FR" dirty="0" smtClean="0"/>
-            <a:t>Calculs des </a:t>
-          </a:r>
-          <a:r>
-            <a:rPr lang="fr-FR" dirty="0" smtClean="0"/>
-            <a:t>règles intéressantes </a:t>
-          </a:r>
-          <a:r>
-            <a:rPr lang="fr-FR" dirty="0" smtClean="0"/>
-            <a:t>par le modèle</a:t>
+            <a:t>Calculs des règles intéressantes par le modèle</a:t>
           </a:r>
         </a:p>
       </dgm:t>
@@ -4835,35 +5031,92 @@
             <a:gd name="adj2" fmla="val 16200000"/>
           </a:avLst>
         </a:prstGeom>
-        <a:solidFill>
-          <a:schemeClr val="accent1">
-            <a:hueOff val="0"/>
-            <a:satOff val="0"/>
-            <a:lumOff val="0"/>
-            <a:alphaOff val="0"/>
-          </a:schemeClr>
-        </a:solidFill>
-        <a:ln w="55000" cap="flat" cmpd="thickThin" algn="ctr">
-          <a:solidFill>
-            <a:schemeClr val="lt1">
+        <a:gradFill rotWithShape="0">
+          <a:gsLst>
+            <a:gs pos="0">
+              <a:schemeClr val="accent1">
+                <a:hueOff val="0"/>
+                <a:satOff val="0"/>
+                <a:lumOff val="0"/>
+                <a:alphaOff val="0"/>
+                <a:shade val="15000"/>
+                <a:satMod val="180000"/>
+              </a:schemeClr>
+            </a:gs>
+            <a:gs pos="50000">
+              <a:schemeClr val="accent1">
+                <a:hueOff val="0"/>
+                <a:satOff val="0"/>
+                <a:lumOff val="0"/>
+                <a:alphaOff val="0"/>
+                <a:shade val="45000"/>
+                <a:satMod val="170000"/>
+              </a:schemeClr>
+            </a:gs>
+            <a:gs pos="70000">
+              <a:schemeClr val="accent1">
+                <a:hueOff val="0"/>
+                <a:satOff val="0"/>
+                <a:lumOff val="0"/>
+                <a:alphaOff val="0"/>
+                <a:tint val="99000"/>
+                <a:shade val="65000"/>
+                <a:satMod val="155000"/>
+              </a:schemeClr>
+            </a:gs>
+            <a:gs pos="100000">
+              <a:schemeClr val="accent1">
+                <a:hueOff val="0"/>
+                <a:satOff val="0"/>
+                <a:lumOff val="0"/>
+                <a:alphaOff val="0"/>
+                <a:tint val="95500"/>
+                <a:shade val="100000"/>
+                <a:satMod val="155000"/>
+              </a:schemeClr>
+            </a:gs>
+          </a:gsLst>
+          <a:lin ang="16200000" scaled="0"/>
+        </a:gradFill>
+        <a:ln>
+          <a:noFill/>
+        </a:ln>
+        <a:effectLst>
+          <a:outerShdw blurRad="63500" dist="38100" dir="5400000" rotWithShape="0">
+            <a:srgbClr val="000000">
+              <a:alpha val="45000"/>
+            </a:srgbClr>
+          </a:outerShdw>
+        </a:effectLst>
+        <a:scene3d>
+          <a:camera prst="orthographicFront" fov="0">
+            <a:rot lat="0" lon="0" rev="0"/>
+          </a:camera>
+          <a:lightRig rig="glow" dir="t">
+            <a:rot lat="0" lon="0" rev="6360000"/>
+          </a:lightRig>
+        </a:scene3d>
+        <a:sp3d contourW="1000" prstMaterial="flat">
+          <a:bevelT w="95250" h="101600"/>
+          <a:contourClr>
+            <a:schemeClr val="accent1">
               <a:hueOff val="0"/>
               <a:satOff val="0"/>
               <a:lumOff val="0"/>
               <a:alphaOff val="0"/>
+              <a:satMod val="300000"/>
             </a:schemeClr>
-          </a:solidFill>
-          <a:prstDash val="solid"/>
-        </a:ln>
-        <a:effectLst/>
+          </a:contourClr>
+        </a:sp3d>
       </dsp:spPr>
       <dsp:style>
-        <a:lnRef idx="2">
+        <a:lnRef idx="0">
           <a:scrgbClr r="0" g="0" b="0"/>
         </a:lnRef>
-        <a:fillRef idx="1">
+        <a:fillRef idx="3">
           <a:scrgbClr r="0" g="0" b="0"/>
         </a:fillRef>
-        <a:effectRef idx="0">
+        <a:effectRef idx="3">
           <a:scrgbClr r="0" g="0" b="0"/>
         </a:effectRef>
         <a:fontRef idx="minor">
@@ -4893,7 +5146,7 @@
             <a:alphaOff val="0"/>
           </a:schemeClr>
         </a:solidFill>
-        <a:ln w="55000" cap="flat" cmpd="thickThin" algn="ctr">
+        <a:ln w="9525" cap="flat" cmpd="sng" algn="ctr">
           <a:solidFill>
             <a:schemeClr val="accent1">
               <a:hueOff val="0"/>
@@ -4904,16 +5157,22 @@
           </a:solidFill>
           <a:prstDash val="solid"/>
         </a:ln>
-        <a:effectLst/>
+        <a:effectLst>
+          <a:outerShdw blurRad="50800" dist="38100" dir="5400000" rotWithShape="0">
+            <a:srgbClr val="000000">
+              <a:alpha val="35000"/>
+            </a:srgbClr>
+          </a:outerShdw>
+        </a:effectLst>
       </dsp:spPr>
       <dsp:style>
-        <a:lnRef idx="2">
+        <a:lnRef idx="1">
           <a:scrgbClr r="0" g="0" b="0"/>
         </a:lnRef>
         <a:fillRef idx="1">
           <a:scrgbClr r="0" g="0" b="0"/>
         </a:fillRef>
-        <a:effectRef idx="0">
+        <a:effectRef idx="2">
           <a:scrgbClr r="0" g="0" b="0"/>
         </a:effectRef>
         <a:fontRef idx="minor"/>
@@ -4963,35 +5222,92 @@
             <a:gd name="adj2" fmla="val 16200000"/>
           </a:avLst>
         </a:prstGeom>
-        <a:solidFill>
-          <a:schemeClr val="accent1">
-            <a:hueOff val="0"/>
-            <a:satOff val="0"/>
-            <a:lumOff val="0"/>
-            <a:alphaOff val="0"/>
-          </a:schemeClr>
-        </a:solidFill>
-        <a:ln w="55000" cap="flat" cmpd="thickThin" algn="ctr">
-          <a:solidFill>
-            <a:schemeClr val="lt1">
+        <a:gradFill rotWithShape="0">
+          <a:gsLst>
+            <a:gs pos="0">
+              <a:schemeClr val="accent1">
+                <a:hueOff val="0"/>
+                <a:satOff val="0"/>
+                <a:lumOff val="0"/>
+                <a:alphaOff val="0"/>
+                <a:shade val="15000"/>
+                <a:satMod val="180000"/>
+              </a:schemeClr>
+            </a:gs>
+            <a:gs pos="50000">
+              <a:schemeClr val="accent1">
+                <a:hueOff val="0"/>
+                <a:satOff val="0"/>
+                <a:lumOff val="0"/>
+                <a:alphaOff val="0"/>
+                <a:shade val="45000"/>
+                <a:satMod val="170000"/>
+              </a:schemeClr>
+            </a:gs>
+            <a:gs pos="70000">
+              <a:schemeClr val="accent1">
+                <a:hueOff val="0"/>
+                <a:satOff val="0"/>
+                <a:lumOff val="0"/>
+                <a:alphaOff val="0"/>
+                <a:tint val="99000"/>
+                <a:shade val="65000"/>
+                <a:satMod val="155000"/>
+              </a:schemeClr>
+            </a:gs>
+            <a:gs pos="100000">
+              <a:schemeClr val="accent1">
+                <a:hueOff val="0"/>
+                <a:satOff val="0"/>
+                <a:lumOff val="0"/>
+                <a:alphaOff val="0"/>
+                <a:tint val="95500"/>
+                <a:shade val="100000"/>
+                <a:satMod val="155000"/>
+              </a:schemeClr>
+            </a:gs>
+          </a:gsLst>
+          <a:lin ang="16200000" scaled="0"/>
+        </a:gradFill>
+        <a:ln>
+          <a:noFill/>
+        </a:ln>
+        <a:effectLst>
+          <a:outerShdw blurRad="63500" dist="38100" dir="5400000" rotWithShape="0">
+            <a:srgbClr val="000000">
+              <a:alpha val="45000"/>
+            </a:srgbClr>
+          </a:outerShdw>
+        </a:effectLst>
+        <a:scene3d>
+          <a:camera prst="orthographicFront" fov="0">
+            <a:rot lat="0" lon="0" rev="0"/>
+          </a:camera>
+          <a:lightRig rig="glow" dir="t">
+            <a:rot lat="0" lon="0" rev="6360000"/>
+          </a:lightRig>
+        </a:scene3d>
+        <a:sp3d contourW="1000" prstMaterial="flat">
+          <a:bevelT w="95250" h="101600"/>
+          <a:contourClr>
+            <a:schemeClr val="accent1">
               <a:hueOff val="0"/>
               <a:satOff val="0"/>
               <a:lumOff val="0"/>
               <a:alphaOff val="0"/>
+              <a:satMod val="300000"/>
             </a:schemeClr>
-          </a:solidFill>
-          <a:prstDash val="solid"/>
-        </a:ln>
-        <a:effectLst/>
+          </a:contourClr>
+        </a:sp3d>
       </dsp:spPr>
       <dsp:style>
-        <a:lnRef idx="2">
+        <a:lnRef idx="0">
           <a:scrgbClr r="0" g="0" b="0"/>
         </a:lnRef>
-        <a:fillRef idx="1">
+        <a:fillRef idx="3">
           <a:scrgbClr r="0" g="0" b="0"/>
         </a:fillRef>
-        <a:effectRef idx="0">
+        <a:effectRef idx="3">
           <a:scrgbClr r="0" g="0" b="0"/>
         </a:effectRef>
         <a:fontRef idx="minor">
@@ -5021,7 +5337,7 @@
             <a:alphaOff val="0"/>
           </a:schemeClr>
         </a:solidFill>
-        <a:ln w="55000" cap="flat" cmpd="thickThin" algn="ctr">
+        <a:ln w="9525" cap="flat" cmpd="sng" algn="ctr">
           <a:solidFill>
             <a:schemeClr val="accent1">
               <a:hueOff val="0"/>
@@ -5032,16 +5348,22 @@
           </a:solidFill>
           <a:prstDash val="solid"/>
         </a:ln>
-        <a:effectLst/>
+        <a:effectLst>
+          <a:outerShdw blurRad="50800" dist="38100" dir="5400000" rotWithShape="0">
+            <a:srgbClr val="000000">
+              <a:alpha val="35000"/>
+            </a:srgbClr>
+          </a:outerShdw>
+        </a:effectLst>
       </dsp:spPr>
       <dsp:style>
-        <a:lnRef idx="2">
+        <a:lnRef idx="1">
           <a:scrgbClr r="0" g="0" b="0"/>
         </a:lnRef>
         <a:fillRef idx="1">
           <a:scrgbClr r="0" g="0" b="0"/>
         </a:fillRef>
-        <a:effectRef idx="0">
+        <a:effectRef idx="2">
           <a:scrgbClr r="0" g="0" b="0"/>
         </a:effectRef>
         <a:fontRef idx="minor"/>
@@ -5091,35 +5413,92 @@
             <a:gd name="adj2" fmla="val 16200000"/>
           </a:avLst>
         </a:prstGeom>
-        <a:solidFill>
-          <a:schemeClr val="accent1">
-            <a:hueOff val="0"/>
-            <a:satOff val="0"/>
-            <a:lumOff val="0"/>
-            <a:alphaOff val="0"/>
-          </a:schemeClr>
-        </a:solidFill>
-        <a:ln w="55000" cap="flat" cmpd="thickThin" algn="ctr">
-          <a:solidFill>
-            <a:schemeClr val="lt1">
+        <a:gradFill rotWithShape="0">
+          <a:gsLst>
+            <a:gs pos="0">
+              <a:schemeClr val="accent1">
+                <a:hueOff val="0"/>
+                <a:satOff val="0"/>
+                <a:lumOff val="0"/>
+                <a:alphaOff val="0"/>
+                <a:shade val="15000"/>
+                <a:satMod val="180000"/>
+              </a:schemeClr>
+            </a:gs>
+            <a:gs pos="50000">
+              <a:schemeClr val="accent1">
+                <a:hueOff val="0"/>
+                <a:satOff val="0"/>
+                <a:lumOff val="0"/>
+                <a:alphaOff val="0"/>
+                <a:shade val="45000"/>
+                <a:satMod val="170000"/>
+              </a:schemeClr>
+            </a:gs>
+            <a:gs pos="70000">
+              <a:schemeClr val="accent1">
+                <a:hueOff val="0"/>
+                <a:satOff val="0"/>
+                <a:lumOff val="0"/>
+                <a:alphaOff val="0"/>
+                <a:tint val="99000"/>
+                <a:shade val="65000"/>
+                <a:satMod val="155000"/>
+              </a:schemeClr>
+            </a:gs>
+            <a:gs pos="100000">
+              <a:schemeClr val="accent1">
+                <a:hueOff val="0"/>
+                <a:satOff val="0"/>
+                <a:lumOff val="0"/>
+                <a:alphaOff val="0"/>
+                <a:tint val="95500"/>
+                <a:shade val="100000"/>
+                <a:satMod val="155000"/>
+              </a:schemeClr>
+            </a:gs>
+          </a:gsLst>
+          <a:lin ang="16200000" scaled="0"/>
+        </a:gradFill>
+        <a:ln>
+          <a:noFill/>
+        </a:ln>
+        <a:effectLst>
+          <a:outerShdw blurRad="63500" dist="38100" dir="5400000" rotWithShape="0">
+            <a:srgbClr val="000000">
+              <a:alpha val="45000"/>
+            </a:srgbClr>
+          </a:outerShdw>
+        </a:effectLst>
+        <a:scene3d>
+          <a:camera prst="orthographicFront" fov="0">
+            <a:rot lat="0" lon="0" rev="0"/>
+          </a:camera>
+          <a:lightRig rig="glow" dir="t">
+            <a:rot lat="0" lon="0" rev="6360000"/>
+          </a:lightRig>
+        </a:scene3d>
+        <a:sp3d contourW="1000" prstMaterial="flat">
+          <a:bevelT w="95250" h="101600"/>
+          <a:contourClr>
+            <a:schemeClr val="accent1">
               <a:hueOff val="0"/>
               <a:satOff val="0"/>
               <a:lumOff val="0"/>
               <a:alphaOff val="0"/>
+              <a:satMod val="300000"/>
             </a:schemeClr>
-          </a:solidFill>
-          <a:prstDash val="solid"/>
-        </a:ln>
-        <a:effectLst/>
+          </a:contourClr>
+        </a:sp3d>
       </dsp:spPr>
       <dsp:style>
-        <a:lnRef idx="2">
+        <a:lnRef idx="0">
           <a:scrgbClr r="0" g="0" b="0"/>
         </a:lnRef>
-        <a:fillRef idx="1">
+        <a:fillRef idx="3">
           <a:scrgbClr r="0" g="0" b="0"/>
         </a:fillRef>
-        <a:effectRef idx="0">
+        <a:effectRef idx="3">
           <a:scrgbClr r="0" g="0" b="0"/>
         </a:effectRef>
         <a:fontRef idx="minor">
@@ -5149,7 +5528,7 @@
             <a:alphaOff val="0"/>
           </a:schemeClr>
         </a:solidFill>
-        <a:ln w="55000" cap="flat" cmpd="thickThin" algn="ctr">
+        <a:ln w="9525" cap="flat" cmpd="sng" algn="ctr">
           <a:solidFill>
             <a:schemeClr val="accent1">
               <a:hueOff val="0"/>
@@ -5160,16 +5539,22 @@
           </a:solidFill>
           <a:prstDash val="solid"/>
         </a:ln>
-        <a:effectLst/>
+        <a:effectLst>
+          <a:outerShdw blurRad="50800" dist="38100" dir="5400000" rotWithShape="0">
+            <a:srgbClr val="000000">
+              <a:alpha val="35000"/>
+            </a:srgbClr>
+          </a:outerShdw>
+        </a:effectLst>
       </dsp:spPr>
       <dsp:style>
-        <a:lnRef idx="2">
+        <a:lnRef idx="1">
           <a:scrgbClr r="0" g="0" b="0"/>
         </a:lnRef>
         <a:fillRef idx="1">
           <a:scrgbClr r="0" g="0" b="0"/>
         </a:fillRef>
-        <a:effectRef idx="0">
+        <a:effectRef idx="2">
           <a:scrgbClr r="0" g="0" b="0"/>
         </a:effectRef>
         <a:fontRef idx="minor"/>
@@ -5217,21 +5602,27 @@
           <a:avLst/>
         </a:prstGeom>
         <a:noFill/>
-        <a:ln w="55000" cap="flat" cmpd="thickThin" algn="ctr">
+        <a:ln w="9525" cap="flat" cmpd="sng" algn="ctr">
           <a:noFill/>
           <a:prstDash val="solid"/>
         </a:ln>
-        <a:effectLst/>
+        <a:effectLst>
+          <a:outerShdw blurRad="50800" dist="38100" dir="5400000" rotWithShape="0">
+            <a:srgbClr val="000000">
+              <a:alpha val="35000"/>
+            </a:srgbClr>
+          </a:outerShdw>
+        </a:effectLst>
         <a:sp3d/>
       </dsp:spPr>
       <dsp:style>
-        <a:lnRef idx="2">
+        <a:lnRef idx="1">
           <a:scrgbClr r="0" g="0" b="0"/>
         </a:lnRef>
         <a:fillRef idx="1">
           <a:scrgbClr r="0" g="0" b="0"/>
         </a:fillRef>
-        <a:effectRef idx="0">
+        <a:effectRef idx="2">
           <a:scrgbClr r="0" g="0" b="0"/>
         </a:effectRef>
         <a:fontRef idx="minor"/>
@@ -5291,21 +5682,27 @@
           <a:avLst/>
         </a:prstGeom>
         <a:noFill/>
-        <a:ln w="55000" cap="flat" cmpd="thickThin" algn="ctr">
+        <a:ln w="9525" cap="flat" cmpd="sng" algn="ctr">
           <a:noFill/>
           <a:prstDash val="solid"/>
         </a:ln>
-        <a:effectLst/>
+        <a:effectLst>
+          <a:outerShdw blurRad="50800" dist="38100" dir="5400000" rotWithShape="0">
+            <a:srgbClr val="000000">
+              <a:alpha val="35000"/>
+            </a:srgbClr>
+          </a:outerShdw>
+        </a:effectLst>
         <a:sp3d/>
       </dsp:spPr>
       <dsp:style>
-        <a:lnRef idx="2">
+        <a:lnRef idx="1">
           <a:scrgbClr r="0" g="0" b="0"/>
         </a:lnRef>
         <a:fillRef idx="1">
           <a:scrgbClr r="0" g="0" b="0"/>
         </a:fillRef>
-        <a:effectRef idx="0">
+        <a:effectRef idx="2">
           <a:scrgbClr r="0" g="0" b="0"/>
         </a:effectRef>
         <a:fontRef idx="minor"/>
@@ -5365,21 +5762,27 @@
           <a:avLst/>
         </a:prstGeom>
         <a:noFill/>
-        <a:ln w="55000" cap="flat" cmpd="thickThin" algn="ctr">
+        <a:ln w="9525" cap="flat" cmpd="sng" algn="ctr">
           <a:noFill/>
           <a:prstDash val="solid"/>
         </a:ln>
-        <a:effectLst/>
+        <a:effectLst>
+          <a:outerShdw blurRad="50800" dist="38100" dir="5400000" rotWithShape="0">
+            <a:srgbClr val="000000">
+              <a:alpha val="35000"/>
+            </a:srgbClr>
+          </a:outerShdw>
+        </a:effectLst>
         <a:sp3d/>
       </dsp:spPr>
       <dsp:style>
-        <a:lnRef idx="2">
+        <a:lnRef idx="1">
           <a:scrgbClr r="0" g="0" b="0"/>
         </a:lnRef>
         <a:fillRef idx="1">
           <a:scrgbClr r="0" g="0" b="0"/>
         </a:fillRef>
-        <a:effectRef idx="0">
+        <a:effectRef idx="2">
           <a:scrgbClr r="0" g="0" b="0"/>
         </a:effectRef>
         <a:fontRef idx="minor"/>
@@ -5453,35 +5856,92 @@
             <a:gd name="adj2" fmla="val 16200000"/>
           </a:avLst>
         </a:prstGeom>
-        <a:solidFill>
-          <a:schemeClr val="accent1">
-            <a:hueOff val="0"/>
-            <a:satOff val="0"/>
-            <a:lumOff val="0"/>
-            <a:alphaOff val="0"/>
-          </a:schemeClr>
-        </a:solidFill>
-        <a:ln w="55000" cap="flat" cmpd="thickThin" algn="ctr">
-          <a:solidFill>
-            <a:schemeClr val="lt1">
+        <a:gradFill rotWithShape="0">
+          <a:gsLst>
+            <a:gs pos="0">
+              <a:schemeClr val="accent1">
+                <a:hueOff val="0"/>
+                <a:satOff val="0"/>
+                <a:lumOff val="0"/>
+                <a:alphaOff val="0"/>
+                <a:shade val="15000"/>
+                <a:satMod val="180000"/>
+              </a:schemeClr>
+            </a:gs>
+            <a:gs pos="50000">
+              <a:schemeClr val="accent1">
+                <a:hueOff val="0"/>
+                <a:satOff val="0"/>
+                <a:lumOff val="0"/>
+                <a:alphaOff val="0"/>
+                <a:shade val="45000"/>
+                <a:satMod val="170000"/>
+              </a:schemeClr>
+            </a:gs>
+            <a:gs pos="70000">
+              <a:schemeClr val="accent1">
+                <a:hueOff val="0"/>
+                <a:satOff val="0"/>
+                <a:lumOff val="0"/>
+                <a:alphaOff val="0"/>
+                <a:tint val="99000"/>
+                <a:shade val="65000"/>
+                <a:satMod val="155000"/>
+              </a:schemeClr>
+            </a:gs>
+            <a:gs pos="100000">
+              <a:schemeClr val="accent1">
+                <a:hueOff val="0"/>
+                <a:satOff val="0"/>
+                <a:lumOff val="0"/>
+                <a:alphaOff val="0"/>
+                <a:tint val="95500"/>
+                <a:shade val="100000"/>
+                <a:satMod val="155000"/>
+              </a:schemeClr>
+            </a:gs>
+          </a:gsLst>
+          <a:lin ang="16200000" scaled="0"/>
+        </a:gradFill>
+        <a:ln>
+          <a:noFill/>
+        </a:ln>
+        <a:effectLst>
+          <a:outerShdw blurRad="63500" dist="38100" dir="5400000" rotWithShape="0">
+            <a:srgbClr val="000000">
+              <a:alpha val="45000"/>
+            </a:srgbClr>
+          </a:outerShdw>
+        </a:effectLst>
+        <a:scene3d>
+          <a:camera prst="orthographicFront" fov="0">
+            <a:rot lat="0" lon="0" rev="0"/>
+          </a:camera>
+          <a:lightRig rig="glow" dir="t">
+            <a:rot lat="0" lon="0" rev="6360000"/>
+          </a:lightRig>
+        </a:scene3d>
+        <a:sp3d contourW="1000" prstMaterial="flat">
+          <a:bevelT w="95250" h="101600"/>
+          <a:contourClr>
+            <a:schemeClr val="accent1">
               <a:hueOff val="0"/>
               <a:satOff val="0"/>
               <a:lumOff val="0"/>
               <a:alphaOff val="0"/>
+              <a:satMod val="300000"/>
             </a:schemeClr>
-          </a:solidFill>
-          <a:prstDash val="solid"/>
-        </a:ln>
-        <a:effectLst/>
+          </a:contourClr>
+        </a:sp3d>
       </dsp:spPr>
       <dsp:style>
-        <a:lnRef idx="2">
+        <a:lnRef idx="0">
           <a:scrgbClr r="0" g="0" b="0"/>
         </a:lnRef>
-        <a:fillRef idx="1">
+        <a:fillRef idx="3">
           <a:scrgbClr r="0" g="0" b="0"/>
         </a:fillRef>
-        <a:effectRef idx="0">
+        <a:effectRef idx="3">
           <a:scrgbClr r="0" g="0" b="0"/>
         </a:effectRef>
         <a:fontRef idx="minor">
@@ -5511,7 +5971,7 @@
             <a:alphaOff val="0"/>
           </a:schemeClr>
         </a:solidFill>
-        <a:ln w="55000" cap="flat" cmpd="thickThin" algn="ctr">
+        <a:ln w="9525" cap="flat" cmpd="sng" algn="ctr">
           <a:solidFill>
             <a:schemeClr val="accent1">
               <a:hueOff val="0"/>
@@ -5522,27 +5982,33 @@
           </a:solidFill>
           <a:prstDash val="solid"/>
         </a:ln>
-        <a:effectLst/>
+        <a:effectLst>
+          <a:outerShdw blurRad="50800" dist="38100" dir="5400000" rotWithShape="0">
+            <a:srgbClr val="000000">
+              <a:alpha val="35000"/>
+            </a:srgbClr>
+          </a:outerShdw>
+        </a:effectLst>
       </dsp:spPr>
       <dsp:style>
-        <a:lnRef idx="2">
+        <a:lnRef idx="1">
           <a:scrgbClr r="0" g="0" b="0"/>
         </a:lnRef>
         <a:fillRef idx="1">
           <a:scrgbClr r="0" g="0" b="0"/>
         </a:fillRef>
-        <a:effectRef idx="0">
+        <a:effectRef idx="2">
           <a:scrgbClr r="0" g="0" b="0"/>
         </a:effectRef>
         <a:fontRef idx="minor"/>
       </dsp:style>
       <dsp:txBody>
-        <a:bodyPr spcFirstLastPara="0" vert="horz" wrap="square" lIns="87630" tIns="87630" rIns="87630" bIns="87630" numCol="1" spcCol="1270" anchor="ctr" anchorCtr="0">
+        <a:bodyPr spcFirstLastPara="0" vert="horz" wrap="square" lIns="83820" tIns="83820" rIns="83820" bIns="83820" numCol="1" spcCol="1270" anchor="ctr" anchorCtr="0">
           <a:noAutofit/>
         </a:bodyPr>
         <a:lstStyle/>
         <a:p>
-          <a:pPr lvl="0" algn="ctr" defTabSz="1022350">
+          <a:pPr lvl="0" algn="ctr" defTabSz="977900">
             <a:lnSpc>
               <a:spcPct val="90000"/>
             </a:lnSpc>
@@ -5554,15 +6020,15 @@
             </a:spcAft>
           </a:pPr>
           <a:r>
-            <a:rPr lang="fr-FR" sz="2300" kern="1200" dirty="0" smtClean="0"/>
+            <a:rPr lang="fr-FR" sz="2200" kern="1200" dirty="0" smtClean="0"/>
             <a:t>Interface graphique et contrôleur </a:t>
           </a:r>
-          <a:endParaRPr lang="fr-FR" sz="2300" kern="1200" dirty="0"/>
+          <a:endParaRPr lang="fr-FR" sz="2200" kern="1200" dirty="0"/>
         </a:p>
       </dsp:txBody>
       <dsp:txXfrm>
         <a:off x="2262981" y="0"/>
-        <a:ext cx="2983309" cy="1357791"/>
+        <a:ext cx="2983309" cy="961766"/>
       </dsp:txXfrm>
     </dsp:sp>
     <dsp:sp modelId="{BCF97AE4-288F-4DF9-92F6-C31125C0BB4B}">
@@ -5572,8 +6038,8 @@
       </dsp:nvSpPr>
       <dsp:spPr>
         <a:xfrm>
-          <a:off x="792044" y="1357791"/>
-          <a:ext cx="2941872" cy="2941872"/>
+          <a:off x="594032" y="961766"/>
+          <a:ext cx="3337896" cy="3337896"/>
         </a:xfrm>
         <a:prstGeom prst="pie">
           <a:avLst>
@@ -5581,35 +6047,92 @@
             <a:gd name="adj2" fmla="val 16200000"/>
           </a:avLst>
         </a:prstGeom>
-        <a:solidFill>
-          <a:schemeClr val="accent1">
-            <a:hueOff val="0"/>
-            <a:satOff val="0"/>
-            <a:lumOff val="0"/>
-            <a:alphaOff val="0"/>
-          </a:schemeClr>
-        </a:solidFill>
-        <a:ln w="55000" cap="flat" cmpd="thickThin" algn="ctr">
-          <a:solidFill>
-            <a:schemeClr val="lt1">
+        <a:gradFill rotWithShape="0">
+          <a:gsLst>
+            <a:gs pos="0">
+              <a:schemeClr val="accent1">
+                <a:hueOff val="0"/>
+                <a:satOff val="0"/>
+                <a:lumOff val="0"/>
+                <a:alphaOff val="0"/>
+                <a:shade val="15000"/>
+                <a:satMod val="180000"/>
+              </a:schemeClr>
+            </a:gs>
+            <a:gs pos="50000">
+              <a:schemeClr val="accent1">
+                <a:hueOff val="0"/>
+                <a:satOff val="0"/>
+                <a:lumOff val="0"/>
+                <a:alphaOff val="0"/>
+                <a:shade val="45000"/>
+                <a:satMod val="170000"/>
+              </a:schemeClr>
+            </a:gs>
+            <a:gs pos="70000">
+              <a:schemeClr val="accent1">
+                <a:hueOff val="0"/>
+                <a:satOff val="0"/>
+                <a:lumOff val="0"/>
+                <a:alphaOff val="0"/>
+                <a:tint val="99000"/>
+                <a:shade val="65000"/>
+                <a:satMod val="155000"/>
+              </a:schemeClr>
+            </a:gs>
+            <a:gs pos="100000">
+              <a:schemeClr val="accent1">
+                <a:hueOff val="0"/>
+                <a:satOff val="0"/>
+                <a:lumOff val="0"/>
+                <a:alphaOff val="0"/>
+                <a:tint val="95500"/>
+                <a:shade val="100000"/>
+                <a:satMod val="155000"/>
+              </a:schemeClr>
+            </a:gs>
+          </a:gsLst>
+          <a:lin ang="16200000" scaled="0"/>
+        </a:gradFill>
+        <a:ln>
+          <a:noFill/>
+        </a:ln>
+        <a:effectLst>
+          <a:outerShdw blurRad="63500" dist="38100" dir="5400000" rotWithShape="0">
+            <a:srgbClr val="000000">
+              <a:alpha val="45000"/>
+            </a:srgbClr>
+          </a:outerShdw>
+        </a:effectLst>
+        <a:scene3d>
+          <a:camera prst="orthographicFront" fov="0">
+            <a:rot lat="0" lon="0" rev="0"/>
+          </a:camera>
+          <a:lightRig rig="glow" dir="t">
+            <a:rot lat="0" lon="0" rev="6360000"/>
+          </a:lightRig>
+        </a:scene3d>
+        <a:sp3d contourW="1000" prstMaterial="flat">
+          <a:bevelT w="95250" h="101600"/>
+          <a:contourClr>
+            <a:schemeClr val="accent1">
               <a:hueOff val="0"/>
               <a:satOff val="0"/>
               <a:lumOff val="0"/>
               <a:alphaOff val="0"/>
+              <a:satMod val="300000"/>
             </a:schemeClr>
-          </a:solidFill>
-          <a:prstDash val="solid"/>
-        </a:ln>
-        <a:effectLst/>
+          </a:contourClr>
+        </a:sp3d>
       </dsp:spPr>
       <dsp:style>
-        <a:lnRef idx="2">
+        <a:lnRef idx="0">
           <a:scrgbClr r="0" g="0" b="0"/>
         </a:lnRef>
-        <a:fillRef idx="1">
+        <a:fillRef idx="3">
           <a:scrgbClr r="0" g="0" b="0"/>
         </a:fillRef>
-        <a:effectRef idx="0">
+        <a:effectRef idx="3">
           <a:scrgbClr r="0" g="0" b="0"/>
         </a:effectRef>
         <a:fontRef idx="minor">
@@ -5624,8 +6147,8 @@
       </dsp:nvSpPr>
       <dsp:spPr>
         <a:xfrm>
-          <a:off x="2262981" y="1357791"/>
-          <a:ext cx="5966619" cy="2941872"/>
+          <a:off x="2262981" y="961766"/>
+          <a:ext cx="5966619" cy="3337896"/>
         </a:xfrm>
         <a:prstGeom prst="rect">
           <a:avLst/>
@@ -5639,7 +6162,7 @@
             <a:alphaOff val="0"/>
           </a:schemeClr>
         </a:solidFill>
-        <a:ln w="55000" cap="flat" cmpd="thickThin" algn="ctr">
+        <a:ln w="9525" cap="flat" cmpd="sng" algn="ctr">
           <a:solidFill>
             <a:schemeClr val="accent1">
               <a:hueOff val="0"/>
@@ -5650,27 +6173,33 @@
           </a:solidFill>
           <a:prstDash val="solid"/>
         </a:ln>
-        <a:effectLst/>
+        <a:effectLst>
+          <a:outerShdw blurRad="50800" dist="38100" dir="5400000" rotWithShape="0">
+            <a:srgbClr val="000000">
+              <a:alpha val="35000"/>
+            </a:srgbClr>
+          </a:outerShdw>
+        </a:effectLst>
       </dsp:spPr>
       <dsp:style>
-        <a:lnRef idx="2">
+        <a:lnRef idx="1">
           <a:scrgbClr r="0" g="0" b="0"/>
         </a:lnRef>
         <a:fillRef idx="1">
           <a:scrgbClr r="0" g="0" b="0"/>
         </a:fillRef>
-        <a:effectRef idx="0">
+        <a:effectRef idx="2">
           <a:scrgbClr r="0" g="0" b="0"/>
         </a:effectRef>
         <a:fontRef idx="minor"/>
       </dsp:style>
       <dsp:txBody>
-        <a:bodyPr spcFirstLastPara="0" vert="horz" wrap="square" lIns="87630" tIns="87630" rIns="87630" bIns="87630" numCol="1" spcCol="1270" anchor="ctr" anchorCtr="0">
+        <a:bodyPr spcFirstLastPara="0" vert="horz" wrap="square" lIns="83820" tIns="83820" rIns="83820" bIns="83820" numCol="1" spcCol="1270" anchor="ctr" anchorCtr="0">
           <a:noAutofit/>
         </a:bodyPr>
         <a:lstStyle/>
         <a:p>
-          <a:pPr lvl="0" algn="ctr" defTabSz="1022350">
+          <a:pPr lvl="0" algn="ctr" defTabSz="977900">
             <a:lnSpc>
               <a:spcPct val="90000"/>
             </a:lnSpc>
@@ -5682,15 +6211,15 @@
             </a:spcAft>
           </a:pPr>
           <a:r>
-            <a:rPr lang="fr-FR" sz="2300" kern="1200" dirty="0" smtClean="0"/>
+            <a:rPr lang="fr-FR" sz="2200" kern="1200" dirty="0" smtClean="0"/>
             <a:t>Modèle et CAD</a:t>
           </a:r>
-          <a:endParaRPr lang="fr-FR" sz="2300" kern="1200" dirty="0"/>
+          <a:endParaRPr lang="fr-FR" sz="2200" kern="1200" dirty="0"/>
         </a:p>
       </dsp:txBody>
       <dsp:txXfrm>
-        <a:off x="2262981" y="1357791"/>
-        <a:ext cx="2983309" cy="1357787"/>
+        <a:off x="2262981" y="961766"/>
+        <a:ext cx="2983309" cy="961766"/>
       </dsp:txXfrm>
     </dsp:sp>
     <dsp:sp modelId="{7C19A195-982E-4F11-88A4-62C6FEDC881A}">
@@ -5700,8 +6229,8 @@
       </dsp:nvSpPr>
       <dsp:spPr>
         <a:xfrm>
-          <a:off x="1584087" y="2715578"/>
-          <a:ext cx="1357787" cy="1357787"/>
+          <a:off x="1188065" y="1923533"/>
+          <a:ext cx="2149831" cy="2149831"/>
         </a:xfrm>
         <a:prstGeom prst="pie">
           <a:avLst>
@@ -5709,35 +6238,92 @@
             <a:gd name="adj2" fmla="val 16200000"/>
           </a:avLst>
         </a:prstGeom>
-        <a:solidFill>
-          <a:schemeClr val="accent1">
-            <a:hueOff val="0"/>
-            <a:satOff val="0"/>
-            <a:lumOff val="0"/>
-            <a:alphaOff val="0"/>
-          </a:schemeClr>
-        </a:solidFill>
-        <a:ln w="55000" cap="flat" cmpd="thickThin" algn="ctr">
-          <a:solidFill>
-            <a:schemeClr val="lt1">
+        <a:gradFill rotWithShape="0">
+          <a:gsLst>
+            <a:gs pos="0">
+              <a:schemeClr val="accent1">
+                <a:hueOff val="0"/>
+                <a:satOff val="0"/>
+                <a:lumOff val="0"/>
+                <a:alphaOff val="0"/>
+                <a:shade val="15000"/>
+                <a:satMod val="180000"/>
+              </a:schemeClr>
+            </a:gs>
+            <a:gs pos="50000">
+              <a:schemeClr val="accent1">
+                <a:hueOff val="0"/>
+                <a:satOff val="0"/>
+                <a:lumOff val="0"/>
+                <a:alphaOff val="0"/>
+                <a:shade val="45000"/>
+                <a:satMod val="170000"/>
+              </a:schemeClr>
+            </a:gs>
+            <a:gs pos="70000">
+              <a:schemeClr val="accent1">
+                <a:hueOff val="0"/>
+                <a:satOff val="0"/>
+                <a:lumOff val="0"/>
+                <a:alphaOff val="0"/>
+                <a:tint val="99000"/>
+                <a:shade val="65000"/>
+                <a:satMod val="155000"/>
+              </a:schemeClr>
+            </a:gs>
+            <a:gs pos="100000">
+              <a:schemeClr val="accent1">
+                <a:hueOff val="0"/>
+                <a:satOff val="0"/>
+                <a:lumOff val="0"/>
+                <a:alphaOff val="0"/>
+                <a:tint val="95500"/>
+                <a:shade val="100000"/>
+                <a:satMod val="155000"/>
+              </a:schemeClr>
+            </a:gs>
+          </a:gsLst>
+          <a:lin ang="16200000" scaled="0"/>
+        </a:gradFill>
+        <a:ln>
+          <a:noFill/>
+        </a:ln>
+        <a:effectLst>
+          <a:outerShdw blurRad="63500" dist="38100" dir="5400000" rotWithShape="0">
+            <a:srgbClr val="000000">
+              <a:alpha val="45000"/>
+            </a:srgbClr>
+          </a:outerShdw>
+        </a:effectLst>
+        <a:scene3d>
+          <a:camera prst="orthographicFront" fov="0">
+            <a:rot lat="0" lon="0" rev="0"/>
+          </a:camera>
+          <a:lightRig rig="glow" dir="t">
+            <a:rot lat="0" lon="0" rev="6360000"/>
+          </a:lightRig>
+        </a:scene3d>
+        <a:sp3d contourW="1000" prstMaterial="flat">
+          <a:bevelT w="95250" h="101600"/>
+          <a:contourClr>
+            <a:schemeClr val="accent1">
               <a:hueOff val="0"/>
               <a:satOff val="0"/>
               <a:lumOff val="0"/>
               <a:alphaOff val="0"/>
+              <a:satMod val="300000"/>
             </a:schemeClr>
-          </a:solidFill>
-          <a:prstDash val="solid"/>
-        </a:ln>
-        <a:effectLst/>
+          </a:contourClr>
+        </a:sp3d>
       </dsp:spPr>
       <dsp:style>
-        <a:lnRef idx="2">
+        <a:lnRef idx="0">
           <a:scrgbClr r="0" g="0" b="0"/>
         </a:lnRef>
-        <a:fillRef idx="1">
+        <a:fillRef idx="3">
           <a:scrgbClr r="0" g="0" b="0"/>
         </a:fillRef>
-        <a:effectRef idx="0">
+        <a:effectRef idx="3">
           <a:scrgbClr r="0" g="0" b="0"/>
         </a:effectRef>
         <a:fontRef idx="minor">
@@ -5752,8 +6338,8 @@
       </dsp:nvSpPr>
       <dsp:spPr>
         <a:xfrm>
-          <a:off x="2262981" y="2715578"/>
-          <a:ext cx="5966619" cy="1357787"/>
+          <a:off x="2262981" y="1923533"/>
+          <a:ext cx="5966619" cy="2149831"/>
         </a:xfrm>
         <a:prstGeom prst="rect">
           <a:avLst/>
@@ -5767,7 +6353,7 @@
             <a:alphaOff val="0"/>
           </a:schemeClr>
         </a:solidFill>
-        <a:ln w="55000" cap="flat" cmpd="thickThin" algn="ctr">
+        <a:ln w="9525" cap="flat" cmpd="sng" algn="ctr">
           <a:solidFill>
             <a:schemeClr val="accent1">
               <a:hueOff val="0"/>
@@ -5778,27 +6364,33 @@
           </a:solidFill>
           <a:prstDash val="solid"/>
         </a:ln>
-        <a:effectLst/>
+        <a:effectLst>
+          <a:outerShdw blurRad="50800" dist="38100" dir="5400000" rotWithShape="0">
+            <a:srgbClr val="000000">
+              <a:alpha val="35000"/>
+            </a:srgbClr>
+          </a:outerShdw>
+        </a:effectLst>
       </dsp:spPr>
       <dsp:style>
-        <a:lnRef idx="2">
+        <a:lnRef idx="1">
           <a:scrgbClr r="0" g="0" b="0"/>
         </a:lnRef>
         <a:fillRef idx="1">
           <a:scrgbClr r="0" g="0" b="0"/>
         </a:fillRef>
-        <a:effectRef idx="0">
+        <a:effectRef idx="2">
           <a:scrgbClr r="0" g="0" b="0"/>
         </a:effectRef>
         <a:fontRef idx="minor"/>
       </dsp:style>
       <dsp:txBody>
-        <a:bodyPr spcFirstLastPara="0" vert="horz" wrap="square" lIns="87630" tIns="87630" rIns="87630" bIns="87630" numCol="1" spcCol="1270" anchor="ctr" anchorCtr="0">
+        <a:bodyPr spcFirstLastPara="0" vert="horz" wrap="square" lIns="83820" tIns="83820" rIns="83820" bIns="83820" numCol="1" spcCol="1270" anchor="ctr" anchorCtr="0">
           <a:noAutofit/>
         </a:bodyPr>
         <a:lstStyle/>
         <a:p>
-          <a:pPr lvl="0" algn="ctr" defTabSz="1022350">
+          <a:pPr lvl="0" algn="ctr" defTabSz="977900">
             <a:lnSpc>
               <a:spcPct val="90000"/>
             </a:lnSpc>
@@ -5810,15 +6402,206 @@
             </a:spcAft>
           </a:pPr>
           <a:r>
-            <a:rPr lang="fr-FR" sz="2300" kern="1200" dirty="0" smtClean="0"/>
+            <a:rPr lang="fr-FR" sz="2200" kern="1200" dirty="0" smtClean="0"/>
             <a:t>Base de données</a:t>
           </a:r>
-          <a:endParaRPr lang="fr-FR" sz="2300" kern="1200" dirty="0"/>
+          <a:endParaRPr lang="fr-FR" sz="2200" kern="1200" dirty="0"/>
         </a:p>
       </dsp:txBody>
       <dsp:txXfrm>
-        <a:off x="2262981" y="2715578"/>
-        <a:ext cx="2983309" cy="1357787"/>
+        <a:off x="2262981" y="1923533"/>
+        <a:ext cx="2983309" cy="961766"/>
+      </dsp:txXfrm>
+    </dsp:sp>
+    <dsp:sp modelId="{F17034C1-3050-4F5B-A3AA-7EE9EB380453}">
+      <dsp:nvSpPr>
+        <dsp:cNvPr id="0" name=""/>
+        <dsp:cNvSpPr/>
+      </dsp:nvSpPr>
+      <dsp:spPr>
+        <a:xfrm>
+          <a:off x="1782097" y="2885300"/>
+          <a:ext cx="961766" cy="961766"/>
+        </a:xfrm>
+        <a:prstGeom prst="pie">
+          <a:avLst>
+            <a:gd name="adj1" fmla="val 5400000"/>
+            <a:gd name="adj2" fmla="val 16200000"/>
+          </a:avLst>
+        </a:prstGeom>
+        <a:gradFill rotWithShape="0">
+          <a:gsLst>
+            <a:gs pos="0">
+              <a:schemeClr val="accent1">
+                <a:hueOff val="0"/>
+                <a:satOff val="0"/>
+                <a:lumOff val="0"/>
+                <a:alphaOff val="0"/>
+                <a:shade val="15000"/>
+                <a:satMod val="180000"/>
+              </a:schemeClr>
+            </a:gs>
+            <a:gs pos="50000">
+              <a:schemeClr val="accent1">
+                <a:hueOff val="0"/>
+                <a:satOff val="0"/>
+                <a:lumOff val="0"/>
+                <a:alphaOff val="0"/>
+                <a:shade val="45000"/>
+                <a:satMod val="170000"/>
+              </a:schemeClr>
+            </a:gs>
+            <a:gs pos="70000">
+              <a:schemeClr val="accent1">
+                <a:hueOff val="0"/>
+                <a:satOff val="0"/>
+                <a:lumOff val="0"/>
+                <a:alphaOff val="0"/>
+                <a:tint val="99000"/>
+                <a:shade val="65000"/>
+                <a:satMod val="155000"/>
+              </a:schemeClr>
+            </a:gs>
+            <a:gs pos="100000">
+              <a:schemeClr val="accent1">
+                <a:hueOff val="0"/>
+                <a:satOff val="0"/>
+                <a:lumOff val="0"/>
+                <a:alphaOff val="0"/>
+                <a:tint val="95500"/>
+                <a:shade val="100000"/>
+                <a:satMod val="155000"/>
+              </a:schemeClr>
+            </a:gs>
+          </a:gsLst>
+          <a:lin ang="16200000" scaled="0"/>
+        </a:gradFill>
+        <a:ln>
+          <a:noFill/>
+        </a:ln>
+        <a:effectLst>
+          <a:outerShdw blurRad="63500" dist="38100" dir="5400000" rotWithShape="0">
+            <a:srgbClr val="000000">
+              <a:alpha val="45000"/>
+            </a:srgbClr>
+          </a:outerShdw>
+        </a:effectLst>
+        <a:scene3d>
+          <a:camera prst="orthographicFront" fov="0">
+            <a:rot lat="0" lon="0" rev="0"/>
+          </a:camera>
+          <a:lightRig rig="glow" dir="t">
+            <a:rot lat="0" lon="0" rev="6360000"/>
+          </a:lightRig>
+        </a:scene3d>
+        <a:sp3d contourW="1000" prstMaterial="flat">
+          <a:bevelT w="95250" h="101600"/>
+          <a:contourClr>
+            <a:schemeClr val="accent1">
+              <a:hueOff val="0"/>
+              <a:satOff val="0"/>
+              <a:lumOff val="0"/>
+              <a:alphaOff val="0"/>
+              <a:satMod val="300000"/>
+            </a:schemeClr>
+          </a:contourClr>
+        </a:sp3d>
+      </dsp:spPr>
+      <dsp:style>
+        <a:lnRef idx="0">
+          <a:scrgbClr r="0" g="0" b="0"/>
+        </a:lnRef>
+        <a:fillRef idx="3">
+          <a:scrgbClr r="0" g="0" b="0"/>
+        </a:fillRef>
+        <a:effectRef idx="3">
+          <a:scrgbClr r="0" g="0" b="0"/>
+        </a:effectRef>
+        <a:fontRef idx="minor">
+          <a:schemeClr val="lt1"/>
+        </a:fontRef>
+      </dsp:style>
+    </dsp:sp>
+    <dsp:sp modelId="{324332A2-187F-40EC-9D32-90A01310E001}">
+      <dsp:nvSpPr>
+        <dsp:cNvPr id="0" name=""/>
+        <dsp:cNvSpPr/>
+      </dsp:nvSpPr>
+      <dsp:spPr>
+        <a:xfrm>
+          <a:off x="2262981" y="2885300"/>
+          <a:ext cx="5966619" cy="961766"/>
+        </a:xfrm>
+        <a:prstGeom prst="rect">
+          <a:avLst/>
+        </a:prstGeom>
+        <a:solidFill>
+          <a:schemeClr val="lt1">
+            <a:alpha val="90000"/>
+            <a:hueOff val="0"/>
+            <a:satOff val="0"/>
+            <a:lumOff val="0"/>
+            <a:alphaOff val="0"/>
+          </a:schemeClr>
+        </a:solidFill>
+        <a:ln w="9525" cap="flat" cmpd="sng" algn="ctr">
+          <a:solidFill>
+            <a:schemeClr val="accent1">
+              <a:hueOff val="0"/>
+              <a:satOff val="0"/>
+              <a:lumOff val="0"/>
+              <a:alphaOff val="0"/>
+            </a:schemeClr>
+          </a:solidFill>
+          <a:prstDash val="solid"/>
+        </a:ln>
+        <a:effectLst>
+          <a:outerShdw blurRad="50800" dist="38100" dir="5400000" rotWithShape="0">
+            <a:srgbClr val="000000">
+              <a:alpha val="35000"/>
+            </a:srgbClr>
+          </a:outerShdw>
+        </a:effectLst>
+      </dsp:spPr>
+      <dsp:style>
+        <a:lnRef idx="1">
+          <a:scrgbClr r="0" g="0" b="0"/>
+        </a:lnRef>
+        <a:fillRef idx="1">
+          <a:scrgbClr r="0" g="0" b="0"/>
+        </a:fillRef>
+        <a:effectRef idx="2">
+          <a:scrgbClr r="0" g="0" b="0"/>
+        </a:effectRef>
+        <a:fontRef idx="minor"/>
+      </dsp:style>
+      <dsp:txBody>
+        <a:bodyPr spcFirstLastPara="0" vert="horz" wrap="square" lIns="83820" tIns="83820" rIns="83820" bIns="83820" numCol="1" spcCol="1270" anchor="ctr" anchorCtr="0">
+          <a:noAutofit/>
+        </a:bodyPr>
+        <a:lstStyle/>
+        <a:p>
+          <a:pPr lvl="0" algn="ctr" defTabSz="977900">
+            <a:lnSpc>
+              <a:spcPct val="90000"/>
+            </a:lnSpc>
+            <a:spcBef>
+              <a:spcPct val="0"/>
+            </a:spcBef>
+            <a:spcAft>
+              <a:spcPct val="35000"/>
+            </a:spcAft>
+          </a:pPr>
+          <a:r>
+            <a:rPr lang="fr-FR" sz="2200" kern="1200" dirty="0" smtClean="0"/>
+            <a:t>Gestionnaire de source</a:t>
+          </a:r>
+          <a:endParaRPr lang="fr-FR" sz="2200" kern="1200" dirty="0"/>
+        </a:p>
+      </dsp:txBody>
+      <dsp:txXfrm>
+        <a:off x="2262981" y="2885300"/>
+        <a:ext cx="2983309" cy="961766"/>
       </dsp:txXfrm>
     </dsp:sp>
     <dsp:sp modelId="{1DD53AA5-C979-4BD5-811D-7C9FFF8C3A8C}">
@@ -5829,38 +6612,44 @@
       <dsp:spPr>
         <a:xfrm>
           <a:off x="5246290" y="0"/>
-          <a:ext cx="2983309" cy="1357791"/>
+          <a:ext cx="2983309" cy="961766"/>
         </a:xfrm>
         <a:prstGeom prst="rect">
           <a:avLst/>
         </a:prstGeom>
         <a:noFill/>
-        <a:ln w="55000" cap="flat" cmpd="thickThin" algn="ctr">
+        <a:ln w="9525" cap="flat" cmpd="sng" algn="ctr">
           <a:noFill/>
           <a:prstDash val="solid"/>
         </a:ln>
-        <a:effectLst/>
+        <a:effectLst>
+          <a:outerShdw blurRad="50800" dist="38100" dir="5400000" rotWithShape="0">
+            <a:srgbClr val="000000">
+              <a:alpha val="35000"/>
+            </a:srgbClr>
+          </a:outerShdw>
+        </a:effectLst>
         <a:sp3d/>
       </dsp:spPr>
       <dsp:style>
-        <a:lnRef idx="2">
+        <a:lnRef idx="1">
           <a:scrgbClr r="0" g="0" b="0"/>
         </a:lnRef>
         <a:fillRef idx="1">
           <a:scrgbClr r="0" g="0" b="0"/>
         </a:fillRef>
-        <a:effectRef idx="0">
+        <a:effectRef idx="2">
           <a:scrgbClr r="0" g="0" b="0"/>
         </a:effectRef>
         <a:fontRef idx="minor"/>
       </dsp:style>
       <dsp:txBody>
-        <a:bodyPr spcFirstLastPara="0" vert="horz" wrap="square" lIns="110490" tIns="110490" rIns="110490" bIns="110490" numCol="1" spcCol="1270" anchor="ctr" anchorCtr="0">
+        <a:bodyPr spcFirstLastPara="0" vert="horz" wrap="square" lIns="76200" tIns="76200" rIns="76200" bIns="76200" numCol="1" spcCol="1270" anchor="ctr" anchorCtr="0">
           <a:noAutofit/>
         </a:bodyPr>
         <a:lstStyle/>
         <a:p>
-          <a:pPr marL="285750" lvl="1" indent="-285750" algn="l" defTabSz="1289050">
+          <a:pPr marL="228600" lvl="1" indent="-228600" algn="l" defTabSz="889000">
             <a:lnSpc>
               <a:spcPct val="90000"/>
             </a:lnSpc>
@@ -5873,13 +6662,13 @@
             <a:buChar char="••"/>
           </a:pPr>
           <a:r>
-            <a:rPr lang="fr-FR" sz="2900" kern="1200" dirty="0" smtClean="0"/>
+            <a:rPr lang="fr-FR" sz="2000" kern="1200" dirty="0" smtClean="0"/>
             <a:t>Java</a:t>
           </a:r>
-          <a:endParaRPr lang="fr-FR" sz="2900" kern="1200" dirty="0"/>
+          <a:endParaRPr lang="fr-FR" sz="2000" kern="1200" dirty="0"/>
         </a:p>
         <a:p>
-          <a:pPr marL="285750" lvl="1" indent="-285750" algn="l" defTabSz="1289050">
+          <a:pPr marL="228600" lvl="1" indent="-228600" algn="l" defTabSz="889000">
             <a:lnSpc>
               <a:spcPct val="90000"/>
             </a:lnSpc>
@@ -5892,15 +6681,15 @@
             <a:buChar char="••"/>
           </a:pPr>
           <a:r>
-            <a:rPr lang="fr-FR" sz="2900" kern="1200" dirty="0" smtClean="0"/>
+            <a:rPr lang="fr-FR" sz="2000" kern="1200" dirty="0" smtClean="0"/>
             <a:t>SWT</a:t>
           </a:r>
-          <a:endParaRPr lang="fr-FR" sz="2900" kern="1200" dirty="0"/>
+          <a:endParaRPr lang="fr-FR" sz="2000" kern="1200" dirty="0"/>
         </a:p>
       </dsp:txBody>
       <dsp:txXfrm>
         <a:off x="5246290" y="0"/>
-        <a:ext cx="2983309" cy="1357791"/>
+        <a:ext cx="2983309" cy="961766"/>
       </dsp:txXfrm>
     </dsp:sp>
     <dsp:sp modelId="{6804F6C2-8B0A-44A8-9515-ED0AA9D8B422}">
@@ -5910,39 +6699,45 @@
       </dsp:nvSpPr>
       <dsp:spPr>
         <a:xfrm>
-          <a:off x="5246290" y="1357791"/>
-          <a:ext cx="2983309" cy="1357787"/>
+          <a:off x="5246290" y="961766"/>
+          <a:ext cx="2983309" cy="961766"/>
         </a:xfrm>
         <a:prstGeom prst="rect">
           <a:avLst/>
         </a:prstGeom>
         <a:noFill/>
-        <a:ln w="55000" cap="flat" cmpd="thickThin" algn="ctr">
+        <a:ln w="9525" cap="flat" cmpd="sng" algn="ctr">
           <a:noFill/>
           <a:prstDash val="solid"/>
         </a:ln>
-        <a:effectLst/>
+        <a:effectLst>
+          <a:outerShdw blurRad="50800" dist="38100" dir="5400000" rotWithShape="0">
+            <a:srgbClr val="000000">
+              <a:alpha val="35000"/>
+            </a:srgbClr>
+          </a:outerShdw>
+        </a:effectLst>
         <a:sp3d/>
       </dsp:spPr>
       <dsp:style>
-        <a:lnRef idx="2">
+        <a:lnRef idx="1">
           <a:scrgbClr r="0" g="0" b="0"/>
         </a:lnRef>
         <a:fillRef idx="1">
           <a:scrgbClr r="0" g="0" b="0"/>
         </a:fillRef>
-        <a:effectRef idx="0">
+        <a:effectRef idx="2">
           <a:scrgbClr r="0" g="0" b="0"/>
         </a:effectRef>
         <a:fontRef idx="minor"/>
       </dsp:style>
       <dsp:txBody>
-        <a:bodyPr spcFirstLastPara="0" vert="horz" wrap="square" lIns="110490" tIns="110490" rIns="110490" bIns="110490" numCol="1" spcCol="1270" anchor="ctr" anchorCtr="0">
+        <a:bodyPr spcFirstLastPara="0" vert="horz" wrap="square" lIns="76200" tIns="76200" rIns="76200" bIns="76200" numCol="1" spcCol="1270" anchor="ctr" anchorCtr="0">
           <a:noAutofit/>
         </a:bodyPr>
         <a:lstStyle/>
         <a:p>
-          <a:pPr marL="285750" lvl="1" indent="-285750" algn="l" defTabSz="1289050">
+          <a:pPr marL="228600" lvl="1" indent="-228600" algn="l" defTabSz="889000">
             <a:lnSpc>
               <a:spcPct val="90000"/>
             </a:lnSpc>
@@ -5955,30 +6750,15 @@
             <a:buChar char="••"/>
           </a:pPr>
           <a:r>
-            <a:rPr lang="fr-FR" sz="2900" kern="1200" dirty="0" smtClean="0"/>
+            <a:rPr lang="fr-FR" sz="2000" kern="1200" dirty="0" smtClean="0"/>
             <a:t>Java</a:t>
           </a:r>
-          <a:endParaRPr lang="fr-FR" sz="2900" kern="1200" dirty="0"/>
-        </a:p>
-        <a:p>
-          <a:pPr marL="285750" lvl="1" indent="-285750" algn="l" defTabSz="1289050">
-            <a:lnSpc>
-              <a:spcPct val="90000"/>
-            </a:lnSpc>
-            <a:spcBef>
-              <a:spcPct val="0"/>
-            </a:spcBef>
-            <a:spcAft>
-              <a:spcPct val="15000"/>
-            </a:spcAft>
-            <a:buChar char="••"/>
-          </a:pPr>
-          <a:endParaRPr lang="fr-FR" sz="2900" kern="1200" dirty="0"/>
+          <a:endParaRPr lang="fr-FR" sz="2000" kern="1200" dirty="0"/>
         </a:p>
       </dsp:txBody>
       <dsp:txXfrm>
-        <a:off x="5246290" y="1357791"/>
-        <a:ext cx="2983309" cy="1357787"/>
+        <a:off x="5246290" y="961766"/>
+        <a:ext cx="2983309" cy="961766"/>
       </dsp:txXfrm>
     </dsp:sp>
     <dsp:sp modelId="{DD9696E8-A6AA-4CB6-8DFF-DE8BF474CD5C}">
@@ -5988,39 +6768,45 @@
       </dsp:nvSpPr>
       <dsp:spPr>
         <a:xfrm>
-          <a:off x="5246290" y="2715578"/>
-          <a:ext cx="2983309" cy="1357787"/>
+          <a:off x="5246290" y="1923533"/>
+          <a:ext cx="2983309" cy="961766"/>
         </a:xfrm>
         <a:prstGeom prst="rect">
           <a:avLst/>
         </a:prstGeom>
         <a:noFill/>
-        <a:ln w="55000" cap="flat" cmpd="thickThin" algn="ctr">
+        <a:ln w="9525" cap="flat" cmpd="sng" algn="ctr">
           <a:noFill/>
           <a:prstDash val="solid"/>
         </a:ln>
-        <a:effectLst/>
+        <a:effectLst>
+          <a:outerShdw blurRad="50800" dist="38100" dir="5400000" rotWithShape="0">
+            <a:srgbClr val="000000">
+              <a:alpha val="35000"/>
+            </a:srgbClr>
+          </a:outerShdw>
+        </a:effectLst>
         <a:sp3d/>
       </dsp:spPr>
       <dsp:style>
-        <a:lnRef idx="2">
+        <a:lnRef idx="1">
           <a:scrgbClr r="0" g="0" b="0"/>
         </a:lnRef>
         <a:fillRef idx="1">
           <a:scrgbClr r="0" g="0" b="0"/>
         </a:fillRef>
-        <a:effectRef idx="0">
+        <a:effectRef idx="2">
           <a:scrgbClr r="0" g="0" b="0"/>
         </a:effectRef>
         <a:fontRef idx="minor"/>
       </dsp:style>
       <dsp:txBody>
-        <a:bodyPr spcFirstLastPara="0" vert="horz" wrap="square" lIns="110490" tIns="110490" rIns="110490" bIns="110490" numCol="1" spcCol="1270" anchor="ctr" anchorCtr="0">
+        <a:bodyPr spcFirstLastPara="0" vert="horz" wrap="square" lIns="76200" tIns="76200" rIns="76200" bIns="76200" numCol="1" spcCol="1270" anchor="ctr" anchorCtr="0">
           <a:noAutofit/>
         </a:bodyPr>
         <a:lstStyle/>
         <a:p>
-          <a:pPr marL="285750" lvl="1" indent="-285750" algn="l" defTabSz="1289050">
+          <a:pPr marL="228600" lvl="1" indent="-228600" algn="l" defTabSz="889000">
             <a:lnSpc>
               <a:spcPct val="90000"/>
             </a:lnSpc>
@@ -6033,13 +6819,63 @@
             <a:buChar char="••"/>
           </a:pPr>
           <a:r>
-            <a:rPr lang="fr-FR" sz="2900" kern="1200" dirty="0" smtClean="0"/>
+            <a:rPr lang="fr-FR" sz="2000" kern="1200" dirty="0" smtClean="0"/>
             <a:t>MySQL</a:t>
           </a:r>
-          <a:endParaRPr lang="fr-FR" sz="2900" kern="1200" dirty="0"/>
+          <a:endParaRPr lang="fr-FR" sz="2000" kern="1200" dirty="0"/>
         </a:p>
+      </dsp:txBody>
+      <dsp:txXfrm>
+        <a:off x="5246290" y="1923533"/>
+        <a:ext cx="2983309" cy="961766"/>
+      </dsp:txXfrm>
+    </dsp:sp>
+    <dsp:sp modelId="{235D30E3-E903-4180-A297-AE947FA47B83}">
+      <dsp:nvSpPr>
+        <dsp:cNvPr id="0" name=""/>
+        <dsp:cNvSpPr/>
+      </dsp:nvSpPr>
+      <dsp:spPr>
+        <a:xfrm>
+          <a:off x="5246290" y="2885300"/>
+          <a:ext cx="2983309" cy="961766"/>
+        </a:xfrm>
+        <a:prstGeom prst="rect">
+          <a:avLst/>
+        </a:prstGeom>
+        <a:noFill/>
+        <a:ln w="9525" cap="flat" cmpd="sng" algn="ctr">
+          <a:noFill/>
+          <a:prstDash val="solid"/>
+        </a:ln>
+        <a:effectLst>
+          <a:outerShdw blurRad="50800" dist="38100" dir="5400000" rotWithShape="0">
+            <a:srgbClr val="000000">
+              <a:alpha val="35000"/>
+            </a:srgbClr>
+          </a:outerShdw>
+        </a:effectLst>
+        <a:sp3d/>
+      </dsp:spPr>
+      <dsp:style>
+        <a:lnRef idx="1">
+          <a:scrgbClr r="0" g="0" b="0"/>
+        </a:lnRef>
+        <a:fillRef idx="1">
+          <a:scrgbClr r="0" g="0" b="0"/>
+        </a:fillRef>
+        <a:effectRef idx="2">
+          <a:scrgbClr r="0" g="0" b="0"/>
+        </a:effectRef>
+        <a:fontRef idx="minor"/>
+      </dsp:style>
+      <dsp:txBody>
+        <a:bodyPr spcFirstLastPara="0" vert="horz" wrap="square" lIns="76200" tIns="76200" rIns="76200" bIns="76200" numCol="1" spcCol="1270" anchor="ctr" anchorCtr="0">
+          <a:noAutofit/>
+        </a:bodyPr>
+        <a:lstStyle/>
         <a:p>
-          <a:pPr marL="285750" lvl="1" indent="-285750" algn="l" defTabSz="1289050">
+          <a:pPr marL="228600" lvl="1" indent="-228600" algn="l" defTabSz="889000">
             <a:lnSpc>
               <a:spcPct val="90000"/>
             </a:lnSpc>
@@ -6051,12 +6887,16 @@
             </a:spcAft>
             <a:buChar char="••"/>
           </a:pPr>
-          <a:endParaRPr lang="fr-FR" sz="2900" kern="1200" dirty="0"/>
+          <a:r>
+            <a:rPr lang="fr-FR" sz="2000" kern="1200" dirty="0" smtClean="0"/>
+            <a:t>SVN</a:t>
+          </a:r>
+          <a:endParaRPr lang="fr-FR" sz="2000" kern="1200" dirty="0"/>
         </a:p>
       </dsp:txBody>
       <dsp:txXfrm>
-        <a:off x="5246290" y="2715578"/>
-        <a:ext cx="2983309" cy="1357787"/>
+        <a:off x="5246290" y="2885300"/>
+        <a:ext cx="2983309" cy="961766"/>
       </dsp:txXfrm>
     </dsp:sp>
   </dsp:spTree>
@@ -6286,15 +7126,7 @@
           </a:pPr>
           <a:r>
             <a:rPr lang="fr-FR" sz="1600" kern="1200" dirty="0" smtClean="0"/>
-            <a:t>Calculs des </a:t>
-          </a:r>
-          <a:r>
-            <a:rPr lang="fr-FR" sz="1600" kern="1200" dirty="0" smtClean="0"/>
-            <a:t>règles intéressantes </a:t>
-          </a:r>
-          <a:r>
-            <a:rPr lang="fr-FR" sz="1600" kern="1200" dirty="0" smtClean="0"/>
-            <a:t>par le modèle</a:t>
+            <a:t>Calculs des règles intéressantes par le modèle</a:t>
           </a:r>
         </a:p>
       </dsp:txBody>
@@ -12915,11 +13747,11 @@
 </file>
 
 <file path=ppt/diagrams/quickStyle1.xml><?xml version="1.0" encoding="utf-8"?>
-<dgm:styleDef xmlns:dgm="http://schemas.openxmlformats.org/drawingml/2006/diagram" xmlns:a="http://schemas.openxmlformats.org/drawingml/2006/main" uniqueId="urn:microsoft.com/office/officeart/2005/8/quickstyle/simple1">
+<dgm:styleDef xmlns:dgm="http://schemas.openxmlformats.org/drawingml/2006/diagram" xmlns:a="http://schemas.openxmlformats.org/drawingml/2006/main" uniqueId="urn:microsoft.com/office/officeart/2005/8/quickstyle/simple5">
   <dgm:title val=""/>
   <dgm:desc val=""/>
   <dgm:catLst>
-    <dgm:cat type="simple" pri="10100"/>
+    <dgm:cat type="simple" pri="10500"/>
   </dgm:catLst>
   <dgm:scene3d>
     <a:camera prst="orthographicFront"/>
@@ -12933,13 +13765,13 @@
     <dgm:sp3d/>
     <dgm:txPr/>
     <dgm:style>
-      <a:lnRef idx="2">
+      <a:lnRef idx="0">
         <a:scrgbClr r="0" g="0" b="0"/>
       </a:lnRef>
-      <a:fillRef idx="1">
+      <a:fillRef idx="3">
         <a:scrgbClr r="0" g="0" b="0"/>
       </a:fillRef>
-      <a:effectRef idx="0">
+      <a:effectRef idx="3">
         <a:scrgbClr r="0" g="0" b="0"/>
       </a:effectRef>
       <a:fontRef idx="minor">
@@ -12955,13 +13787,13 @@
     <dgm:sp3d/>
     <dgm:txPr/>
     <dgm:style>
-      <a:lnRef idx="2">
+      <a:lnRef idx="0">
         <a:scrgbClr r="0" g="0" b="0"/>
       </a:lnRef>
-      <a:fillRef idx="1">
+      <a:fillRef idx="3">
         <a:scrgbClr r="0" g="0" b="0"/>
       </a:fillRef>
-      <a:effectRef idx="0">
+      <a:effectRef idx="3">
         <a:scrgbClr r="0" g="0" b="0"/>
       </a:effectRef>
       <a:fontRef idx="minor">
@@ -12977,13 +13809,13 @@
     <dgm:sp3d/>
     <dgm:txPr/>
     <dgm:style>
-      <a:lnRef idx="2">
+      <a:lnRef idx="0">
         <a:scrgbClr r="0" g="0" b="0"/>
       </a:lnRef>
-      <a:fillRef idx="1">
+      <a:fillRef idx="3">
         <a:scrgbClr r="0" g="0" b="0"/>
       </a:fillRef>
-      <a:effectRef idx="0">
+      <a:effectRef idx="3">
         <a:scrgbClr r="0" g="0" b="0"/>
       </a:effectRef>
       <a:fontRef idx="minor">
@@ -12999,13 +13831,13 @@
     <dgm:sp3d/>
     <dgm:txPr/>
     <dgm:style>
-      <a:lnRef idx="2">
+      <a:lnRef idx="1">
         <a:scrgbClr r="0" g="0" b="0"/>
       </a:lnRef>
-      <a:fillRef idx="1">
+      <a:fillRef idx="3">
         <a:scrgbClr r="0" g="0" b="0"/>
       </a:fillRef>
-      <a:effectRef idx="0">
+      <a:effectRef idx="3">
         <a:scrgbClr r="0" g="0" b="0"/>
       </a:effectRef>
       <a:fontRef idx="minor">
@@ -13021,13 +13853,13 @@
     <dgm:sp3d/>
     <dgm:txPr/>
     <dgm:style>
-      <a:lnRef idx="2">
+      <a:lnRef idx="0">
         <a:scrgbClr r="0" g="0" b="0"/>
       </a:lnRef>
-      <a:fillRef idx="1">
+      <a:fillRef idx="3">
         <a:scrgbClr r="0" g="0" b="0"/>
       </a:fillRef>
-      <a:effectRef idx="0">
+      <a:effectRef idx="3">
         <a:scrgbClr r="0" g="0" b="0"/>
       </a:effectRef>
       <a:fontRef idx="minor">
@@ -13043,13 +13875,13 @@
     <dgm:sp3d/>
     <dgm:txPr/>
     <dgm:style>
-      <a:lnRef idx="2">
+      <a:lnRef idx="0">
         <a:scrgbClr r="0" g="0" b="0"/>
       </a:lnRef>
-      <a:fillRef idx="1">
+      <a:fillRef idx="3">
         <a:scrgbClr r="0" g="0" b="0"/>
       </a:fillRef>
-      <a:effectRef idx="0">
+      <a:effectRef idx="3">
         <a:scrgbClr r="0" g="0" b="0"/>
       </a:effectRef>
       <a:fontRef idx="minor">
@@ -13065,13 +13897,13 @@
     <dgm:sp3d/>
     <dgm:txPr/>
     <dgm:style>
-      <a:lnRef idx="2">
+      <a:lnRef idx="0">
         <a:scrgbClr r="0" g="0" b="0"/>
       </a:lnRef>
-      <a:fillRef idx="1">
+      <a:fillRef idx="3">
         <a:scrgbClr r="0" g="0" b="0"/>
       </a:fillRef>
-      <a:effectRef idx="0">
+      <a:effectRef idx="3">
         <a:scrgbClr r="0" g="0" b="0"/>
       </a:effectRef>
       <a:fontRef idx="minor">
@@ -13087,13 +13919,13 @@
     <dgm:sp3d/>
     <dgm:txPr/>
     <dgm:style>
-      <a:lnRef idx="2">
+      <a:lnRef idx="0">
         <a:scrgbClr r="0" g="0" b="0"/>
       </a:lnRef>
-      <a:fillRef idx="1">
+      <a:fillRef idx="3">
         <a:scrgbClr r="0" g="0" b="0"/>
       </a:fillRef>
-      <a:effectRef idx="0">
+      <a:effectRef idx="3">
         <a:scrgbClr r="0" g="0" b="0"/>
       </a:effectRef>
       <a:fontRef idx="minor">
@@ -13109,13 +13941,13 @@
     <dgm:sp3d/>
     <dgm:txPr/>
     <dgm:style>
-      <a:lnRef idx="2">
+      <a:lnRef idx="0">
         <a:scrgbClr r="0" g="0" b="0"/>
       </a:lnRef>
       <a:fillRef idx="1">
         <a:scrgbClr r="0" g="0" b="0"/>
       </a:fillRef>
-      <a:effectRef idx="0">
+      <a:effectRef idx="3">
         <a:scrgbClr r="0" g="0" b="0"/>
       </a:effectRef>
       <a:fontRef idx="minor"/>
@@ -13129,13 +13961,13 @@
     <dgm:sp3d/>
     <dgm:txPr/>
     <dgm:style>
-      <a:lnRef idx="2">
+      <a:lnRef idx="0">
         <a:scrgbClr r="0" g="0" b="0"/>
       </a:lnRef>
       <a:fillRef idx="1">
         <a:scrgbClr r="0" g="0" b="0"/>
       </a:fillRef>
-      <a:effectRef idx="0">
+      <a:effectRef idx="3">
         <a:scrgbClr r="0" g="0" b="0"/>
       </a:effectRef>
       <a:fontRef idx="minor"/>
@@ -13149,13 +13981,13 @@
     <dgm:sp3d/>
     <dgm:txPr/>
     <dgm:style>
-      <a:lnRef idx="2">
+      <a:lnRef idx="0">
         <a:scrgbClr r="0" g="0" b="0"/>
       </a:lnRef>
       <a:fillRef idx="1">
         <a:scrgbClr r="0" g="0" b="0"/>
       </a:fillRef>
-      <a:effectRef idx="0">
+      <a:effectRef idx="3">
         <a:scrgbClr r="0" g="0" b="0"/>
       </a:effectRef>
       <a:fontRef idx="minor"/>
@@ -13172,10 +14004,10 @@
       <a:lnRef idx="0">
         <a:scrgbClr r="0" g="0" b="0"/>
       </a:lnRef>
-      <a:fillRef idx="1">
+      <a:fillRef idx="3">
         <a:scrgbClr r="0" g="0" b="0"/>
       </a:fillRef>
-      <a:effectRef idx="0">
+      <a:effectRef idx="3">
         <a:scrgbClr r="0" g="0" b="0"/>
       </a:effectRef>
       <a:fontRef idx="minor">
@@ -13194,10 +14026,10 @@
       <a:lnRef idx="0">
         <a:scrgbClr r="0" g="0" b="0"/>
       </a:lnRef>
-      <a:fillRef idx="1">
+      <a:fillRef idx="3">
         <a:scrgbClr r="0" g="0" b="0"/>
       </a:fillRef>
-      <a:effectRef idx="0">
+      <a:effectRef idx="3">
         <a:scrgbClr r="0" g="0" b="0"/>
       </a:effectRef>
       <a:fontRef idx="minor">
@@ -13216,10 +14048,10 @@
       <a:lnRef idx="0">
         <a:scrgbClr r="0" g="0" b="0"/>
       </a:lnRef>
-      <a:fillRef idx="1">
+      <a:fillRef idx="3">
         <a:scrgbClr r="0" g="0" b="0"/>
       </a:fillRef>
-      <a:effectRef idx="0">
+      <a:effectRef idx="3">
         <a:scrgbClr r="0" g="0" b="0"/>
       </a:effectRef>
       <a:fontRef idx="minor">
@@ -13255,13 +14087,13 @@
     <dgm:sp3d/>
     <dgm:txPr/>
     <dgm:style>
-      <a:lnRef idx="2">
+      <a:lnRef idx="1">
         <a:scrgbClr r="0" g="0" b="0"/>
       </a:lnRef>
-      <a:fillRef idx="1">
+      <a:fillRef idx="0">
         <a:scrgbClr r="0" g="0" b="0"/>
       </a:fillRef>
-      <a:effectRef idx="0">
+      <a:effectRef idx="1">
         <a:scrgbClr r="0" g="0" b="0"/>
       </a:effectRef>
       <a:fontRef idx="minor"/>
@@ -13275,13 +14107,13 @@
     <dgm:sp3d/>
     <dgm:txPr/>
     <dgm:style>
-      <a:lnRef idx="2">
+      <a:lnRef idx="0">
         <a:scrgbClr r="0" g="0" b="0"/>
       </a:lnRef>
-      <a:fillRef idx="1">
+      <a:fillRef idx="3">
         <a:scrgbClr r="0" g="0" b="0"/>
       </a:fillRef>
-      <a:effectRef idx="0">
+      <a:effectRef idx="3">
         <a:scrgbClr r="0" g="0" b="0"/>
       </a:effectRef>
       <a:fontRef idx="minor">
@@ -13297,13 +14129,13 @@
     <dgm:sp3d/>
     <dgm:txPr/>
     <dgm:style>
-      <a:lnRef idx="2">
+      <a:lnRef idx="0">
         <a:scrgbClr r="0" g="0" b="0"/>
       </a:lnRef>
-      <a:fillRef idx="1">
+      <a:fillRef idx="3">
         <a:scrgbClr r="0" g="0" b="0"/>
       </a:fillRef>
-      <a:effectRef idx="0">
+      <a:effectRef idx="3">
         <a:scrgbClr r="0" g="0" b="0"/>
       </a:effectRef>
       <a:fontRef idx="minor">
@@ -13319,13 +14151,13 @@
     <dgm:sp3d/>
     <dgm:txPr/>
     <dgm:style>
-      <a:lnRef idx="2">
+      <a:lnRef idx="0">
         <a:scrgbClr r="0" g="0" b="0"/>
       </a:lnRef>
-      <a:fillRef idx="1">
+      <a:fillRef idx="3">
         <a:scrgbClr r="0" g="0" b="0"/>
       </a:fillRef>
-      <a:effectRef idx="0">
+      <a:effectRef idx="3">
         <a:scrgbClr r="0" g="0" b="0"/>
       </a:effectRef>
       <a:fontRef idx="minor">
@@ -13341,13 +14173,13 @@
     <dgm:sp3d/>
     <dgm:txPr/>
     <dgm:style>
-      <a:lnRef idx="2">
+      <a:lnRef idx="0">
         <a:scrgbClr r="0" g="0" b="0"/>
       </a:lnRef>
-      <a:fillRef idx="1">
+      <a:fillRef idx="3">
         <a:scrgbClr r="0" g="0" b="0"/>
       </a:fillRef>
-      <a:effectRef idx="0">
+      <a:effectRef idx="3">
         <a:scrgbClr r="0" g="0" b="0"/>
       </a:effectRef>
       <a:fontRef idx="minor">
@@ -13363,13 +14195,13 @@
     <dgm:sp3d/>
     <dgm:txPr/>
     <dgm:style>
-      <a:lnRef idx="2">
+      <a:lnRef idx="0">
         <a:scrgbClr r="0" g="0" b="0"/>
       </a:lnRef>
-      <a:fillRef idx="1">
+      <a:fillRef idx="3">
         <a:scrgbClr r="0" g="0" b="0"/>
       </a:fillRef>
-      <a:effectRef idx="0">
+      <a:effectRef idx="3">
         <a:scrgbClr r="0" g="0" b="0"/>
       </a:effectRef>
       <a:fontRef idx="minor">
@@ -13385,13 +14217,13 @@
     <dgm:sp3d/>
     <dgm:txPr/>
     <dgm:style>
-      <a:lnRef idx="2">
+      <a:lnRef idx="0">
         <a:scrgbClr r="0" g="0" b="0"/>
       </a:lnRef>
-      <a:fillRef idx="1">
+      <a:fillRef idx="3">
         <a:scrgbClr r="0" g="0" b="0"/>
       </a:fillRef>
-      <a:effectRef idx="0">
+      <a:effectRef idx="3">
         <a:scrgbClr r="0" g="0" b="0"/>
       </a:effectRef>
       <a:fontRef idx="minor">
@@ -13407,13 +14239,13 @@
     <dgm:sp3d/>
     <dgm:txPr/>
     <dgm:style>
-      <a:lnRef idx="2">
+      <a:lnRef idx="0">
         <a:scrgbClr r="0" g="0" b="0"/>
       </a:lnRef>
-      <a:fillRef idx="1">
+      <a:fillRef idx="3">
         <a:scrgbClr r="0" g="0" b="0"/>
       </a:fillRef>
-      <a:effectRef idx="0">
+      <a:effectRef idx="3">
         <a:scrgbClr r="0" g="0" b="0"/>
       </a:effectRef>
       <a:fontRef idx="minor">
@@ -13429,13 +14261,13 @@
     <dgm:sp3d/>
     <dgm:txPr/>
     <dgm:style>
-      <a:lnRef idx="2">
+      <a:lnRef idx="0">
         <a:scrgbClr r="0" g="0" b="0"/>
       </a:lnRef>
-      <a:fillRef idx="1">
+      <a:fillRef idx="3">
         <a:scrgbClr r="0" g="0" b="0"/>
       </a:fillRef>
-      <a:effectRef idx="0">
+      <a:effectRef idx="3">
         <a:scrgbClr r="0" g="0" b="0"/>
       </a:effectRef>
       <a:fontRef idx="minor">
@@ -13451,13 +14283,13 @@
     <dgm:sp3d/>
     <dgm:txPr/>
     <dgm:style>
-      <a:lnRef idx="2">
+      <a:lnRef idx="0">
         <a:scrgbClr r="0" g="0" b="0"/>
       </a:lnRef>
-      <a:fillRef idx="1">
+      <a:fillRef idx="3">
         <a:scrgbClr r="0" g="0" b="0"/>
       </a:fillRef>
-      <a:effectRef idx="0">
+      <a:effectRef idx="3">
         <a:scrgbClr r="0" g="0" b="0"/>
       </a:effectRef>
       <a:fontRef idx="minor">
@@ -13553,13 +14385,13 @@
     <dgm:sp3d/>
     <dgm:txPr/>
     <dgm:style>
-      <a:lnRef idx="2">
+      <a:lnRef idx="1">
         <a:scrgbClr r="0" g="0" b="0"/>
       </a:lnRef>
       <a:fillRef idx="1">
         <a:scrgbClr r="0" g="0" b="0"/>
       </a:fillRef>
-      <a:effectRef idx="0">
+      <a:effectRef idx="2">
         <a:scrgbClr r="0" g="0" b="0"/>
       </a:effectRef>
       <a:fontRef idx="minor"/>
@@ -13573,13 +14405,13 @@
     <dgm:sp3d/>
     <dgm:txPr/>
     <dgm:style>
-      <a:lnRef idx="2">
+      <a:lnRef idx="1">
         <a:scrgbClr r="0" g="0" b="0"/>
       </a:lnRef>
       <a:fillRef idx="1">
         <a:scrgbClr r="0" g="0" b="0"/>
       </a:fillRef>
-      <a:effectRef idx="0">
+      <a:effectRef idx="2">
         <a:scrgbClr r="0" g="0" b="0"/>
       </a:effectRef>
       <a:fontRef idx="minor"/>
@@ -13593,13 +14425,13 @@
     <dgm:sp3d/>
     <dgm:txPr/>
     <dgm:style>
-      <a:lnRef idx="2">
+      <a:lnRef idx="1">
         <a:scrgbClr r="0" g="0" b="0"/>
       </a:lnRef>
       <a:fillRef idx="1">
         <a:scrgbClr r="0" g="0" b="0"/>
       </a:fillRef>
-      <a:effectRef idx="0">
+      <a:effectRef idx="2">
         <a:scrgbClr r="0" g="0" b="0"/>
       </a:effectRef>
       <a:fontRef idx="minor"/>
@@ -13633,13 +14465,13 @@
     <dgm:sp3d/>
     <dgm:txPr/>
     <dgm:style>
-      <a:lnRef idx="2">
+      <a:lnRef idx="1">
         <a:scrgbClr r="0" g="0" b="0"/>
       </a:lnRef>
       <a:fillRef idx="1">
         <a:scrgbClr r="0" g="0" b="0"/>
       </a:fillRef>
-      <a:effectRef idx="0">
+      <a:effectRef idx="2">
         <a:scrgbClr r="0" g="0" b="0"/>
       </a:effectRef>
       <a:fontRef idx="minor"/>
@@ -13653,13 +14485,13 @@
     <dgm:sp3d/>
     <dgm:txPr/>
     <dgm:style>
-      <a:lnRef idx="2">
+      <a:lnRef idx="1">
         <a:scrgbClr r="0" g="0" b="0"/>
       </a:lnRef>
       <a:fillRef idx="1">
         <a:scrgbClr r="0" g="0" b="0"/>
       </a:fillRef>
-      <a:effectRef idx="0">
+      <a:effectRef idx="2">
         <a:scrgbClr r="0" g="0" b="0"/>
       </a:effectRef>
       <a:fontRef idx="minor"/>
@@ -13673,13 +14505,13 @@
     <dgm:sp3d/>
     <dgm:txPr/>
     <dgm:style>
-      <a:lnRef idx="2">
+      <a:lnRef idx="1">
         <a:scrgbClr r="0" g="0" b="0"/>
       </a:lnRef>
       <a:fillRef idx="1">
         <a:scrgbClr r="0" g="0" b="0"/>
       </a:fillRef>
-      <a:effectRef idx="0">
+      <a:effectRef idx="3">
         <a:scrgbClr r="0" g="0" b="0"/>
       </a:effectRef>
       <a:fontRef idx="minor"/>
@@ -13693,13 +14525,13 @@
     <dgm:sp3d/>
     <dgm:txPr/>
     <dgm:style>
-      <a:lnRef idx="2">
+      <a:lnRef idx="1">
         <a:scrgbClr r="0" g="0" b="0"/>
       </a:lnRef>
       <a:fillRef idx="1">
         <a:scrgbClr r="0" g="0" b="0"/>
       </a:fillRef>
-      <a:effectRef idx="0">
+      <a:effectRef idx="3">
         <a:scrgbClr r="0" g="0" b="0"/>
       </a:effectRef>
       <a:fontRef idx="minor"/>
@@ -13713,13 +14545,13 @@
     <dgm:sp3d/>
     <dgm:txPr/>
     <dgm:style>
-      <a:lnRef idx="2">
+      <a:lnRef idx="1">
         <a:scrgbClr r="0" g="0" b="0"/>
       </a:lnRef>
       <a:fillRef idx="1">
         <a:scrgbClr r="0" g="0" b="0"/>
       </a:fillRef>
-      <a:effectRef idx="0">
+      <a:effectRef idx="2">
         <a:scrgbClr r="0" g="0" b="0"/>
       </a:effectRef>
       <a:fontRef idx="minor"/>
@@ -13733,13 +14565,13 @@
     <dgm:sp3d/>
     <dgm:txPr/>
     <dgm:style>
-      <a:lnRef idx="2">
+      <a:lnRef idx="1">
         <a:scrgbClr r="0" g="0" b="0"/>
       </a:lnRef>
       <a:fillRef idx="1">
         <a:scrgbClr r="0" g="0" b="0"/>
       </a:fillRef>
-      <a:effectRef idx="0">
+      <a:effectRef idx="2">
         <a:scrgbClr r="0" g="0" b="0"/>
       </a:effectRef>
       <a:fontRef idx="minor"/>
@@ -13753,13 +14585,13 @@
     <dgm:sp3d/>
     <dgm:txPr/>
     <dgm:style>
-      <a:lnRef idx="2">
+      <a:lnRef idx="1">
         <a:scrgbClr r="0" g="0" b="0"/>
       </a:lnRef>
       <a:fillRef idx="1">
         <a:scrgbClr r="0" g="0" b="0"/>
       </a:fillRef>
-      <a:effectRef idx="0">
+      <a:effectRef idx="2">
         <a:scrgbClr r="0" g="0" b="0"/>
       </a:effectRef>
       <a:fontRef idx="minor"/>
@@ -13773,13 +14605,13 @@
     <dgm:sp3d/>
     <dgm:txPr/>
     <dgm:style>
-      <a:lnRef idx="2">
+      <a:lnRef idx="1">
         <a:scrgbClr r="0" g="0" b="0"/>
       </a:lnRef>
       <a:fillRef idx="1">
         <a:scrgbClr r="0" g="0" b="0"/>
       </a:fillRef>
-      <a:effectRef idx="0">
+      <a:effectRef idx="2">
         <a:scrgbClr r="0" g="0" b="0"/>
       </a:effectRef>
       <a:fontRef idx="minor"/>
@@ -13793,13 +14625,13 @@
     <dgm:sp3d/>
     <dgm:txPr/>
     <dgm:style>
-      <a:lnRef idx="2">
+      <a:lnRef idx="1">
         <a:scrgbClr r="0" g="0" b="0"/>
       </a:lnRef>
       <a:fillRef idx="1">
         <a:scrgbClr r="0" g="0" b="0"/>
       </a:fillRef>
-      <a:effectRef idx="0">
+      <a:effectRef idx="2">
         <a:scrgbClr r="0" g="0" b="0"/>
       </a:effectRef>
       <a:fontRef idx="minor"/>
@@ -13813,13 +14645,13 @@
     <dgm:sp3d/>
     <dgm:txPr/>
     <dgm:style>
-      <a:lnRef idx="2">
+      <a:lnRef idx="1">
         <a:scrgbClr r="0" g="0" b="0"/>
       </a:lnRef>
       <a:fillRef idx="1">
         <a:scrgbClr r="0" g="0" b="0"/>
       </a:fillRef>
-      <a:effectRef idx="0">
+      <a:effectRef idx="2">
         <a:scrgbClr r="0" g="0" b="0"/>
       </a:effectRef>
       <a:fontRef idx="minor"/>
@@ -13833,13 +14665,13 @@
     <dgm:sp3d/>
     <dgm:txPr/>
     <dgm:style>
-      <a:lnRef idx="2">
+      <a:lnRef idx="1">
         <a:scrgbClr r="0" g="0" b="0"/>
       </a:lnRef>
       <a:fillRef idx="1">
         <a:scrgbClr r="0" g="0" b="0"/>
       </a:fillRef>
-      <a:effectRef idx="0">
+      <a:effectRef idx="2">
         <a:scrgbClr r="0" g="0" b="0"/>
       </a:effectRef>
       <a:fontRef idx="minor"/>
@@ -13859,7 +14691,7 @@
       <a:fillRef idx="1">
         <a:scrgbClr r="0" g="0" b="0"/>
       </a:fillRef>
-      <a:effectRef idx="0">
+      <a:effectRef idx="2">
         <a:scrgbClr r="0" g="0" b="0"/>
       </a:effectRef>
       <a:fontRef idx="minor"/>
@@ -13879,7 +14711,7 @@
       <a:fillRef idx="1">
         <a:scrgbClr r="0" g="0" b="0"/>
       </a:fillRef>
-      <a:effectRef idx="0">
+      <a:effectRef idx="3">
         <a:scrgbClr r="0" g="0" b="0"/>
       </a:effectRef>
       <a:fontRef idx="minor"/>
@@ -13913,13 +14745,13 @@
     <dgm:sp3d/>
     <dgm:txPr/>
     <dgm:style>
-      <a:lnRef idx="2">
+      <a:lnRef idx="0">
         <a:scrgbClr r="0" g="0" b="0"/>
       </a:lnRef>
-      <a:fillRef idx="1">
+      <a:fillRef idx="3">
         <a:scrgbClr r="0" g="0" b="0"/>
       </a:fillRef>
-      <a:effectRef idx="0">
+      <a:effectRef idx="3">
         <a:scrgbClr r="0" g="0" b="0"/>
       </a:effectRef>
       <a:fontRef idx="minor"/>
@@ -13949,11 +14781,11 @@
 </file>
 
 <file path=ppt/diagrams/quickStyle2.xml><?xml version="1.0" encoding="utf-8"?>
-<dgm:styleDef xmlns:dgm="http://schemas.openxmlformats.org/drawingml/2006/diagram" xmlns:a="http://schemas.openxmlformats.org/drawingml/2006/main" uniqueId="urn:microsoft.com/office/officeart/2005/8/quickstyle/simple1">
+<dgm:styleDef xmlns:dgm="http://schemas.openxmlformats.org/drawingml/2006/diagram" xmlns:a="http://schemas.openxmlformats.org/drawingml/2006/main" uniqueId="urn:microsoft.com/office/officeart/2005/8/quickstyle/simple5">
   <dgm:title val=""/>
   <dgm:desc val=""/>
   <dgm:catLst>
-    <dgm:cat type="simple" pri="10100"/>
+    <dgm:cat type="simple" pri="10500"/>
   </dgm:catLst>
   <dgm:scene3d>
     <a:camera prst="orthographicFront"/>
@@ -13967,13 +14799,13 @@
     <dgm:sp3d/>
     <dgm:txPr/>
     <dgm:style>
-      <a:lnRef idx="2">
+      <a:lnRef idx="0">
         <a:scrgbClr r="0" g="0" b="0"/>
       </a:lnRef>
-      <a:fillRef idx="1">
+      <a:fillRef idx="3">
         <a:scrgbClr r="0" g="0" b="0"/>
       </a:fillRef>
-      <a:effectRef idx="0">
+      <a:effectRef idx="3">
         <a:scrgbClr r="0" g="0" b="0"/>
       </a:effectRef>
       <a:fontRef idx="minor">
@@ -13989,13 +14821,13 @@
     <dgm:sp3d/>
     <dgm:txPr/>
     <dgm:style>
-      <a:lnRef idx="2">
+      <a:lnRef idx="0">
         <a:scrgbClr r="0" g="0" b="0"/>
       </a:lnRef>
-      <a:fillRef idx="1">
+      <a:fillRef idx="3">
         <a:scrgbClr r="0" g="0" b="0"/>
       </a:fillRef>
-      <a:effectRef idx="0">
+      <a:effectRef idx="3">
         <a:scrgbClr r="0" g="0" b="0"/>
       </a:effectRef>
       <a:fontRef idx="minor">
@@ -14011,13 +14843,13 @@
     <dgm:sp3d/>
     <dgm:txPr/>
     <dgm:style>
-      <a:lnRef idx="2">
+      <a:lnRef idx="0">
         <a:scrgbClr r="0" g="0" b="0"/>
       </a:lnRef>
-      <a:fillRef idx="1">
+      <a:fillRef idx="3">
         <a:scrgbClr r="0" g="0" b="0"/>
       </a:fillRef>
-      <a:effectRef idx="0">
+      <a:effectRef idx="3">
         <a:scrgbClr r="0" g="0" b="0"/>
       </a:effectRef>
       <a:fontRef idx="minor">
@@ -14033,13 +14865,13 @@
     <dgm:sp3d/>
     <dgm:txPr/>
     <dgm:style>
-      <a:lnRef idx="2">
+      <a:lnRef idx="1">
         <a:scrgbClr r="0" g="0" b="0"/>
       </a:lnRef>
-      <a:fillRef idx="1">
+      <a:fillRef idx="3">
         <a:scrgbClr r="0" g="0" b="0"/>
       </a:fillRef>
-      <a:effectRef idx="0">
+      <a:effectRef idx="3">
         <a:scrgbClr r="0" g="0" b="0"/>
       </a:effectRef>
       <a:fontRef idx="minor">
@@ -14055,13 +14887,13 @@
     <dgm:sp3d/>
     <dgm:txPr/>
     <dgm:style>
-      <a:lnRef idx="2">
+      <a:lnRef idx="0">
         <a:scrgbClr r="0" g="0" b="0"/>
       </a:lnRef>
-      <a:fillRef idx="1">
+      <a:fillRef idx="3">
         <a:scrgbClr r="0" g="0" b="0"/>
       </a:fillRef>
-      <a:effectRef idx="0">
+      <a:effectRef idx="3">
         <a:scrgbClr r="0" g="0" b="0"/>
       </a:effectRef>
       <a:fontRef idx="minor">
@@ -14077,13 +14909,13 @@
     <dgm:sp3d/>
     <dgm:txPr/>
     <dgm:style>
-      <a:lnRef idx="2">
+      <a:lnRef idx="0">
         <a:scrgbClr r="0" g="0" b="0"/>
       </a:lnRef>
-      <a:fillRef idx="1">
+      <a:fillRef idx="3">
         <a:scrgbClr r="0" g="0" b="0"/>
       </a:fillRef>
-      <a:effectRef idx="0">
+      <a:effectRef idx="3">
         <a:scrgbClr r="0" g="0" b="0"/>
       </a:effectRef>
       <a:fontRef idx="minor">
@@ -14099,13 +14931,13 @@
     <dgm:sp3d/>
     <dgm:txPr/>
     <dgm:style>
-      <a:lnRef idx="2">
+      <a:lnRef idx="0">
         <a:scrgbClr r="0" g="0" b="0"/>
       </a:lnRef>
-      <a:fillRef idx="1">
+      <a:fillRef idx="3">
         <a:scrgbClr r="0" g="0" b="0"/>
       </a:fillRef>
-      <a:effectRef idx="0">
+      <a:effectRef idx="3">
         <a:scrgbClr r="0" g="0" b="0"/>
       </a:effectRef>
       <a:fontRef idx="minor">
@@ -14121,13 +14953,13 @@
     <dgm:sp3d/>
     <dgm:txPr/>
     <dgm:style>
-      <a:lnRef idx="2">
+      <a:lnRef idx="0">
         <a:scrgbClr r="0" g="0" b="0"/>
       </a:lnRef>
-      <a:fillRef idx="1">
+      <a:fillRef idx="3">
         <a:scrgbClr r="0" g="0" b="0"/>
       </a:fillRef>
-      <a:effectRef idx="0">
+      <a:effectRef idx="3">
         <a:scrgbClr r="0" g="0" b="0"/>
       </a:effectRef>
       <a:fontRef idx="minor">
@@ -14143,13 +14975,13 @@
     <dgm:sp3d/>
     <dgm:txPr/>
     <dgm:style>
-      <a:lnRef idx="2">
+      <a:lnRef idx="0">
         <a:scrgbClr r="0" g="0" b="0"/>
       </a:lnRef>
       <a:fillRef idx="1">
         <a:scrgbClr r="0" g="0" b="0"/>
       </a:fillRef>
-      <a:effectRef idx="0">
+      <a:effectRef idx="3">
         <a:scrgbClr r="0" g="0" b="0"/>
       </a:effectRef>
       <a:fontRef idx="minor"/>
@@ -14163,13 +14995,13 @@
     <dgm:sp3d/>
     <dgm:txPr/>
     <dgm:style>
-      <a:lnRef idx="2">
+      <a:lnRef idx="0">
         <a:scrgbClr r="0" g="0" b="0"/>
       </a:lnRef>
       <a:fillRef idx="1">
         <a:scrgbClr r="0" g="0" b="0"/>
       </a:fillRef>
-      <a:effectRef idx="0">
+      <a:effectRef idx="3">
         <a:scrgbClr r="0" g="0" b="0"/>
       </a:effectRef>
       <a:fontRef idx="minor"/>
@@ -14183,13 +15015,13 @@
     <dgm:sp3d/>
     <dgm:txPr/>
     <dgm:style>
-      <a:lnRef idx="2">
+      <a:lnRef idx="0">
         <a:scrgbClr r="0" g="0" b="0"/>
       </a:lnRef>
       <a:fillRef idx="1">
         <a:scrgbClr r="0" g="0" b="0"/>
       </a:fillRef>
-      <a:effectRef idx="0">
+      <a:effectRef idx="3">
         <a:scrgbClr r="0" g="0" b="0"/>
       </a:effectRef>
       <a:fontRef idx="minor"/>
@@ -14206,10 +15038,10 @@
       <a:lnRef idx="0">
         <a:scrgbClr r="0" g="0" b="0"/>
       </a:lnRef>
-      <a:fillRef idx="1">
+      <a:fillRef idx="3">
         <a:scrgbClr r="0" g="0" b="0"/>
       </a:fillRef>
-      <a:effectRef idx="0">
+      <a:effectRef idx="3">
         <a:scrgbClr r="0" g="0" b="0"/>
       </a:effectRef>
       <a:fontRef idx="minor">
@@ -14228,10 +15060,10 @@
       <a:lnRef idx="0">
         <a:scrgbClr r="0" g="0" b="0"/>
       </a:lnRef>
-      <a:fillRef idx="1">
+      <a:fillRef idx="3">
         <a:scrgbClr r="0" g="0" b="0"/>
       </a:fillRef>
-      <a:effectRef idx="0">
+      <a:effectRef idx="3">
         <a:scrgbClr r="0" g="0" b="0"/>
       </a:effectRef>
       <a:fontRef idx="minor">
@@ -14250,10 +15082,10 @@
       <a:lnRef idx="0">
         <a:scrgbClr r="0" g="0" b="0"/>
       </a:lnRef>
-      <a:fillRef idx="1">
+      <a:fillRef idx="3">
         <a:scrgbClr r="0" g="0" b="0"/>
       </a:fillRef>
-      <a:effectRef idx="0">
+      <a:effectRef idx="3">
         <a:scrgbClr r="0" g="0" b="0"/>
       </a:effectRef>
       <a:fontRef idx="minor">
@@ -14289,13 +15121,13 @@
     <dgm:sp3d/>
     <dgm:txPr/>
     <dgm:style>
-      <a:lnRef idx="2">
+      <a:lnRef idx="1">
         <a:scrgbClr r="0" g="0" b="0"/>
       </a:lnRef>
-      <a:fillRef idx="1">
+      <a:fillRef idx="0">
         <a:scrgbClr r="0" g="0" b="0"/>
       </a:fillRef>
-      <a:effectRef idx="0">
+      <a:effectRef idx="1">
         <a:scrgbClr r="0" g="0" b="0"/>
       </a:effectRef>
       <a:fontRef idx="minor"/>
@@ -14309,13 +15141,13 @@
     <dgm:sp3d/>
     <dgm:txPr/>
     <dgm:style>
-      <a:lnRef idx="2">
+      <a:lnRef idx="0">
         <a:scrgbClr r="0" g="0" b="0"/>
       </a:lnRef>
-      <a:fillRef idx="1">
+      <a:fillRef idx="3">
         <a:scrgbClr r="0" g="0" b="0"/>
       </a:fillRef>
-      <a:effectRef idx="0">
+      <a:effectRef idx="3">
         <a:scrgbClr r="0" g="0" b="0"/>
       </a:effectRef>
       <a:fontRef idx="minor">
@@ -14331,13 +15163,13 @@
     <dgm:sp3d/>
     <dgm:txPr/>
     <dgm:style>
-      <a:lnRef idx="2">
+      <a:lnRef idx="0">
         <a:scrgbClr r="0" g="0" b="0"/>
       </a:lnRef>
-      <a:fillRef idx="1">
+      <a:fillRef idx="3">
         <a:scrgbClr r="0" g="0" b="0"/>
       </a:fillRef>
-      <a:effectRef idx="0">
+      <a:effectRef idx="3">
         <a:scrgbClr r="0" g="0" b="0"/>
       </a:effectRef>
       <a:fontRef idx="minor">
@@ -14353,13 +15185,13 @@
     <dgm:sp3d/>
     <dgm:txPr/>
     <dgm:style>
-      <a:lnRef idx="2">
+      <a:lnRef idx="0">
         <a:scrgbClr r="0" g="0" b="0"/>
       </a:lnRef>
-      <a:fillRef idx="1">
+      <a:fillRef idx="3">
         <a:scrgbClr r="0" g="0" b="0"/>
       </a:fillRef>
-      <a:effectRef idx="0">
+      <a:effectRef idx="3">
         <a:scrgbClr r="0" g="0" b="0"/>
       </a:effectRef>
       <a:fontRef idx="minor">
@@ -14375,13 +15207,13 @@
     <dgm:sp3d/>
     <dgm:txPr/>
     <dgm:style>
-      <a:lnRef idx="2">
+      <a:lnRef idx="0">
         <a:scrgbClr r="0" g="0" b="0"/>
       </a:lnRef>
-      <a:fillRef idx="1">
+      <a:fillRef idx="3">
         <a:scrgbClr r="0" g="0" b="0"/>
       </a:fillRef>
-      <a:effectRef idx="0">
+      <a:effectRef idx="3">
         <a:scrgbClr r="0" g="0" b="0"/>
       </a:effectRef>
       <a:fontRef idx="minor">
@@ -14397,13 +15229,13 @@
     <dgm:sp3d/>
     <dgm:txPr/>
     <dgm:style>
-      <a:lnRef idx="2">
+      <a:lnRef idx="0">
         <a:scrgbClr r="0" g="0" b="0"/>
       </a:lnRef>
-      <a:fillRef idx="1">
+      <a:fillRef idx="3">
         <a:scrgbClr r="0" g="0" b="0"/>
       </a:fillRef>
-      <a:effectRef idx="0">
+      <a:effectRef idx="3">
         <a:scrgbClr r="0" g="0" b="0"/>
       </a:effectRef>
       <a:fontRef idx="minor">
@@ -14419,13 +15251,13 @@
     <dgm:sp3d/>
     <dgm:txPr/>
     <dgm:style>
-      <a:lnRef idx="2">
+      <a:lnRef idx="0">
         <a:scrgbClr r="0" g="0" b="0"/>
       </a:lnRef>
-      <a:fillRef idx="1">
+      <a:fillRef idx="3">
         <a:scrgbClr r="0" g="0" b="0"/>
       </a:fillRef>
-      <a:effectRef idx="0">
+      <a:effectRef idx="3">
         <a:scrgbClr r="0" g="0" b="0"/>
       </a:effectRef>
       <a:fontRef idx="minor">
@@ -14441,13 +15273,13 @@
     <dgm:sp3d/>
     <dgm:txPr/>
     <dgm:style>
-      <a:lnRef idx="2">
+      <a:lnRef idx="0">
         <a:scrgbClr r="0" g="0" b="0"/>
       </a:lnRef>
-      <a:fillRef idx="1">
+      <a:fillRef idx="3">
         <a:scrgbClr r="0" g="0" b="0"/>
       </a:fillRef>
-      <a:effectRef idx="0">
+      <a:effectRef idx="3">
         <a:scrgbClr r="0" g="0" b="0"/>
       </a:effectRef>
       <a:fontRef idx="minor">
@@ -14463,13 +15295,13 @@
     <dgm:sp3d/>
     <dgm:txPr/>
     <dgm:style>
-      <a:lnRef idx="2">
+      <a:lnRef idx="0">
         <a:scrgbClr r="0" g="0" b="0"/>
       </a:lnRef>
-      <a:fillRef idx="1">
+      <a:fillRef idx="3">
         <a:scrgbClr r="0" g="0" b="0"/>
       </a:fillRef>
-      <a:effectRef idx="0">
+      <a:effectRef idx="3">
         <a:scrgbClr r="0" g="0" b="0"/>
       </a:effectRef>
       <a:fontRef idx="minor">
@@ -14485,13 +15317,13 @@
     <dgm:sp3d/>
     <dgm:txPr/>
     <dgm:style>
-      <a:lnRef idx="2">
+      <a:lnRef idx="0">
         <a:scrgbClr r="0" g="0" b="0"/>
       </a:lnRef>
-      <a:fillRef idx="1">
+      <a:fillRef idx="3">
         <a:scrgbClr r="0" g="0" b="0"/>
       </a:fillRef>
-      <a:effectRef idx="0">
+      <a:effectRef idx="3">
         <a:scrgbClr r="0" g="0" b="0"/>
       </a:effectRef>
       <a:fontRef idx="minor">
@@ -14587,13 +15419,13 @@
     <dgm:sp3d/>
     <dgm:txPr/>
     <dgm:style>
-      <a:lnRef idx="2">
+      <a:lnRef idx="1">
         <a:scrgbClr r="0" g="0" b="0"/>
       </a:lnRef>
       <a:fillRef idx="1">
         <a:scrgbClr r="0" g="0" b="0"/>
       </a:fillRef>
-      <a:effectRef idx="0">
+      <a:effectRef idx="2">
         <a:scrgbClr r="0" g="0" b="0"/>
       </a:effectRef>
       <a:fontRef idx="minor"/>
@@ -14607,13 +15439,13 @@
     <dgm:sp3d/>
     <dgm:txPr/>
     <dgm:style>
-      <a:lnRef idx="2">
+      <a:lnRef idx="1">
         <a:scrgbClr r="0" g="0" b="0"/>
       </a:lnRef>
       <a:fillRef idx="1">
         <a:scrgbClr r="0" g="0" b="0"/>
       </a:fillRef>
-      <a:effectRef idx="0">
+      <a:effectRef idx="2">
         <a:scrgbClr r="0" g="0" b="0"/>
       </a:effectRef>
       <a:fontRef idx="minor"/>
@@ -14627,13 +15459,13 @@
     <dgm:sp3d/>
     <dgm:txPr/>
     <dgm:style>
-      <a:lnRef idx="2">
+      <a:lnRef idx="1">
         <a:scrgbClr r="0" g="0" b="0"/>
       </a:lnRef>
       <a:fillRef idx="1">
         <a:scrgbClr r="0" g="0" b="0"/>
       </a:fillRef>
-      <a:effectRef idx="0">
+      <a:effectRef idx="2">
         <a:scrgbClr r="0" g="0" b="0"/>
       </a:effectRef>
       <a:fontRef idx="minor"/>
@@ -14667,13 +15499,13 @@
     <dgm:sp3d/>
     <dgm:txPr/>
     <dgm:style>
-      <a:lnRef idx="2">
+      <a:lnRef idx="1">
         <a:scrgbClr r="0" g="0" b="0"/>
       </a:lnRef>
       <a:fillRef idx="1">
         <a:scrgbClr r="0" g="0" b="0"/>
       </a:fillRef>
-      <a:effectRef idx="0">
+      <a:effectRef idx="2">
         <a:scrgbClr r="0" g="0" b="0"/>
       </a:effectRef>
       <a:fontRef idx="minor"/>
@@ -14687,13 +15519,13 @@
     <dgm:sp3d/>
     <dgm:txPr/>
     <dgm:style>
-      <a:lnRef idx="2">
+      <a:lnRef idx="1">
         <a:scrgbClr r="0" g="0" b="0"/>
       </a:lnRef>
       <a:fillRef idx="1">
         <a:scrgbClr r="0" g="0" b="0"/>
       </a:fillRef>
-      <a:effectRef idx="0">
+      <a:effectRef idx="2">
         <a:scrgbClr r="0" g="0" b="0"/>
       </a:effectRef>
       <a:fontRef idx="minor"/>
@@ -14707,13 +15539,13 @@
     <dgm:sp3d/>
     <dgm:txPr/>
     <dgm:style>
-      <a:lnRef idx="2">
+      <a:lnRef idx="1">
         <a:scrgbClr r="0" g="0" b="0"/>
       </a:lnRef>
       <a:fillRef idx="1">
         <a:scrgbClr r="0" g="0" b="0"/>
       </a:fillRef>
-      <a:effectRef idx="0">
+      <a:effectRef idx="3">
         <a:scrgbClr r="0" g="0" b="0"/>
       </a:effectRef>
       <a:fontRef idx="minor"/>
@@ -14727,13 +15559,13 @@
     <dgm:sp3d/>
     <dgm:txPr/>
     <dgm:style>
-      <a:lnRef idx="2">
+      <a:lnRef idx="1">
         <a:scrgbClr r="0" g="0" b="0"/>
       </a:lnRef>
       <a:fillRef idx="1">
         <a:scrgbClr r="0" g="0" b="0"/>
       </a:fillRef>
-      <a:effectRef idx="0">
+      <a:effectRef idx="3">
         <a:scrgbClr r="0" g="0" b="0"/>
       </a:effectRef>
       <a:fontRef idx="minor"/>
@@ -14747,13 +15579,13 @@
     <dgm:sp3d/>
     <dgm:txPr/>
     <dgm:style>
-      <a:lnRef idx="2">
+      <a:lnRef idx="1">
         <a:scrgbClr r="0" g="0" b="0"/>
       </a:lnRef>
       <a:fillRef idx="1">
         <a:scrgbClr r="0" g="0" b="0"/>
       </a:fillRef>
-      <a:effectRef idx="0">
+      <a:effectRef idx="2">
         <a:scrgbClr r="0" g="0" b="0"/>
       </a:effectRef>
       <a:fontRef idx="minor"/>
@@ -14767,13 +15599,13 @@
     <dgm:sp3d/>
     <dgm:txPr/>
     <dgm:style>
-      <a:lnRef idx="2">
+      <a:lnRef idx="1">
         <a:scrgbClr r="0" g="0" b="0"/>
       </a:lnRef>
       <a:fillRef idx="1">
         <a:scrgbClr r="0" g="0" b="0"/>
       </a:fillRef>
-      <a:effectRef idx="0">
+      <a:effectRef idx="2">
         <a:scrgbClr r="0" g="0" b="0"/>
       </a:effectRef>
       <a:fontRef idx="minor"/>
@@ -14787,13 +15619,13 @@
     <dgm:sp3d/>
     <dgm:txPr/>
     <dgm:style>
-      <a:lnRef idx="2">
+      <a:lnRef idx="1">
         <a:scrgbClr r="0" g="0" b="0"/>
       </a:lnRef>
       <a:fillRef idx="1">
         <a:scrgbClr r="0" g="0" b="0"/>
       </a:fillRef>
-      <a:effectRef idx="0">
+      <a:effectRef idx="2">
         <a:scrgbClr r="0" g="0" b="0"/>
       </a:effectRef>
       <a:fontRef idx="minor"/>
@@ -14807,13 +15639,13 @@
     <dgm:sp3d/>
     <dgm:txPr/>
     <dgm:style>
-      <a:lnRef idx="2">
+      <a:lnRef idx="1">
         <a:scrgbClr r="0" g="0" b="0"/>
       </a:lnRef>
       <a:fillRef idx="1">
         <a:scrgbClr r="0" g="0" b="0"/>
       </a:fillRef>
-      <a:effectRef idx="0">
+      <a:effectRef idx="2">
         <a:scrgbClr r="0" g="0" b="0"/>
       </a:effectRef>
       <a:fontRef idx="minor"/>
@@ -14827,13 +15659,13 @@
     <dgm:sp3d/>
     <dgm:txPr/>
     <dgm:style>
-      <a:lnRef idx="2">
+      <a:lnRef idx="1">
         <a:scrgbClr r="0" g="0" b="0"/>
       </a:lnRef>
       <a:fillRef idx="1">
         <a:scrgbClr r="0" g="0" b="0"/>
       </a:fillRef>
-      <a:effectRef idx="0">
+      <a:effectRef idx="2">
         <a:scrgbClr r="0" g="0" b="0"/>
       </a:effectRef>
       <a:fontRef idx="minor"/>
@@ -14847,13 +15679,13 @@
     <dgm:sp3d/>
     <dgm:txPr/>
     <dgm:style>
-      <a:lnRef idx="2">
+      <a:lnRef idx="1">
         <a:scrgbClr r="0" g="0" b="0"/>
       </a:lnRef>
       <a:fillRef idx="1">
         <a:scrgbClr r="0" g="0" b="0"/>
       </a:fillRef>
-      <a:effectRef idx="0">
+      <a:effectRef idx="2">
         <a:scrgbClr r="0" g="0" b="0"/>
       </a:effectRef>
       <a:fontRef idx="minor"/>
@@ -14867,13 +15699,13 @@
     <dgm:sp3d/>
     <dgm:txPr/>
     <dgm:style>
-      <a:lnRef idx="2">
+      <a:lnRef idx="1">
         <a:scrgbClr r="0" g="0" b="0"/>
       </a:lnRef>
       <a:fillRef idx="1">
         <a:scrgbClr r="0" g="0" b="0"/>
       </a:fillRef>
-      <a:effectRef idx="0">
+      <a:effectRef idx="2">
         <a:scrgbClr r="0" g="0" b="0"/>
       </a:effectRef>
       <a:fontRef idx="minor"/>
@@ -14893,7 +15725,7 @@
       <a:fillRef idx="1">
         <a:scrgbClr r="0" g="0" b="0"/>
       </a:fillRef>
-      <a:effectRef idx="0">
+      <a:effectRef idx="2">
         <a:scrgbClr r="0" g="0" b="0"/>
       </a:effectRef>
       <a:fontRef idx="minor"/>
@@ -14913,7 +15745,7 @@
       <a:fillRef idx="1">
         <a:scrgbClr r="0" g="0" b="0"/>
       </a:fillRef>
-      <a:effectRef idx="0">
+      <a:effectRef idx="3">
         <a:scrgbClr r="0" g="0" b="0"/>
       </a:effectRef>
       <a:fontRef idx="minor"/>
@@ -14947,13 +15779,13 @@
     <dgm:sp3d/>
     <dgm:txPr/>
     <dgm:style>
-      <a:lnRef idx="2">
+      <a:lnRef idx="0">
         <a:scrgbClr r="0" g="0" b="0"/>
       </a:lnRef>
-      <a:fillRef idx="1">
+      <a:fillRef idx="3">
         <a:scrgbClr r="0" g="0" b="0"/>
       </a:fillRef>
-      <a:effectRef idx="0">
+      <a:effectRef idx="3">
         <a:scrgbClr r="0" g="0" b="0"/>
       </a:effectRef>
       <a:fontRef idx="minor"/>
@@ -17133,7 +17965,7 @@
             <a:fld id="{7C650FD7-C62C-411D-9F87-E6F104DCD088}" type="datetimeFigureOut">
               <a:rPr lang="fr-FR" smtClean="0"/>
               <a:pPr/>
-              <a:t>21/01/2011</a:t>
+              <a:t>23/01/2011</a:t>
             </a:fld>
             <a:endParaRPr lang="fr-FR"/>
           </a:p>
@@ -18128,7 +18960,7 @@
             <a:fld id="{731A43A3-5526-4FBF-86B7-2E23266CE216}" type="datetime1">
               <a:rPr lang="fr-FR" smtClean="0"/>
               <a:pPr/>
-              <a:t>21/01/2011</a:t>
+              <a:t>23/01/2011</a:t>
             </a:fld>
             <a:endParaRPr lang="fr-FR"/>
           </a:p>
@@ -18330,7 +19162,7 @@
             <a:fld id="{F71D09EA-36A2-4DF2-9D70-4AC1F609E1C3}" type="datetime1">
               <a:rPr lang="fr-FR" smtClean="0"/>
               <a:pPr/>
-              <a:t>21/01/2011</a:t>
+              <a:t>23/01/2011</a:t>
             </a:fld>
             <a:endParaRPr lang="fr-FR"/>
           </a:p>
@@ -18521,7 +19353,7 @@
             <a:fld id="{D3A56D2E-A092-40A8-A9B0-DBAEC287B4EE}" type="datetime1">
               <a:rPr lang="fr-FR" smtClean="0"/>
               <a:pPr/>
-              <a:t>21/01/2011</a:t>
+              <a:t>23/01/2011</a:t>
             </a:fld>
             <a:endParaRPr lang="fr-FR"/>
           </a:p>
@@ -18677,7 +19509,7 @@
             <a:fld id="{194C90BA-3C6B-409C-8406-A718BD467CF8}" type="datetime1">
               <a:rPr lang="fr-FR" smtClean="0"/>
               <a:pPr/>
-              <a:t>21/01/2011</a:t>
+              <a:t>23/01/2011</a:t>
             </a:fld>
             <a:endParaRPr lang="fr-FR"/>
           </a:p>
@@ -18938,7 +19770,7 @@
             <a:fld id="{6EFEE733-D64B-4F43-926E-BE5F757A3094}" type="datetime1">
               <a:rPr lang="fr-FR" smtClean="0"/>
               <a:pPr/>
-              <a:t>21/01/2011</a:t>
+              <a:t>23/01/2011</a:t>
             </a:fld>
             <a:endParaRPr lang="fr-FR"/>
           </a:p>
@@ -19353,7 +20185,7 @@
             <a:fld id="{2D5122C7-EB76-45CC-81B3-B6E01DBD6DAB}" type="datetime1">
               <a:rPr lang="fr-FR" smtClean="0"/>
               <a:pPr/>
-              <a:t>21/01/2011</a:t>
+              <a:t>23/01/2011</a:t>
             </a:fld>
             <a:endParaRPr lang="fr-FR"/>
           </a:p>
@@ -19805,7 +20637,7 @@
             <a:fld id="{F4447A85-5E60-4720-84AA-E236EAEF0D9D}" type="datetime1">
               <a:rPr lang="fr-FR" smtClean="0"/>
               <a:pPr/>
-              <a:t>21/01/2011</a:t>
+              <a:t>23/01/2011</a:t>
             </a:fld>
             <a:endParaRPr lang="fr-FR"/>
           </a:p>
@@ -19912,7 +20744,7 @@
             <a:fld id="{F345C2DA-79FD-4988-A80F-458A1FC12187}" type="datetime1">
               <a:rPr lang="fr-FR" smtClean="0"/>
               <a:pPr/>
-              <a:t>21/01/2011</a:t>
+              <a:t>23/01/2011</a:t>
             </a:fld>
             <a:endParaRPr lang="fr-FR"/>
           </a:p>
@@ -20039,7 +20871,7 @@
             <a:fld id="{7EB91FE6-74B1-4BAB-BB07-ED622043AF82}" type="datetime1">
               <a:rPr lang="fr-FR" smtClean="0"/>
               <a:pPr/>
-              <a:t>21/01/2011</a:t>
+              <a:t>23/01/2011</a:t>
             </a:fld>
             <a:endParaRPr lang="fr-FR"/>
           </a:p>
@@ -20319,7 +21151,7 @@
             <a:fld id="{5F659136-452F-4404-930B-BD161E6DC65D}" type="datetime1">
               <a:rPr lang="fr-FR" smtClean="0"/>
               <a:pPr/>
-              <a:t>21/01/2011</a:t>
+              <a:t>23/01/2011</a:t>
             </a:fld>
             <a:endParaRPr lang="fr-FR"/>
           </a:p>
@@ -20530,7 +21362,7 @@
             <a:fld id="{CB4A9976-4B57-4298-8EA2-E173958BE008}" type="datetime1">
               <a:rPr lang="fr-FR" smtClean="0"/>
               <a:pPr/>
-              <a:t>21/01/2011</a:t>
+              <a:t>23/01/2011</a:t>
             </a:fld>
             <a:endParaRPr lang="fr-FR"/>
           </a:p>
@@ -21645,7 +22477,7 @@
             <a:fld id="{05D662C7-C1E9-4030-9305-46E025ED5DC0}" type="datetime1">
               <a:rPr lang="fr-FR" smtClean="0"/>
               <a:pPr/>
-              <a:t>21/01/2011</a:t>
+              <a:t>23/01/2011</a:t>
             </a:fld>
             <a:endParaRPr lang="fr-FR"/>
           </a:p>
@@ -23067,19 +23899,7 @@
                       </a:r>
                       <a:r>
                         <a:rPr lang="fr-FR" sz="1000" baseline="0" dirty="0" smtClean="0"/>
-                        <a:t>)/ Seuils (</a:t>
-                      </a:r>
-                      <a:r>
-                        <a:rPr lang="fr-FR" sz="1000" baseline="0" dirty="0" smtClean="0"/>
-                        <a:t>support, </a:t>
-                      </a:r>
-                      <a:r>
-                        <a:rPr lang="fr-FR" sz="1000" baseline="0" dirty="0" smtClean="0"/>
-                        <a:t>confiance</a:t>
-                      </a:r>
-                      <a:r>
-                        <a:rPr lang="fr-FR" sz="1000" baseline="0" dirty="0" smtClean="0"/>
-                        <a:t>)</a:t>
+                        <a:t>)/ Seuils (support, confiance)</a:t>
                       </a:r>
                     </a:p>
                     <a:p>
@@ -25044,19 +25864,7 @@
             </a:r>
             <a:r>
               <a:rPr lang="fr-FR" dirty="0" smtClean="0"/>
-              <a:t> </a:t>
-            </a:r>
-            <a:r>
-              <a:rPr lang="fr-FR" dirty="0" smtClean="0"/>
-              <a:t>basique performant </a:t>
-            </a:r>
-            <a:r>
-              <a:rPr lang="fr-FR" dirty="0" smtClean="0"/>
-              <a:t>jusqu’à une certaine </a:t>
-            </a:r>
-            <a:r>
-              <a:rPr lang="fr-FR" dirty="0" smtClean="0"/>
-              <a:t>taille</a:t>
+              <a:t> basique performant jusqu’à une certaine taille</a:t>
             </a:r>
           </a:p>
           <a:p>
@@ -25069,7 +25877,6 @@
               <a:rPr lang="fr-FR" dirty="0" smtClean="0"/>
               <a:t>Optimisation possibles</a:t>
             </a:r>
-            <a:endParaRPr lang="fr-FR" dirty="0" smtClean="0"/>
           </a:p>
           <a:p>
             <a:pPr lvl="1">
@@ -25079,17 +25886,8 @@
             </a:pPr>
             <a:r>
               <a:rPr lang="fr-FR" dirty="0" smtClean="0"/>
-              <a:t>Non optimale </a:t>
+              <a:t>Non optimale sur des bases de production	</a:t>
             </a:r>
-            <a:r>
-              <a:rPr lang="fr-FR" dirty="0" smtClean="0"/>
-              <a:t>sur des bases de </a:t>
-            </a:r>
-            <a:r>
-              <a:rPr lang="fr-FR" dirty="0" smtClean="0"/>
-              <a:t>production	</a:t>
-            </a:r>
-            <a:endParaRPr lang="fr-FR" dirty="0" smtClean="0"/>
           </a:p>
           <a:p>
             <a:pPr lvl="2">

</xml_diff>